<commit_message>
Cuaderno de estudio MA_09_07_CO terminado
</commit_message>
<xml_diff>
--- a/fuentes/contenidos/grado09/guion07/MapaConceptual_MA_09_07_CO.pptx
+++ b/fuentes/contenidos/grado09/guion07/MapaConceptual_MA_09_07_CO.pptx
@@ -106,7 +106,18 @@
   </p:defaultTextStyle>
   <p:extLst>
     <p:ext uri="{EFAFB233-063F-42B5-8137-9DF3F51BA10A}">
-      <p15:sldGuideLst xmlns:p15="http://schemas.microsoft.com/office/powerpoint/2012/main" xmlns=""/>
+      <p15:sldGuideLst xmlns:p15="http://schemas.microsoft.com/office/powerpoint/2012/main">
+        <p15:guide id="1" orient="horz" pos="2949">
+          <p15:clr>
+            <a:srgbClr val="A4A3A4"/>
+          </p15:clr>
+        </p15:guide>
+        <p15:guide id="2" pos="4309">
+          <p15:clr>
+            <a:srgbClr val="A4A3A4"/>
+          </p15:clr>
+        </p15:guide>
+      </p15:sldGuideLst>
     </p:ext>
   </p:extLst>
 </p:presentation>
@@ -451,7 +462,7 @@
             <a:fld id="{5001C876-01F7-4317-94B9-1AE222133113}" type="datetimeFigureOut">
               <a:rPr lang="es-ES" smtClean="0"/>
               <a:pPr/>
-              <a:t>04/11/2015</a:t>
+              <a:t>23/02/2016</a:t>
             </a:fld>
             <a:endParaRPr lang="es-ES"/>
           </a:p>
@@ -1272,14 +1283,28 @@
                 <a:solidFill>
                   <a:schemeClr val="bg1"/>
                 </a:solidFill>
-              </a:rPr>
-              <a:t>ƒ : ℝ → ℝ </a:t>
+                <a:latin typeface="Arial" panose="020B0604020202020204" pitchFamily="34" charset="0"/>
+                <a:cs typeface="Arial" panose="020B0604020202020204" pitchFamily="34" charset="0"/>
+              </a:rPr>
+              <a:t> f: </a:t>
+            </a:r>
+            <a:r>
+              <a:rPr lang="es-ES_tradnl" sz="1050" i="1" dirty="0" smtClean="0">
+                <a:solidFill>
+                  <a:schemeClr val="bg1"/>
+                </a:solidFill>
+                <a:latin typeface="Arial" panose="020B0604020202020204" pitchFamily="34" charset="0"/>
+                <a:cs typeface="Arial" panose="020B0604020202020204" pitchFamily="34" charset="0"/>
+              </a:rPr>
+              <a:t>ℝ → ℝ </a:t>
             </a:r>
             <a:r>
               <a:rPr lang="es-ES_tradnl" sz="1050" i="1" baseline="30000" dirty="0" smtClean="0">
                 <a:solidFill>
                   <a:schemeClr val="bg1"/>
                 </a:solidFill>
+                <a:latin typeface="Arial" panose="020B0604020202020204" pitchFamily="34" charset="0"/>
+                <a:cs typeface="Arial" panose="020B0604020202020204" pitchFamily="34" charset="0"/>
               </a:rPr>
               <a:t>+</a:t>
             </a:r>
@@ -1287,6 +1312,8 @@
               <a:solidFill>
                 <a:schemeClr val="bg1"/>
               </a:solidFill>
+              <a:latin typeface="Arial" panose="020B0604020202020204" pitchFamily="34" charset="0"/>
+              <a:cs typeface="Arial" panose="020B0604020202020204" pitchFamily="34" charset="0"/>
             </a:endParaRPr>
           </a:p>
           <a:p>
@@ -1296,33 +1323,98 @@
                 <a:solidFill>
                   <a:schemeClr val="bg1"/>
                 </a:solidFill>
-                <a:cs typeface="Arial" pitchFamily="34" charset="0"/>
-              </a:rPr>
-              <a:t>f(x) = a </a:t>
-            </a:r>
-            <a:r>
-              <a:rPr lang="es-CO" sz="1050" i="1" baseline="30000" dirty="0" smtClean="0">
+                <a:latin typeface="Arial" panose="020B0604020202020204" pitchFamily="34" charset="0"/>
+                <a:cs typeface="Arial" panose="020B0604020202020204" pitchFamily="34" charset="0"/>
+              </a:rPr>
+              <a:t>f</a:t>
+            </a:r>
+            <a:r>
+              <a:rPr lang="es-CO" sz="1050" dirty="0" smtClean="0">
                 <a:solidFill>
                   <a:schemeClr val="bg1"/>
                 </a:solidFill>
-                <a:cs typeface="Arial" pitchFamily="34" charset="0"/>
+                <a:latin typeface="Arial" panose="020B0604020202020204" pitchFamily="34" charset="0"/>
+                <a:cs typeface="Arial" panose="020B0604020202020204" pitchFamily="34" charset="0"/>
+              </a:rPr>
+              <a:t>(</a:t>
+            </a:r>
+            <a:r>
+              <a:rPr lang="es-CO" sz="1050" i="1" dirty="0" smtClean="0">
+                <a:solidFill>
+                  <a:schemeClr val="bg1"/>
+                </a:solidFill>
+                <a:latin typeface="Arial" panose="020B0604020202020204" pitchFamily="34" charset="0"/>
+                <a:cs typeface="Arial" panose="020B0604020202020204" pitchFamily="34" charset="0"/>
               </a:rPr>
               <a:t>x</a:t>
             </a:r>
             <a:r>
+              <a:rPr lang="es-CO" sz="1050" dirty="0" smtClean="0">
+                <a:solidFill>
+                  <a:schemeClr val="bg1"/>
+                </a:solidFill>
+                <a:latin typeface="Arial" panose="020B0604020202020204" pitchFamily="34" charset="0"/>
+                <a:cs typeface="Arial" panose="020B0604020202020204" pitchFamily="34" charset="0"/>
+              </a:rPr>
+              <a:t>)</a:t>
+            </a:r>
+            <a:r>
               <a:rPr lang="es-CO" sz="1050" i="1" dirty="0" smtClean="0">
                 <a:solidFill>
                   <a:schemeClr val="bg1"/>
                 </a:solidFill>
-                <a:cs typeface="Arial" pitchFamily="34" charset="0"/>
-              </a:rPr>
-              <a:t> ,  a∈</a:t>
+                <a:latin typeface="Arial" panose="020B0604020202020204" pitchFamily="34" charset="0"/>
+                <a:cs typeface="Arial" panose="020B0604020202020204" pitchFamily="34" charset="0"/>
+              </a:rPr>
+              <a:t> = </a:t>
+            </a:r>
+            <a:r>
+              <a:rPr lang="es-CO" sz="1050" i="1" dirty="0" err="1" smtClean="0">
+                <a:solidFill>
+                  <a:schemeClr val="bg1"/>
+                </a:solidFill>
+                <a:latin typeface="Arial" panose="020B0604020202020204" pitchFamily="34" charset="0"/>
+                <a:cs typeface="Arial" panose="020B0604020202020204" pitchFamily="34" charset="0"/>
+              </a:rPr>
+              <a:t>a</a:t>
+            </a:r>
+            <a:r>
+              <a:rPr lang="es-CO" sz="1050" i="1" baseline="30000" dirty="0" err="1" smtClean="0">
+                <a:solidFill>
+                  <a:schemeClr val="bg1"/>
+                </a:solidFill>
+                <a:latin typeface="Arial" panose="020B0604020202020204" pitchFamily="34" charset="0"/>
+                <a:cs typeface="Arial" panose="020B0604020202020204" pitchFamily="34" charset="0"/>
+              </a:rPr>
+              <a:t>x</a:t>
+            </a:r>
+            <a:r>
+              <a:rPr lang="es-CO" sz="1050" i="1" dirty="0" smtClean="0">
+                <a:solidFill>
+                  <a:schemeClr val="bg1"/>
+                </a:solidFill>
+                <a:latin typeface="Arial" panose="020B0604020202020204" pitchFamily="34" charset="0"/>
+                <a:cs typeface="Arial" panose="020B0604020202020204" pitchFamily="34" charset="0"/>
+              </a:rPr>
+              <a:t> </a:t>
+            </a:r>
+            <a:r>
+              <a:rPr lang="es-CO" sz="1050" i="1" dirty="0" smtClean="0">
+                <a:solidFill>
+                  <a:schemeClr val="bg1"/>
+                </a:solidFill>
+                <a:latin typeface="Arial" panose="020B0604020202020204" pitchFamily="34" charset="0"/>
+                <a:cs typeface="Arial" panose="020B0604020202020204" pitchFamily="34" charset="0"/>
+              </a:rPr>
+              <a:t>,  a∈</a:t>
             </a:r>
             <a:r>
               <a:rPr lang="es-ES_tradnl" sz="1050" i="1" dirty="0" smtClean="0">
                 <a:solidFill>
                   <a:schemeClr val="bg1"/>
                 </a:solidFill>
+                <a:latin typeface="Arial" panose="020B0604020202020204" pitchFamily="34" charset="0"/>
+                <a:cs typeface="Arial" panose="020B0604020202020204" pitchFamily="34" charset="0"/>
               </a:rPr>
               <a:t> ℝ </a:t>
             </a:r>
@@ -1331,6 +1423,8 @@
                 <a:solidFill>
                   <a:schemeClr val="bg1"/>
                 </a:solidFill>
+                <a:latin typeface="Arial" panose="020B0604020202020204" pitchFamily="34" charset="0"/>
+                <a:cs typeface="Arial" panose="020B0604020202020204" pitchFamily="34" charset="0"/>
               </a:rPr>
               <a:t>+</a:t>
             </a:r>
@@ -1339,7 +1433,8 @@
                 <a:solidFill>
                   <a:schemeClr val="bg1"/>
                 </a:solidFill>
-                <a:cs typeface="Arial" pitchFamily="34" charset="0"/>
+                <a:latin typeface="Arial" panose="020B0604020202020204" pitchFamily="34" charset="0"/>
+                <a:cs typeface="Arial" panose="020B0604020202020204" pitchFamily="34" charset="0"/>
               </a:rPr>
               <a:t>,  a ≠ 1 </a:t>
             </a:r>
@@ -1347,7 +1442,8 @@
               <a:solidFill>
                 <a:schemeClr val="bg1"/>
               </a:solidFill>
-              <a:cs typeface="Arial" pitchFamily="34" charset="0"/>
+              <a:latin typeface="Arial" panose="020B0604020202020204" pitchFamily="34" charset="0"/>
+              <a:cs typeface="Arial" panose="020B0604020202020204" pitchFamily="34" charset="0"/>
             </a:endParaRPr>
           </a:p>
         </p:txBody>
@@ -1543,7 +1639,8 @@
                 <a:solidFill>
                   <a:schemeClr val="tx1"/>
                 </a:solidFill>
-                <a:cs typeface="Arial" pitchFamily="34" charset="0"/>
+                <a:latin typeface="Arial" panose="020B0604020202020204" pitchFamily="34" charset="0"/>
+                <a:cs typeface="Arial" panose="020B0604020202020204" pitchFamily="34" charset="0"/>
               </a:rPr>
               <a:t>Cuando</a:t>
             </a:r>
@@ -1552,7 +1649,8 @@
                 <a:solidFill>
                   <a:srgbClr val="FF0000"/>
                 </a:solidFill>
-                <a:cs typeface="Arial" pitchFamily="34" charset="0"/>
+                <a:latin typeface="Arial" panose="020B0604020202020204" pitchFamily="34" charset="0"/>
+                <a:cs typeface="Arial" panose="020B0604020202020204" pitchFamily="34" charset="0"/>
               </a:rPr>
               <a:t>   </a:t>
             </a:r>
@@ -1560,7 +1658,8 @@
               <a:solidFill>
                 <a:srgbClr val="FF0000"/>
               </a:solidFill>
-              <a:cs typeface="Arial" pitchFamily="34" charset="0"/>
+              <a:latin typeface="Arial" panose="020B0604020202020204" pitchFamily="34" charset="0"/>
+              <a:cs typeface="Arial" panose="020B0604020202020204" pitchFamily="34" charset="0"/>
             </a:endParaRPr>
           </a:p>
         </p:txBody>
@@ -1689,7 +1788,8 @@
                 <a:solidFill>
                   <a:schemeClr val="tx1"/>
                 </a:solidFill>
-                <a:cs typeface="Arial" pitchFamily="34" charset="0"/>
+                <a:latin typeface="Arial" panose="020B0604020202020204" pitchFamily="34" charset="0"/>
+                <a:cs typeface="Arial" panose="020B0604020202020204" pitchFamily="34" charset="0"/>
               </a:rPr>
               <a:t>de forma algebraica </a:t>
             </a:r>
@@ -1697,7 +1797,8 @@
               <a:solidFill>
                 <a:schemeClr val="tx1"/>
               </a:solidFill>
-              <a:cs typeface="Arial" pitchFamily="34" charset="0"/>
+              <a:latin typeface="Arial" panose="020B0604020202020204" pitchFamily="34" charset="0"/>
+              <a:cs typeface="Arial" panose="020B0604020202020204" pitchFamily="34" charset="0"/>
             </a:endParaRPr>
           </a:p>
         </p:txBody>
@@ -1862,7 +1963,8 @@
                 <a:solidFill>
                   <a:schemeClr val="tx1"/>
                 </a:solidFill>
-                <a:cs typeface="Arial" pitchFamily="34" charset="0"/>
+                <a:latin typeface="Arial" panose="020B0604020202020204" pitchFamily="34" charset="0"/>
+                <a:cs typeface="Arial" panose="020B0604020202020204" pitchFamily="34" charset="0"/>
               </a:rPr>
               <a:t>determina una   </a:t>
             </a:r>
@@ -1870,7 +1972,8 @@
               <a:solidFill>
                 <a:schemeClr val="tx1"/>
               </a:solidFill>
-              <a:cs typeface="Arial" pitchFamily="34" charset="0"/>
+              <a:latin typeface="Arial" panose="020B0604020202020204" pitchFamily="34" charset="0"/>
+              <a:cs typeface="Arial" panose="020B0604020202020204" pitchFamily="34" charset="0"/>
             </a:endParaRPr>
           </a:p>
         </p:txBody>
@@ -1955,24 +2058,48 @@
                 <a:solidFill>
                   <a:schemeClr val="tx1"/>
                 </a:solidFill>
-                <a:cs typeface="Arial" pitchFamily="34" charset="0"/>
-              </a:rPr>
-              <a:t>ecuación  exponencial            y=</a:t>
+                <a:latin typeface="Arial" panose="020B0604020202020204" pitchFamily="34" charset="0"/>
+                <a:cs typeface="Arial" panose="020B0604020202020204" pitchFamily="34" charset="0"/>
+              </a:rPr>
+              <a:t>ecuación  exponencial            </a:t>
+            </a:r>
+            <a:r>
+              <a:rPr lang="es-CO" sz="900" dirty="0" smtClean="0">
+                <a:solidFill>
+                  <a:schemeClr val="tx1"/>
+                </a:solidFill>
+                <a:latin typeface="Arial" panose="020B0604020202020204" pitchFamily="34" charset="0"/>
+                <a:cs typeface="Arial" panose="020B0604020202020204" pitchFamily="34" charset="0"/>
+              </a:rPr>
+              <a:t>y =</a:t>
+            </a:r>
+            <a:r>
+              <a:rPr lang="es-ES_tradnl" sz="900" i="1" dirty="0" smtClean="0">
+                <a:solidFill>
+                  <a:schemeClr val="tx1"/>
+                </a:solidFill>
+                <a:latin typeface="Arial" panose="020B0604020202020204" pitchFamily="34" charset="0"/>
+                <a:cs typeface="Arial" panose="020B0604020202020204" pitchFamily="34" charset="0"/>
+              </a:rPr>
+              <a:t> </a:t>
             </a:r>
             <a:r>
               <a:rPr lang="es-ES_tradnl" sz="900" i="1" dirty="0">
                 <a:solidFill>
                   <a:schemeClr val="tx1"/>
                 </a:solidFill>
-              </a:rPr>
-              <a:t> a </a:t>
+                <a:latin typeface="Arial" panose="020B0604020202020204" pitchFamily="34" charset="0"/>
+                <a:cs typeface="Arial" panose="020B0604020202020204" pitchFamily="34" charset="0"/>
+              </a:rPr>
+              <a:t>a </a:t>
             </a:r>
             <a:r>
               <a:rPr lang="es-CO" sz="900" baseline="30000" dirty="0" smtClean="0">
                 <a:solidFill>
                   <a:schemeClr val="tx1"/>
                 </a:solidFill>
-                <a:cs typeface="Arial" pitchFamily="34" charset="0"/>
+                <a:latin typeface="Arial" panose="020B0604020202020204" pitchFamily="34" charset="0"/>
+                <a:cs typeface="Arial" panose="020B0604020202020204" pitchFamily="34" charset="0"/>
               </a:rPr>
               <a:t>x</a:t>
             </a:r>
@@ -1981,7 +2108,8 @@
                 <a:solidFill>
                   <a:schemeClr val="tx1"/>
                 </a:solidFill>
-                <a:cs typeface="Arial" pitchFamily="34" charset="0"/>
+                <a:latin typeface="Arial" panose="020B0604020202020204" pitchFamily="34" charset="0"/>
+                <a:cs typeface="Arial" panose="020B0604020202020204" pitchFamily="34" charset="0"/>
               </a:rPr>
               <a:t>  </a:t>
             </a:r>
@@ -1989,7 +2117,8 @@
               <a:solidFill>
                 <a:schemeClr val="tx1"/>
               </a:solidFill>
-              <a:cs typeface="Arial" pitchFamily="34" charset="0"/>
+              <a:latin typeface="Arial" panose="020B0604020202020204" pitchFamily="34" charset="0"/>
+              <a:cs typeface="Arial" panose="020B0604020202020204" pitchFamily="34" charset="0"/>
             </a:endParaRPr>
           </a:p>
         </p:txBody>
@@ -2207,15 +2336,27 @@
                 <a:solidFill>
                   <a:schemeClr val="tx1"/>
                 </a:solidFill>
-                <a:cs typeface="Arial" pitchFamily="34" charset="0"/>
-              </a:rPr>
-              <a:t>de forma grafica  </a:t>
+                <a:latin typeface="Arial" panose="020B0604020202020204" pitchFamily="34" charset="0"/>
+                <a:cs typeface="Arial" panose="020B0604020202020204" pitchFamily="34" charset="0"/>
+              </a:rPr>
+              <a:t>de forma </a:t>
+            </a:r>
+            <a:r>
+              <a:rPr lang="es-CO" sz="900" dirty="0" smtClean="0">
+                <a:solidFill>
+                  <a:schemeClr val="tx1"/>
+                </a:solidFill>
+                <a:latin typeface="Arial" panose="020B0604020202020204" pitchFamily="34" charset="0"/>
+                <a:cs typeface="Arial" panose="020B0604020202020204" pitchFamily="34" charset="0"/>
+              </a:rPr>
+              <a:t>gráfica  </a:t>
             </a:r>
             <a:endParaRPr lang="es-CO" sz="900" b="1" dirty="0">
               <a:solidFill>
                 <a:schemeClr val="tx1"/>
               </a:solidFill>
-              <a:cs typeface="Arial" pitchFamily="34" charset="0"/>
+              <a:latin typeface="Arial" panose="020B0604020202020204" pitchFamily="34" charset="0"/>
+              <a:cs typeface="Arial" panose="020B0604020202020204" pitchFamily="34" charset="0"/>
             </a:endParaRPr>
           </a:p>
         </p:txBody>
@@ -2262,7 +2403,8 @@
                 <a:solidFill>
                   <a:schemeClr val="tx1"/>
                 </a:solidFill>
-                <a:cs typeface="Arial" pitchFamily="34" charset="0"/>
+                <a:latin typeface="Arial" panose="020B0604020202020204" pitchFamily="34" charset="0"/>
+                <a:cs typeface="Arial" panose="020B0604020202020204" pitchFamily="34" charset="0"/>
               </a:rPr>
               <a:t>ejemplo    </a:t>
             </a:r>
@@ -2270,7 +2412,8 @@
               <a:solidFill>
                 <a:schemeClr val="tx1"/>
               </a:solidFill>
-              <a:cs typeface="Arial" pitchFamily="34" charset="0"/>
+              <a:latin typeface="Arial" panose="020B0604020202020204" pitchFamily="34" charset="0"/>
+              <a:cs typeface="Arial" panose="020B0604020202020204" pitchFamily="34" charset="0"/>
             </a:endParaRPr>
           </a:p>
         </p:txBody>
@@ -2393,7 +2536,8 @@
                 <a:solidFill>
                   <a:schemeClr val="tx1"/>
                 </a:solidFill>
-                <a:cs typeface="Arial" pitchFamily="34" charset="0"/>
+                <a:latin typeface="Arial" panose="020B0604020202020204" pitchFamily="34" charset="0"/>
+                <a:cs typeface="Arial" panose="020B0604020202020204" pitchFamily="34" charset="0"/>
               </a:rPr>
               <a:t>ejemplo    </a:t>
             </a:r>
@@ -2401,7 +2545,8 @@
               <a:solidFill>
                 <a:schemeClr val="tx1"/>
               </a:solidFill>
-              <a:cs typeface="Arial" pitchFamily="34" charset="0"/>
+              <a:latin typeface="Arial" panose="020B0604020202020204" pitchFamily="34" charset="0"/>
+              <a:cs typeface="Arial" panose="020B0604020202020204" pitchFamily="34" charset="0"/>
             </a:endParaRPr>
           </a:p>
         </p:txBody>
@@ -2448,16 +2593,28 @@
                 <a:solidFill>
                   <a:schemeClr val="tx1"/>
                 </a:solidFill>
-                <a:cs typeface="Arial" pitchFamily="34" charset="0"/>
-              </a:rPr>
-              <a:t>y = 3 </a:t>
+                <a:latin typeface="Arial" panose="020B0604020202020204" pitchFamily="34" charset="0"/>
+                <a:cs typeface="Arial" panose="020B0604020202020204" pitchFamily="34" charset="0"/>
+              </a:rPr>
+              <a:t>y = </a:t>
+            </a:r>
+            <a:r>
+              <a:rPr lang="es-CO" sz="900" dirty="0" smtClean="0">
+                <a:solidFill>
+                  <a:schemeClr val="tx1"/>
+                </a:solidFill>
+                <a:latin typeface="Arial" panose="020B0604020202020204" pitchFamily="34" charset="0"/>
+                <a:cs typeface="Arial" panose="020B0604020202020204" pitchFamily="34" charset="0"/>
+              </a:rPr>
+              <a:t>3</a:t>
             </a:r>
             <a:r>
               <a:rPr lang="es-CO" sz="900" baseline="30000" dirty="0" smtClean="0">
                 <a:solidFill>
                   <a:schemeClr val="tx1"/>
                 </a:solidFill>
-                <a:cs typeface="Arial" pitchFamily="34" charset="0"/>
+                <a:latin typeface="Arial" panose="020B0604020202020204" pitchFamily="34" charset="0"/>
+                <a:cs typeface="Arial" panose="020B0604020202020204" pitchFamily="34" charset="0"/>
               </a:rPr>
               <a:t>x</a:t>
             </a:r>
@@ -2466,7 +2623,8 @@
                 <a:solidFill>
                   <a:schemeClr val="tx1"/>
                 </a:solidFill>
-                <a:cs typeface="Arial" pitchFamily="34" charset="0"/>
+                <a:latin typeface="Arial" panose="020B0604020202020204" pitchFamily="34" charset="0"/>
+                <a:cs typeface="Arial" panose="020B0604020202020204" pitchFamily="34" charset="0"/>
               </a:rPr>
               <a:t>  </a:t>
             </a:r>
@@ -2474,7 +2632,8 @@
               <a:solidFill>
                 <a:schemeClr val="tx1"/>
               </a:solidFill>
-              <a:cs typeface="Arial" pitchFamily="34" charset="0"/>
+              <a:latin typeface="Arial" panose="020B0604020202020204" pitchFamily="34" charset="0"/>
+              <a:cs typeface="Arial" panose="020B0604020202020204" pitchFamily="34" charset="0"/>
             </a:endParaRPr>
           </a:p>
         </p:txBody>
@@ -2654,6 +2813,8 @@
                 <a:solidFill>
                   <a:schemeClr val="bg1"/>
                 </a:solidFill>
+                <a:latin typeface="Arial" panose="020B0604020202020204" pitchFamily="34" charset="0"/>
+                <a:cs typeface="Arial" panose="020B0604020202020204" pitchFamily="34" charset="0"/>
               </a:rPr>
               <a:t>ƒ : ℝ → ℝ </a:t>
             </a:r>
@@ -2662,6 +2823,8 @@
                 <a:solidFill>
                   <a:schemeClr val="bg1"/>
                 </a:solidFill>
+                <a:latin typeface="Arial" panose="020B0604020202020204" pitchFamily="34" charset="0"/>
+                <a:cs typeface="Arial" panose="020B0604020202020204" pitchFamily="34" charset="0"/>
               </a:rPr>
               <a:t>+</a:t>
             </a:r>
@@ -2670,7 +2833,8 @@
                 <a:solidFill>
                   <a:schemeClr val="bg1"/>
                 </a:solidFill>
-                <a:cs typeface="Arial" pitchFamily="34" charset="0"/>
+                <a:latin typeface="Arial" panose="020B0604020202020204" pitchFamily="34" charset="0"/>
+                <a:cs typeface="Arial" panose="020B0604020202020204" pitchFamily="34" charset="0"/>
               </a:rPr>
               <a:t> </a:t>
             </a:r>
@@ -2678,7 +2842,8 @@
               <a:solidFill>
                 <a:schemeClr val="bg1"/>
               </a:solidFill>
-              <a:cs typeface="Arial" pitchFamily="34" charset="0"/>
+              <a:latin typeface="Arial" panose="020B0604020202020204" pitchFamily="34" charset="0"/>
+              <a:cs typeface="Arial" panose="020B0604020202020204" pitchFamily="34" charset="0"/>
             </a:endParaRPr>
           </a:p>
           <a:p>
@@ -2688,6 +2853,8 @@
                 <a:solidFill>
                   <a:schemeClr val="bg1"/>
                 </a:solidFill>
+                <a:latin typeface="Arial" panose="020B0604020202020204" pitchFamily="34" charset="0"/>
+                <a:cs typeface="Arial" panose="020B0604020202020204" pitchFamily="34" charset="0"/>
               </a:rPr>
               <a:t>ƒ(x</a:t>
             </a:r>
@@ -2696,6 +2863,8 @@
                 <a:solidFill>
                   <a:schemeClr val="bg1"/>
                 </a:solidFill>
+                <a:latin typeface="Arial" panose="020B0604020202020204" pitchFamily="34" charset="0"/>
+                <a:cs typeface="Arial" panose="020B0604020202020204" pitchFamily="34" charset="0"/>
               </a:rPr>
               <a:t>)= log </a:t>
             </a:r>
@@ -2704,6 +2873,8 @@
                 <a:solidFill>
                   <a:schemeClr val="bg1"/>
                 </a:solidFill>
+                <a:latin typeface="Arial" panose="020B0604020202020204" pitchFamily="34" charset="0"/>
+                <a:cs typeface="Arial" panose="020B0604020202020204" pitchFamily="34" charset="0"/>
               </a:rPr>
               <a:t>a</a:t>
             </a:r>
@@ -2712,6 +2883,8 @@
                 <a:solidFill>
                   <a:schemeClr val="bg1"/>
                 </a:solidFill>
+                <a:latin typeface="Arial" panose="020B0604020202020204" pitchFamily="34" charset="0"/>
+                <a:cs typeface="Arial" panose="020B0604020202020204" pitchFamily="34" charset="0"/>
               </a:rPr>
               <a:t>a</a:t>
             </a:r>
@@ -2720,6 +2893,8 @@
                 <a:solidFill>
                   <a:schemeClr val="bg1"/>
                 </a:solidFill>
+                <a:latin typeface="Arial" panose="020B0604020202020204" pitchFamily="34" charset="0"/>
+                <a:cs typeface="Arial" panose="020B0604020202020204" pitchFamily="34" charset="0"/>
               </a:rPr>
               <a:t> </a:t>
             </a:r>
@@ -2728,6 +2903,8 @@
                 <a:solidFill>
                   <a:schemeClr val="bg1"/>
                 </a:solidFill>
+                <a:latin typeface="Arial" panose="020B0604020202020204" pitchFamily="34" charset="0"/>
+                <a:cs typeface="Arial" panose="020B0604020202020204" pitchFamily="34" charset="0"/>
               </a:rPr>
               <a:t>x</a:t>
             </a:r>
@@ -2736,6 +2913,8 @@
                 <a:solidFill>
                   <a:schemeClr val="bg1"/>
                 </a:solidFill>
+                <a:latin typeface="Arial" panose="020B0604020202020204" pitchFamily="34" charset="0"/>
+                <a:cs typeface="Arial" panose="020B0604020202020204" pitchFamily="34" charset="0"/>
               </a:rPr>
               <a:t>, </a:t>
             </a:r>
@@ -2744,7 +2923,8 @@
                 <a:solidFill>
                   <a:schemeClr val="bg1"/>
                 </a:solidFill>
-                <a:cs typeface="Arial" pitchFamily="34" charset="0"/>
+                <a:latin typeface="Arial" panose="020B0604020202020204" pitchFamily="34" charset="0"/>
+                <a:cs typeface="Arial" panose="020B0604020202020204" pitchFamily="34" charset="0"/>
               </a:rPr>
               <a:t>a∈</a:t>
             </a:r>
@@ -2753,6 +2933,8 @@
                 <a:solidFill>
                   <a:schemeClr val="bg1"/>
                 </a:solidFill>
+                <a:latin typeface="Arial" panose="020B0604020202020204" pitchFamily="34" charset="0"/>
+                <a:cs typeface="Arial" panose="020B0604020202020204" pitchFamily="34" charset="0"/>
               </a:rPr>
               <a:t> ℝ </a:t>
             </a:r>
@@ -2761,6 +2943,8 @@
                 <a:solidFill>
                   <a:schemeClr val="bg1"/>
                 </a:solidFill>
+                <a:latin typeface="Arial" panose="020B0604020202020204" pitchFamily="34" charset="0"/>
+                <a:cs typeface="Arial" panose="020B0604020202020204" pitchFamily="34" charset="0"/>
               </a:rPr>
               <a:t>+</a:t>
             </a:r>
@@ -2769,6 +2953,8 @@
                 <a:solidFill>
                   <a:schemeClr val="bg1"/>
                 </a:solidFill>
+                <a:latin typeface="Arial" panose="020B0604020202020204" pitchFamily="34" charset="0"/>
+                <a:cs typeface="Arial" panose="020B0604020202020204" pitchFamily="34" charset="0"/>
               </a:rPr>
               <a:t>  , </a:t>
             </a:r>
@@ -2777,6 +2963,8 @@
                 <a:solidFill>
                   <a:schemeClr val="bg1"/>
                 </a:solidFill>
+                <a:latin typeface="Arial" panose="020B0604020202020204" pitchFamily="34" charset="0"/>
+                <a:cs typeface="Arial" panose="020B0604020202020204" pitchFamily="34" charset="0"/>
               </a:rPr>
               <a:t>a </a:t>
             </a:r>
@@ -2785,6 +2973,8 @@
                 <a:solidFill>
                   <a:schemeClr val="bg1"/>
                 </a:solidFill>
+                <a:latin typeface="Arial" panose="020B0604020202020204" pitchFamily="34" charset="0"/>
+                <a:cs typeface="Arial" panose="020B0604020202020204" pitchFamily="34" charset="0"/>
               </a:rPr>
               <a:t>≠ 1</a:t>
             </a:r>
@@ -2792,6 +2982,8 @@
               <a:solidFill>
                 <a:schemeClr val="bg1"/>
               </a:solidFill>
+              <a:latin typeface="Arial" panose="020B0604020202020204" pitchFamily="34" charset="0"/>
+              <a:cs typeface="Arial" panose="020B0604020202020204" pitchFamily="34" charset="0"/>
             </a:endParaRPr>
           </a:p>
         </p:txBody>
@@ -2837,7 +3029,8 @@
                 <a:solidFill>
                   <a:srgbClr val="FF0000"/>
                 </a:solidFill>
-                <a:cs typeface="Arial" pitchFamily="34" charset="0"/>
+                <a:latin typeface="Arial" panose="020B0604020202020204" pitchFamily="34" charset="0"/>
+                <a:cs typeface="Arial" panose="020B0604020202020204" pitchFamily="34" charset="0"/>
               </a:rPr>
               <a:t>    </a:t>
             </a:r>
@@ -2845,19 +3038,22 @@
           <a:p>
             <a:pPr algn="ctr"/>
             <a:r>
-              <a:rPr lang="es-CO" sz="900" smtClean="0">
-                <a:solidFill>
-                  <a:schemeClr val="tx1"/>
-                </a:solidFill>
-                <a:cs typeface="Arial" pitchFamily="34" charset="0"/>
+              <a:rPr lang="es-CO" sz="900" dirty="0" smtClean="0">
+                <a:solidFill>
+                  <a:schemeClr val="tx1"/>
+                </a:solidFill>
+                <a:latin typeface="Arial" panose="020B0604020202020204" pitchFamily="34" charset="0"/>
+                <a:cs typeface="Arial" panose="020B0604020202020204" pitchFamily="34" charset="0"/>
               </a:rPr>
               <a:t>0 &lt; </a:t>
             </a:r>
             <a:r>
-              <a:rPr lang="es-ES_tradnl" sz="900" i="1" smtClean="0">
-                <a:solidFill>
-                  <a:schemeClr val="tx1"/>
-                </a:solidFill>
+              <a:rPr lang="es-ES_tradnl" sz="900" i="1" dirty="0" smtClean="0">
+                <a:solidFill>
+                  <a:schemeClr val="tx1"/>
+                </a:solidFill>
+                <a:latin typeface="Arial" panose="020B0604020202020204" pitchFamily="34" charset="0"/>
+                <a:cs typeface="Arial" panose="020B0604020202020204" pitchFamily="34" charset="0"/>
               </a:rPr>
               <a:t>a </a:t>
             </a:r>
@@ -2866,7 +3062,8 @@
                 <a:solidFill>
                   <a:schemeClr val="tx1"/>
                 </a:solidFill>
-                <a:cs typeface="Arial" pitchFamily="34" charset="0"/>
+                <a:latin typeface="Arial" panose="020B0604020202020204" pitchFamily="34" charset="0"/>
+                <a:cs typeface="Arial" panose="020B0604020202020204" pitchFamily="34" charset="0"/>
               </a:rPr>
               <a:t>&lt; 1 </a:t>
             </a:r>
@@ -2875,9 +3072,30 @@
                 <a:solidFill>
                   <a:schemeClr val="tx1"/>
                 </a:solidFill>
-                <a:cs typeface="Arial" pitchFamily="34" charset="0"/>
-              </a:rPr>
-              <a:t>la grafica es decreciente   </a:t>
+                <a:latin typeface="Arial" panose="020B0604020202020204" pitchFamily="34" charset="0"/>
+                <a:cs typeface="Arial" panose="020B0604020202020204" pitchFamily="34" charset="0"/>
+              </a:rPr>
+              <a:t>la </a:t>
+            </a:r>
+            <a:r>
+              <a:rPr lang="es-CO" sz="900" dirty="0" smtClean="0">
+                <a:solidFill>
+                  <a:schemeClr val="tx1"/>
+                </a:solidFill>
+                <a:latin typeface="Arial" panose="020B0604020202020204" pitchFamily="34" charset="0"/>
+                <a:cs typeface="Arial" panose="020B0604020202020204" pitchFamily="34" charset="0"/>
+              </a:rPr>
+              <a:t>gráfica </a:t>
+            </a:r>
+            <a:r>
+              <a:rPr lang="es-CO" sz="900" dirty="0">
+                <a:solidFill>
+                  <a:schemeClr val="tx1"/>
+                </a:solidFill>
+                <a:latin typeface="Arial" panose="020B0604020202020204" pitchFamily="34" charset="0"/>
+                <a:cs typeface="Arial" panose="020B0604020202020204" pitchFamily="34" charset="0"/>
+              </a:rPr>
+              <a:t>es decreciente   </a:t>
             </a:r>
           </a:p>
           <a:p>
@@ -2887,7 +3105,8 @@
                 <a:solidFill>
                   <a:srgbClr val="FF0000"/>
                 </a:solidFill>
-                <a:cs typeface="Arial" pitchFamily="34" charset="0"/>
+                <a:latin typeface="Arial" panose="020B0604020202020204" pitchFamily="34" charset="0"/>
+                <a:cs typeface="Arial" panose="020B0604020202020204" pitchFamily="34" charset="0"/>
               </a:rPr>
               <a:t> </a:t>
             </a:r>
@@ -2895,7 +3114,8 @@
               <a:solidFill>
                 <a:srgbClr val="FF0000"/>
               </a:solidFill>
-              <a:cs typeface="Arial" pitchFamily="34" charset="0"/>
+              <a:latin typeface="Arial" panose="020B0604020202020204" pitchFamily="34" charset="0"/>
+              <a:cs typeface="Arial" panose="020B0604020202020204" pitchFamily="34" charset="0"/>
             </a:endParaRPr>
           </a:p>
         </p:txBody>
@@ -2976,7 +3196,8 @@
                 <a:solidFill>
                   <a:srgbClr val="FF0000"/>
                 </a:solidFill>
-                <a:cs typeface="Arial" pitchFamily="34" charset="0"/>
+                <a:latin typeface="Arial" panose="020B0604020202020204" pitchFamily="34" charset="0"/>
+                <a:cs typeface="Arial" panose="020B0604020202020204" pitchFamily="34" charset="0"/>
               </a:rPr>
               <a:t> </a:t>
             </a:r>
@@ -2987,7 +3208,8 @@
               <a:solidFill>
                 <a:srgbClr val="FF0000"/>
               </a:solidFill>
-              <a:cs typeface="Arial" pitchFamily="34" charset="0"/>
+              <a:latin typeface="Arial" panose="020B0604020202020204" pitchFamily="34" charset="0"/>
+              <a:cs typeface="Arial" panose="020B0604020202020204" pitchFamily="34" charset="0"/>
             </a:endParaRPr>
           </a:p>
           <a:p>
@@ -2997,6 +3219,8 @@
                 <a:solidFill>
                   <a:schemeClr val="tx1"/>
                 </a:solidFill>
+                <a:latin typeface="Arial" panose="020B0604020202020204" pitchFamily="34" charset="0"/>
+                <a:cs typeface="Arial" panose="020B0604020202020204" pitchFamily="34" charset="0"/>
               </a:rPr>
               <a:t>a</a:t>
             </a:r>
@@ -3005,7 +3229,8 @@
                 <a:solidFill>
                   <a:schemeClr val="tx1"/>
                 </a:solidFill>
-                <a:cs typeface="Arial" pitchFamily="34" charset="0"/>
+                <a:latin typeface="Arial" panose="020B0604020202020204" pitchFamily="34" charset="0"/>
+                <a:cs typeface="Arial" panose="020B0604020202020204" pitchFamily="34" charset="0"/>
               </a:rPr>
               <a:t> &gt; 1 </a:t>
             </a:r>
@@ -3014,9 +3239,30 @@
                 <a:solidFill>
                   <a:schemeClr val="tx1"/>
                 </a:solidFill>
-                <a:cs typeface="Arial" pitchFamily="34" charset="0"/>
-              </a:rPr>
-              <a:t>la grafica es creciente </a:t>
+                <a:latin typeface="Arial" panose="020B0604020202020204" pitchFamily="34" charset="0"/>
+                <a:cs typeface="Arial" panose="020B0604020202020204" pitchFamily="34" charset="0"/>
+              </a:rPr>
+              <a:t>la </a:t>
+            </a:r>
+            <a:r>
+              <a:rPr lang="es-CO" sz="900" dirty="0" smtClean="0">
+                <a:solidFill>
+                  <a:schemeClr val="tx1"/>
+                </a:solidFill>
+                <a:latin typeface="Arial" panose="020B0604020202020204" pitchFamily="34" charset="0"/>
+                <a:cs typeface="Arial" panose="020B0604020202020204" pitchFamily="34" charset="0"/>
+              </a:rPr>
+              <a:t>gráfica </a:t>
+            </a:r>
+            <a:r>
+              <a:rPr lang="es-CO" sz="900" dirty="0">
+                <a:solidFill>
+                  <a:schemeClr val="tx1"/>
+                </a:solidFill>
+                <a:latin typeface="Arial" panose="020B0604020202020204" pitchFamily="34" charset="0"/>
+                <a:cs typeface="Arial" panose="020B0604020202020204" pitchFamily="34" charset="0"/>
+              </a:rPr>
+              <a:t>es creciente </a:t>
             </a:r>
           </a:p>
           <a:p>
@@ -3025,7 +3271,8 @@
               <a:solidFill>
                 <a:srgbClr val="FF0000"/>
               </a:solidFill>
-              <a:cs typeface="Arial" pitchFamily="34" charset="0"/>
+              <a:latin typeface="Arial" panose="020B0604020202020204" pitchFamily="34" charset="0"/>
+              <a:cs typeface="Arial" panose="020B0604020202020204" pitchFamily="34" charset="0"/>
             </a:endParaRPr>
           </a:p>
           <a:p>
@@ -3035,7 +3282,8 @@
                 <a:solidFill>
                   <a:srgbClr val="FF0000"/>
                 </a:solidFill>
-                <a:cs typeface="Arial" pitchFamily="34" charset="0"/>
+                <a:latin typeface="Arial" panose="020B0604020202020204" pitchFamily="34" charset="0"/>
+                <a:cs typeface="Arial" panose="020B0604020202020204" pitchFamily="34" charset="0"/>
               </a:rPr>
               <a:t> </a:t>
             </a:r>
@@ -3043,7 +3291,8 @@
               <a:solidFill>
                 <a:srgbClr val="FF0000"/>
               </a:solidFill>
-              <a:cs typeface="Arial" pitchFamily="34" charset="0"/>
+              <a:latin typeface="Arial" panose="020B0604020202020204" pitchFamily="34" charset="0"/>
+              <a:cs typeface="Arial" panose="020B0604020202020204" pitchFamily="34" charset="0"/>
             </a:endParaRPr>
           </a:p>
         </p:txBody>
@@ -3556,7 +3805,8 @@
               <a:solidFill>
                 <a:schemeClr val="tx1"/>
               </a:solidFill>
-              <a:cs typeface="Arial" pitchFamily="34" charset="0"/>
+              <a:latin typeface="Arial" panose="020B0604020202020204" pitchFamily="34" charset="0"/>
+              <a:cs typeface="Arial" panose="020B0604020202020204" pitchFamily="34" charset="0"/>
             </a:endParaRPr>
           </a:p>
           <a:p>
@@ -3566,7 +3816,8 @@
                 <a:solidFill>
                   <a:schemeClr val="tx1"/>
                 </a:solidFill>
-                <a:cs typeface="Arial" pitchFamily="34" charset="0"/>
+                <a:latin typeface="Arial" panose="020B0604020202020204" pitchFamily="34" charset="0"/>
+                <a:cs typeface="Arial" panose="020B0604020202020204" pitchFamily="34" charset="0"/>
               </a:rPr>
               <a:t>Dominio   </a:t>
             </a:r>
@@ -3575,6 +3826,8 @@
                 <a:solidFill>
                   <a:schemeClr val="tx1"/>
                 </a:solidFill>
+                <a:latin typeface="Arial" panose="020B0604020202020204" pitchFamily="34" charset="0"/>
+                <a:cs typeface="Arial" panose="020B0604020202020204" pitchFamily="34" charset="0"/>
               </a:rPr>
               <a:t>ℝ</a:t>
             </a:r>
@@ -3586,7 +3839,8 @@
                 <a:solidFill>
                   <a:schemeClr val="tx1"/>
                 </a:solidFill>
-                <a:cs typeface="Arial" pitchFamily="34" charset="0"/>
+                <a:latin typeface="Arial" panose="020B0604020202020204" pitchFamily="34" charset="0"/>
+                <a:cs typeface="Arial" panose="020B0604020202020204" pitchFamily="34" charset="0"/>
               </a:rPr>
               <a:t>  Rango   </a:t>
             </a:r>
@@ -3595,6 +3849,8 @@
                 <a:solidFill>
                   <a:schemeClr val="tx1"/>
                 </a:solidFill>
+                <a:latin typeface="Arial" panose="020B0604020202020204" pitchFamily="34" charset="0"/>
+                <a:cs typeface="Arial" panose="020B0604020202020204" pitchFamily="34" charset="0"/>
               </a:rPr>
               <a:t>ℝ</a:t>
             </a:r>
@@ -3603,7 +3859,8 @@
                 <a:solidFill>
                   <a:schemeClr val="tx1"/>
                 </a:solidFill>
-                <a:cs typeface="Arial" pitchFamily="34" charset="0"/>
+                <a:latin typeface="Arial" panose="020B0604020202020204" pitchFamily="34" charset="0"/>
+                <a:cs typeface="Arial" panose="020B0604020202020204" pitchFamily="34" charset="0"/>
               </a:rPr>
               <a:t> </a:t>
             </a:r>
@@ -3612,7 +3869,8 @@
                 <a:solidFill>
                   <a:schemeClr val="tx1"/>
                 </a:solidFill>
-                <a:cs typeface="Arial" pitchFamily="34" charset="0"/>
+                <a:latin typeface="Arial" panose="020B0604020202020204" pitchFamily="34" charset="0"/>
+                <a:cs typeface="Arial" panose="020B0604020202020204" pitchFamily="34" charset="0"/>
               </a:rPr>
               <a:t>+</a:t>
             </a:r>
@@ -3621,7 +3879,8 @@
                 <a:solidFill>
                   <a:schemeClr val="tx1"/>
                 </a:solidFill>
-                <a:cs typeface="Arial" pitchFamily="34" charset="0"/>
+                <a:latin typeface="Arial" panose="020B0604020202020204" pitchFamily="34" charset="0"/>
+                <a:cs typeface="Arial" panose="020B0604020202020204" pitchFamily="34" charset="0"/>
               </a:rPr>
               <a:t>  </a:t>
             </a:r>
@@ -3629,7 +3888,8 @@
               <a:solidFill>
                 <a:schemeClr val="tx1"/>
               </a:solidFill>
-              <a:cs typeface="Arial" pitchFamily="34" charset="0"/>
+              <a:latin typeface="Arial" panose="020B0604020202020204" pitchFamily="34" charset="0"/>
+              <a:cs typeface="Arial" panose="020B0604020202020204" pitchFamily="34" charset="0"/>
             </a:endParaRPr>
           </a:p>
           <a:p>
@@ -3638,7 +3898,8 @@
               <a:solidFill>
                 <a:schemeClr val="tx1"/>
               </a:solidFill>
-              <a:cs typeface="Arial" pitchFamily="34" charset="0"/>
+              <a:latin typeface="Arial" panose="020B0604020202020204" pitchFamily="34" charset="0"/>
+              <a:cs typeface="Arial" panose="020B0604020202020204" pitchFamily="34" charset="0"/>
             </a:endParaRPr>
           </a:p>
         </p:txBody>
@@ -3727,7 +3988,8 @@
                 <a:solidFill>
                   <a:schemeClr val="tx1"/>
                 </a:solidFill>
-                <a:cs typeface="Arial" pitchFamily="34" charset="0"/>
+                <a:latin typeface="Arial" panose="020B0604020202020204" pitchFamily="34" charset="0"/>
+                <a:cs typeface="Arial" panose="020B0604020202020204" pitchFamily="34" charset="0"/>
               </a:rPr>
               <a:t>  </a:t>
             </a:r>
@@ -3735,7 +3997,8 @@
               <a:solidFill>
                 <a:schemeClr val="tx1"/>
               </a:solidFill>
-              <a:cs typeface="Arial" pitchFamily="34" charset="0"/>
+              <a:latin typeface="Arial" panose="020B0604020202020204" pitchFamily="34" charset="0"/>
+              <a:cs typeface="Arial" panose="020B0604020202020204" pitchFamily="34" charset="0"/>
             </a:endParaRPr>
           </a:p>
           <a:p>
@@ -3745,7 +4008,8 @@
                 <a:solidFill>
                   <a:schemeClr val="tx1"/>
                 </a:solidFill>
-                <a:cs typeface="Arial" pitchFamily="34" charset="0"/>
+                <a:latin typeface="Arial" panose="020B0604020202020204" pitchFamily="34" charset="0"/>
+                <a:cs typeface="Arial" panose="020B0604020202020204" pitchFamily="34" charset="0"/>
               </a:rPr>
               <a:t>Continuas  en    </a:t>
             </a:r>
@@ -3757,6 +4021,8 @@
                 <a:solidFill>
                   <a:schemeClr val="tx1"/>
                 </a:solidFill>
+                <a:latin typeface="Arial" panose="020B0604020202020204" pitchFamily="34" charset="0"/>
+                <a:cs typeface="Arial" panose="020B0604020202020204" pitchFamily="34" charset="0"/>
               </a:rPr>
               <a:t>ℝ</a:t>
             </a:r>
@@ -3765,7 +4031,8 @@
                 <a:solidFill>
                   <a:schemeClr val="tx1"/>
                 </a:solidFill>
-                <a:cs typeface="Arial" pitchFamily="34" charset="0"/>
+                <a:latin typeface="Arial" panose="020B0604020202020204" pitchFamily="34" charset="0"/>
+                <a:cs typeface="Arial" panose="020B0604020202020204" pitchFamily="34" charset="0"/>
               </a:rPr>
               <a:t> </a:t>
             </a:r>
@@ -3774,7 +4041,8 @@
                 <a:solidFill>
                   <a:schemeClr val="tx1"/>
                 </a:solidFill>
-                <a:cs typeface="Arial" pitchFamily="34" charset="0"/>
+                <a:latin typeface="Arial" panose="020B0604020202020204" pitchFamily="34" charset="0"/>
+                <a:cs typeface="Arial" panose="020B0604020202020204" pitchFamily="34" charset="0"/>
               </a:rPr>
               <a:t>+</a:t>
             </a:r>
@@ -3783,7 +4051,8 @@
                 <a:solidFill>
                   <a:schemeClr val="tx1"/>
                 </a:solidFill>
-                <a:cs typeface="Arial" pitchFamily="34" charset="0"/>
+                <a:latin typeface="Arial" panose="020B0604020202020204" pitchFamily="34" charset="0"/>
+                <a:cs typeface="Arial" panose="020B0604020202020204" pitchFamily="34" charset="0"/>
               </a:rPr>
               <a:t>  </a:t>
             </a:r>
@@ -3791,7 +4060,8 @@
               <a:solidFill>
                 <a:schemeClr val="tx1"/>
               </a:solidFill>
-              <a:cs typeface="Arial" pitchFamily="34" charset="0"/>
+              <a:latin typeface="Arial" panose="020B0604020202020204" pitchFamily="34" charset="0"/>
+              <a:cs typeface="Arial" panose="020B0604020202020204" pitchFamily="34" charset="0"/>
             </a:endParaRPr>
           </a:p>
           <a:p>
@@ -3800,7 +4070,8 @@
               <a:solidFill>
                 <a:schemeClr val="tx1"/>
               </a:solidFill>
-              <a:cs typeface="Arial" pitchFamily="34" charset="0"/>
+              <a:latin typeface="Arial" panose="020B0604020202020204" pitchFamily="34" charset="0"/>
+              <a:cs typeface="Arial" panose="020B0604020202020204" pitchFamily="34" charset="0"/>
             </a:endParaRPr>
           </a:p>
         </p:txBody>
@@ -3849,7 +4120,8 @@
                 <a:solidFill>
                   <a:schemeClr val="tx1"/>
                 </a:solidFill>
-                <a:cs typeface="Arial" pitchFamily="34" charset="0"/>
+                <a:latin typeface="Arial" panose="020B0604020202020204" pitchFamily="34" charset="0"/>
+                <a:cs typeface="Arial" panose="020B0604020202020204" pitchFamily="34" charset="0"/>
               </a:rPr>
               <a:t>  </a:t>
             </a:r>
@@ -3857,7 +4129,8 @@
               <a:solidFill>
                 <a:schemeClr val="tx1"/>
               </a:solidFill>
-              <a:cs typeface="Arial" pitchFamily="34" charset="0"/>
+              <a:latin typeface="Arial" panose="020B0604020202020204" pitchFamily="34" charset="0"/>
+              <a:cs typeface="Arial" panose="020B0604020202020204" pitchFamily="34" charset="0"/>
             </a:endParaRPr>
           </a:p>
           <a:p>
@@ -3866,7 +4139,8 @@
                 <a:solidFill>
                   <a:schemeClr val="tx1"/>
                 </a:solidFill>
-                <a:cs typeface="Arial" pitchFamily="34" charset="0"/>
+                <a:latin typeface="Arial" panose="020B0604020202020204" pitchFamily="34" charset="0"/>
+                <a:cs typeface="Arial" panose="020B0604020202020204" pitchFamily="34" charset="0"/>
               </a:rPr>
               <a:t>Corta al eje Y en 1 , No corta al eje X</a:t>
             </a:r>
@@ -3877,7 +4151,8 @@
               <a:solidFill>
                 <a:schemeClr val="tx1"/>
               </a:solidFill>
-              <a:cs typeface="Arial" pitchFamily="34" charset="0"/>
+              <a:latin typeface="Arial" panose="020B0604020202020204" pitchFamily="34" charset="0"/>
+              <a:cs typeface="Arial" panose="020B0604020202020204" pitchFamily="34" charset="0"/>
             </a:endParaRPr>
           </a:p>
         </p:txBody>
@@ -3924,7 +4199,8 @@
                 <a:solidFill>
                   <a:schemeClr val="tx1"/>
                 </a:solidFill>
-                <a:cs typeface="Arial" pitchFamily="34" charset="0"/>
+                <a:latin typeface="Arial" panose="020B0604020202020204" pitchFamily="34" charset="0"/>
+                <a:cs typeface="Arial" panose="020B0604020202020204" pitchFamily="34" charset="0"/>
               </a:rPr>
               <a:t>se puede representar  </a:t>
             </a:r>
@@ -3932,7 +4208,8 @@
               <a:solidFill>
                 <a:schemeClr val="tx1"/>
               </a:solidFill>
-              <a:cs typeface="Arial" pitchFamily="34" charset="0"/>
+              <a:latin typeface="Arial" panose="020B0604020202020204" pitchFamily="34" charset="0"/>
+              <a:cs typeface="Arial" panose="020B0604020202020204" pitchFamily="34" charset="0"/>
             </a:endParaRPr>
           </a:p>
         </p:txBody>
@@ -4045,7 +4322,8 @@
                 <a:solidFill>
                   <a:schemeClr val="tx1"/>
                 </a:solidFill>
-                <a:cs typeface="Arial" pitchFamily="34" charset="0"/>
+                <a:latin typeface="Arial" panose="020B0604020202020204" pitchFamily="34" charset="0"/>
+                <a:cs typeface="Arial" panose="020B0604020202020204" pitchFamily="34" charset="0"/>
               </a:rPr>
               <a:t>de forma algebraica </a:t>
             </a:r>
@@ -4053,7 +4331,8 @@
               <a:solidFill>
                 <a:schemeClr val="tx1"/>
               </a:solidFill>
-              <a:cs typeface="Arial" pitchFamily="34" charset="0"/>
+              <a:latin typeface="Arial" panose="020B0604020202020204" pitchFamily="34" charset="0"/>
+              <a:cs typeface="Arial" panose="020B0604020202020204" pitchFamily="34" charset="0"/>
             </a:endParaRPr>
           </a:p>
         </p:txBody>
@@ -4218,7 +4497,8 @@
                 <a:solidFill>
                   <a:schemeClr val="tx1"/>
                 </a:solidFill>
-                <a:cs typeface="Arial" pitchFamily="34" charset="0"/>
+                <a:latin typeface="Arial" panose="020B0604020202020204" pitchFamily="34" charset="0"/>
+                <a:cs typeface="Arial" panose="020B0604020202020204" pitchFamily="34" charset="0"/>
               </a:rPr>
               <a:t>determina una   </a:t>
             </a:r>
@@ -4226,7 +4506,8 @@
               <a:solidFill>
                 <a:schemeClr val="tx1"/>
               </a:solidFill>
-              <a:cs typeface="Arial" pitchFamily="34" charset="0"/>
+              <a:latin typeface="Arial" panose="020B0604020202020204" pitchFamily="34" charset="0"/>
+              <a:cs typeface="Arial" panose="020B0604020202020204" pitchFamily="34" charset="0"/>
             </a:endParaRPr>
           </a:p>
         </p:txBody>
@@ -4313,15 +4594,27 @@
                 <a:solidFill>
                   <a:schemeClr val="tx1"/>
                 </a:solidFill>
-                <a:cs typeface="Arial" pitchFamily="34" charset="0"/>
-              </a:rPr>
-              <a:t>de forma grafica  </a:t>
+                <a:latin typeface="Arial" panose="020B0604020202020204" pitchFamily="34" charset="0"/>
+                <a:cs typeface="Arial" panose="020B0604020202020204" pitchFamily="34" charset="0"/>
+              </a:rPr>
+              <a:t>de forma </a:t>
+            </a:r>
+            <a:r>
+              <a:rPr lang="es-CO" sz="900" dirty="0" smtClean="0">
+                <a:solidFill>
+                  <a:schemeClr val="tx1"/>
+                </a:solidFill>
+                <a:latin typeface="Arial" panose="020B0604020202020204" pitchFamily="34" charset="0"/>
+                <a:cs typeface="Arial" panose="020B0604020202020204" pitchFamily="34" charset="0"/>
+              </a:rPr>
+              <a:t>gráfica  </a:t>
             </a:r>
             <a:endParaRPr lang="es-CO" sz="900" b="1" dirty="0">
               <a:solidFill>
                 <a:schemeClr val="tx1"/>
               </a:solidFill>
-              <a:cs typeface="Arial" pitchFamily="34" charset="0"/>
+              <a:latin typeface="Arial" panose="020B0604020202020204" pitchFamily="34" charset="0"/>
+              <a:cs typeface="Arial" panose="020B0604020202020204" pitchFamily="34" charset="0"/>
             </a:endParaRPr>
           </a:p>
         </p:txBody>
@@ -4368,32 +4661,47 @@
                 <a:solidFill>
                   <a:schemeClr val="tx1"/>
                 </a:solidFill>
-                <a:cs typeface="Arial" pitchFamily="34" charset="0"/>
+                <a:latin typeface="Arial" panose="020B0604020202020204" pitchFamily="34" charset="0"/>
+                <a:cs typeface="Arial" panose="020B0604020202020204" pitchFamily="34" charset="0"/>
               </a:rPr>
               <a:t>ecuación  logarítmica            y = log</a:t>
             </a:r>
             <a:r>
-              <a:rPr lang="es-ES_tradnl" sz="900" i="1" baseline="-25000" dirty="0">
-                <a:solidFill>
-                  <a:schemeClr val="tx1"/>
-                </a:solidFill>
-              </a:rPr>
-              <a:t>a</a:t>
-            </a:r>
-            <a:r>
-              <a:rPr lang="es-CO" sz="900" dirty="0" smtClean="0">
-                <a:solidFill>
-                  <a:schemeClr val="tx1"/>
-                </a:solidFill>
-                <a:cs typeface="Arial" pitchFamily="34" charset="0"/>
-              </a:rPr>
-              <a:t>x  </a:t>
+              <a:rPr lang="es-ES_tradnl" sz="900" i="1" baseline="-25000" dirty="0" smtClean="0">
+                <a:solidFill>
+                  <a:schemeClr val="tx1"/>
+                </a:solidFill>
+                <a:latin typeface="Arial" panose="020B0604020202020204" pitchFamily="34" charset="0"/>
+                <a:cs typeface="Arial" panose="020B0604020202020204" pitchFamily="34" charset="0"/>
+              </a:rPr>
+              <a:t>a </a:t>
+            </a:r>
+            <a:r>
+              <a:rPr lang="es-CO" sz="900" i="1" dirty="0" smtClean="0">
+                <a:solidFill>
+                  <a:schemeClr val="tx1"/>
+                </a:solidFill>
+                <a:latin typeface="Arial" panose="020B0604020202020204" pitchFamily="34" charset="0"/>
+                <a:cs typeface="Arial" panose="020B0604020202020204" pitchFamily="34" charset="0"/>
+              </a:rPr>
+              <a:t>x</a:t>
+            </a:r>
+            <a:r>
+              <a:rPr lang="es-CO" sz="900" dirty="0" smtClean="0">
+                <a:solidFill>
+                  <a:schemeClr val="tx1"/>
+                </a:solidFill>
+                <a:latin typeface="Arial" panose="020B0604020202020204" pitchFamily="34" charset="0"/>
+                <a:cs typeface="Arial" panose="020B0604020202020204" pitchFamily="34" charset="0"/>
+              </a:rPr>
+              <a:t>  </a:t>
             </a:r>
             <a:endParaRPr lang="es-CO" sz="900" dirty="0">
               <a:solidFill>
                 <a:schemeClr val="tx1"/>
               </a:solidFill>
-              <a:cs typeface="Arial" pitchFamily="34" charset="0"/>
+              <a:latin typeface="Arial" panose="020B0604020202020204" pitchFamily="34" charset="0"/>
+              <a:cs typeface="Arial" panose="020B0604020202020204" pitchFamily="34" charset="0"/>
             </a:endParaRPr>
           </a:p>
         </p:txBody>
@@ -4477,7 +4785,8 @@
                 <a:solidFill>
                   <a:schemeClr val="tx1"/>
                 </a:solidFill>
-                <a:cs typeface="Arial" pitchFamily="34" charset="0"/>
+                <a:latin typeface="Arial" panose="020B0604020202020204" pitchFamily="34" charset="0"/>
+                <a:cs typeface="Arial" panose="020B0604020202020204" pitchFamily="34" charset="0"/>
               </a:rPr>
               <a:t>ejemplo    </a:t>
             </a:r>
@@ -4485,7 +4794,8 @@
               <a:solidFill>
                 <a:schemeClr val="tx1"/>
               </a:solidFill>
-              <a:cs typeface="Arial" pitchFamily="34" charset="0"/>
+              <a:latin typeface="Arial" panose="020B0604020202020204" pitchFamily="34" charset="0"/>
+              <a:cs typeface="Arial" panose="020B0604020202020204" pitchFamily="34" charset="0"/>
             </a:endParaRPr>
           </a:p>
         </p:txBody>
@@ -4569,7 +4879,8 @@
                 <a:solidFill>
                   <a:schemeClr val="tx1"/>
                 </a:solidFill>
-                <a:cs typeface="Arial" pitchFamily="34" charset="0"/>
+                <a:latin typeface="Arial" panose="020B0604020202020204" pitchFamily="34" charset="0"/>
+                <a:cs typeface="Arial" panose="020B0604020202020204" pitchFamily="34" charset="0"/>
               </a:rPr>
               <a:t>y =log </a:t>
             </a:r>
@@ -4578,7 +4889,8 @@
                 <a:solidFill>
                   <a:schemeClr val="tx1"/>
                 </a:solidFill>
-                <a:cs typeface="Arial" pitchFamily="34" charset="0"/>
+                <a:latin typeface="Arial" panose="020B0604020202020204" pitchFamily="34" charset="0"/>
+                <a:cs typeface="Arial" panose="020B0604020202020204" pitchFamily="34" charset="0"/>
               </a:rPr>
               <a:t>3</a:t>
             </a:r>
@@ -4587,7 +4899,8 @@
                 <a:solidFill>
                   <a:schemeClr val="tx1"/>
                 </a:solidFill>
-                <a:cs typeface="Arial" pitchFamily="34" charset="0"/>
+                <a:latin typeface="Arial" panose="020B0604020202020204" pitchFamily="34" charset="0"/>
+                <a:cs typeface="Arial" panose="020B0604020202020204" pitchFamily="34" charset="0"/>
               </a:rPr>
               <a:t> x  </a:t>
             </a:r>
@@ -4595,7 +4908,8 @@
               <a:solidFill>
                 <a:schemeClr val="tx1"/>
               </a:solidFill>
-              <a:cs typeface="Arial" pitchFamily="34" charset="0"/>
+              <a:latin typeface="Arial" panose="020B0604020202020204" pitchFamily="34" charset="0"/>
+              <a:cs typeface="Arial" panose="020B0604020202020204" pitchFamily="34" charset="0"/>
             </a:endParaRPr>
           </a:p>
         </p:txBody>
@@ -4717,7 +5031,8 @@
                 <a:solidFill>
                   <a:schemeClr val="tx1"/>
                 </a:solidFill>
-                <a:cs typeface="Arial" pitchFamily="34" charset="0"/>
+                <a:latin typeface="Arial" panose="020B0604020202020204" pitchFamily="34" charset="0"/>
+                <a:cs typeface="Arial" panose="020B0604020202020204" pitchFamily="34" charset="0"/>
               </a:rPr>
               <a:t>ejemplo    </a:t>
             </a:r>
@@ -4725,7 +5040,8 @@
               <a:solidFill>
                 <a:schemeClr val="tx1"/>
               </a:solidFill>
-              <a:cs typeface="Arial" pitchFamily="34" charset="0"/>
+              <a:latin typeface="Arial" panose="020B0604020202020204" pitchFamily="34" charset="0"/>
+              <a:cs typeface="Arial" panose="020B0604020202020204" pitchFamily="34" charset="0"/>
             </a:endParaRPr>
           </a:p>
         </p:txBody>
@@ -4808,7 +5124,8 @@
                 <a:solidFill>
                   <a:srgbClr val="FF0000"/>
                 </a:solidFill>
-                <a:cs typeface="Arial" pitchFamily="34" charset="0"/>
+                <a:latin typeface="Arial" panose="020B0604020202020204" pitchFamily="34" charset="0"/>
+                <a:cs typeface="Arial" panose="020B0604020202020204" pitchFamily="34" charset="0"/>
               </a:rPr>
               <a:t>    </a:t>
             </a:r>
@@ -4820,7 +5137,8 @@
                 <a:solidFill>
                   <a:schemeClr val="tx1"/>
                 </a:solidFill>
-                <a:cs typeface="Arial" pitchFamily="34" charset="0"/>
+                <a:latin typeface="Arial" panose="020B0604020202020204" pitchFamily="34" charset="0"/>
+                <a:cs typeface="Arial" panose="020B0604020202020204" pitchFamily="34" charset="0"/>
               </a:rPr>
               <a:t>0 &lt; </a:t>
             </a:r>
@@ -4829,6 +5147,8 @@
                 <a:solidFill>
                   <a:schemeClr val="tx1"/>
                 </a:solidFill>
+                <a:latin typeface="Arial" panose="020B0604020202020204" pitchFamily="34" charset="0"/>
+                <a:cs typeface="Arial" panose="020B0604020202020204" pitchFamily="34" charset="0"/>
               </a:rPr>
               <a:t>a</a:t>
             </a:r>
@@ -4837,7 +5157,8 @@
                 <a:solidFill>
                   <a:schemeClr val="tx1"/>
                 </a:solidFill>
-                <a:cs typeface="Arial" pitchFamily="34" charset="0"/>
+                <a:latin typeface="Arial" panose="020B0604020202020204" pitchFamily="34" charset="0"/>
+                <a:cs typeface="Arial" panose="020B0604020202020204" pitchFamily="34" charset="0"/>
               </a:rPr>
               <a:t> &lt; 1 </a:t>
             </a:r>
@@ -4846,7 +5167,8 @@
                 <a:solidFill>
                   <a:schemeClr val="tx1"/>
                 </a:solidFill>
-                <a:cs typeface="Arial" pitchFamily="34" charset="0"/>
+                <a:latin typeface="Arial" panose="020B0604020202020204" pitchFamily="34" charset="0"/>
+                <a:cs typeface="Arial" panose="020B0604020202020204" pitchFamily="34" charset="0"/>
               </a:rPr>
               <a:t>la grafica es decreciente   </a:t>
             </a:r>
@@ -4858,7 +5180,8 @@
                 <a:solidFill>
                   <a:srgbClr val="FF0000"/>
                 </a:solidFill>
-                <a:cs typeface="Arial" pitchFamily="34" charset="0"/>
+                <a:latin typeface="Arial" panose="020B0604020202020204" pitchFamily="34" charset="0"/>
+                <a:cs typeface="Arial" panose="020B0604020202020204" pitchFamily="34" charset="0"/>
               </a:rPr>
               <a:t> </a:t>
             </a:r>
@@ -4866,7 +5189,8 @@
               <a:solidFill>
                 <a:srgbClr val="FF0000"/>
               </a:solidFill>
-              <a:cs typeface="Arial" pitchFamily="34" charset="0"/>
+              <a:latin typeface="Arial" panose="020B0604020202020204" pitchFamily="34" charset="0"/>
+              <a:cs typeface="Arial" panose="020B0604020202020204" pitchFamily="34" charset="0"/>
             </a:endParaRPr>
           </a:p>
         </p:txBody>
@@ -4947,7 +5271,8 @@
                 <a:solidFill>
                   <a:srgbClr val="FF0000"/>
                 </a:solidFill>
-                <a:cs typeface="Arial" pitchFamily="34" charset="0"/>
+                <a:latin typeface="Arial" panose="020B0604020202020204" pitchFamily="34" charset="0"/>
+                <a:cs typeface="Arial" panose="020B0604020202020204" pitchFamily="34" charset="0"/>
               </a:rPr>
               <a:t> </a:t>
             </a:r>
@@ -4958,7 +5283,8 @@
               <a:solidFill>
                 <a:srgbClr val="FF0000"/>
               </a:solidFill>
-              <a:cs typeface="Arial" pitchFamily="34" charset="0"/>
+              <a:latin typeface="Arial" panose="020B0604020202020204" pitchFamily="34" charset="0"/>
+              <a:cs typeface="Arial" panose="020B0604020202020204" pitchFamily="34" charset="0"/>
             </a:endParaRPr>
           </a:p>
           <a:p>
@@ -4968,6 +5294,8 @@
                 <a:solidFill>
                   <a:schemeClr val="bg1"/>
                 </a:solidFill>
+                <a:latin typeface="Arial" panose="020B0604020202020204" pitchFamily="34" charset="0"/>
+                <a:cs typeface="Arial" panose="020B0604020202020204" pitchFamily="34" charset="0"/>
               </a:rPr>
               <a:t>a</a:t>
             </a:r>
@@ -4976,6 +5304,8 @@
                 <a:solidFill>
                   <a:schemeClr val="tx1"/>
                 </a:solidFill>
+                <a:latin typeface="Arial" panose="020B0604020202020204" pitchFamily="34" charset="0"/>
+                <a:cs typeface="Arial" panose="020B0604020202020204" pitchFamily="34" charset="0"/>
               </a:rPr>
               <a:t>a</a:t>
             </a:r>
@@ -4984,7 +5314,8 @@
                 <a:solidFill>
                   <a:schemeClr val="tx1"/>
                 </a:solidFill>
-                <a:cs typeface="Arial" pitchFamily="34" charset="0"/>
+                <a:latin typeface="Arial" panose="020B0604020202020204" pitchFamily="34" charset="0"/>
+                <a:cs typeface="Arial" panose="020B0604020202020204" pitchFamily="34" charset="0"/>
               </a:rPr>
               <a:t> &gt; 1 </a:t>
             </a:r>
@@ -4993,7 +5324,8 @@
                 <a:solidFill>
                   <a:schemeClr val="tx1"/>
                 </a:solidFill>
-                <a:cs typeface="Arial" pitchFamily="34" charset="0"/>
+                <a:latin typeface="Arial" panose="020B0604020202020204" pitchFamily="34" charset="0"/>
+                <a:cs typeface="Arial" panose="020B0604020202020204" pitchFamily="34" charset="0"/>
               </a:rPr>
               <a:t>la grafica es creciente </a:t>
             </a:r>
@@ -5004,7 +5336,8 @@
               <a:solidFill>
                 <a:srgbClr val="FF0000"/>
               </a:solidFill>
-              <a:cs typeface="Arial" pitchFamily="34" charset="0"/>
+              <a:latin typeface="Arial" panose="020B0604020202020204" pitchFamily="34" charset="0"/>
+              <a:cs typeface="Arial" panose="020B0604020202020204" pitchFamily="34" charset="0"/>
             </a:endParaRPr>
           </a:p>
           <a:p>
@@ -5014,7 +5347,8 @@
                 <a:solidFill>
                   <a:srgbClr val="FF0000"/>
                 </a:solidFill>
-                <a:cs typeface="Arial" pitchFamily="34" charset="0"/>
+                <a:latin typeface="Arial" panose="020B0604020202020204" pitchFamily="34" charset="0"/>
+                <a:cs typeface="Arial" panose="020B0604020202020204" pitchFamily="34" charset="0"/>
               </a:rPr>
               <a:t> </a:t>
             </a:r>
@@ -5022,7 +5356,8 @@
               <a:solidFill>
                 <a:srgbClr val="FF0000"/>
               </a:solidFill>
-              <a:cs typeface="Arial" pitchFamily="34" charset="0"/>
+              <a:latin typeface="Arial" panose="020B0604020202020204" pitchFamily="34" charset="0"/>
+              <a:cs typeface="Arial" panose="020B0604020202020204" pitchFamily="34" charset="0"/>
             </a:endParaRPr>
           </a:p>
         </p:txBody>
@@ -5315,8 +5650,8 @@
         </p:blipFill>
         <p:spPr bwMode="auto">
           <a:xfrm>
-            <a:off x="10457731" y="7530340"/>
-            <a:ext cx="1394251" cy="1466479"/>
+            <a:off x="10830457" y="7530341"/>
+            <a:ext cx="1021525" cy="1074444"/>
           </a:xfrm>
           <a:prstGeom prst="rect">
             <a:avLst/>
@@ -5553,19 +5888,41 @@
           <a:p>
             <a:pPr algn="ctr"/>
             <a:r>
-              <a:rPr lang="es-CO" sz="900" dirty="0" smtClean="0">
-                <a:solidFill>
-                  <a:schemeClr val="tx1"/>
-                </a:solidFill>
-                <a:cs typeface="Arial" pitchFamily="34" charset="0"/>
-              </a:rPr>
-              <a:t>Sus características  son   </a:t>
+              <a:rPr lang="es-CO" sz="900" dirty="0">
+                <a:solidFill>
+                  <a:schemeClr val="tx1"/>
+                </a:solidFill>
+                <a:latin typeface="Arial" panose="020B0604020202020204" pitchFamily="34" charset="0"/>
+                <a:cs typeface="Arial" panose="020B0604020202020204" pitchFamily="34" charset="0"/>
+              </a:rPr>
+              <a:t>s</a:t>
+            </a:r>
+            <a:r>
+              <a:rPr lang="es-CO" sz="900" dirty="0" smtClean="0">
+                <a:solidFill>
+                  <a:schemeClr val="tx1"/>
+                </a:solidFill>
+                <a:latin typeface="Arial" panose="020B0604020202020204" pitchFamily="34" charset="0"/>
+                <a:cs typeface="Arial" panose="020B0604020202020204" pitchFamily="34" charset="0"/>
+              </a:rPr>
+              <a:t>us </a:t>
+            </a:r>
+            <a:r>
+              <a:rPr lang="es-CO" sz="900" dirty="0" smtClean="0">
+                <a:solidFill>
+                  <a:schemeClr val="tx1"/>
+                </a:solidFill>
+                <a:latin typeface="Arial" panose="020B0604020202020204" pitchFamily="34" charset="0"/>
+                <a:cs typeface="Arial" panose="020B0604020202020204" pitchFamily="34" charset="0"/>
+              </a:rPr>
+              <a:t>características  son   </a:t>
             </a:r>
             <a:endParaRPr lang="es-CO" sz="900" dirty="0">
               <a:solidFill>
                 <a:schemeClr val="tx1"/>
               </a:solidFill>
-              <a:cs typeface="Arial" pitchFamily="34" charset="0"/>
+              <a:latin typeface="Arial" panose="020B0604020202020204" pitchFamily="34" charset="0"/>
+              <a:cs typeface="Arial" panose="020B0604020202020204" pitchFamily="34" charset="0"/>
             </a:endParaRPr>
           </a:p>
         </p:txBody>
@@ -5653,25 +6010,39 @@
               <a:solidFill>
                 <a:schemeClr val="tx1"/>
               </a:solidFill>
-              <a:cs typeface="Arial" pitchFamily="34" charset="0"/>
+              <a:latin typeface="Arial" panose="020B0604020202020204" pitchFamily="34" charset="0"/>
+              <a:cs typeface="Arial" panose="020B0604020202020204" pitchFamily="34" charset="0"/>
             </a:endParaRPr>
           </a:p>
           <a:p>
             <a:pPr algn="ctr"/>
             <a:r>
-              <a:rPr lang="es-CO" sz="900" dirty="0" smtClean="0">
-                <a:solidFill>
-                  <a:schemeClr val="tx1"/>
-                </a:solidFill>
-                <a:cs typeface="Arial" pitchFamily="34" charset="0"/>
-              </a:rPr>
-              <a:t>dominio   </a:t>
+              <a:rPr lang="es-CO" sz="900" dirty="0">
+                <a:solidFill>
+                  <a:schemeClr val="tx1"/>
+                </a:solidFill>
+                <a:latin typeface="Arial" panose="020B0604020202020204" pitchFamily="34" charset="0"/>
+                <a:cs typeface="Arial" panose="020B0604020202020204" pitchFamily="34" charset="0"/>
+              </a:rPr>
+              <a:t>D</a:t>
+            </a:r>
+            <a:r>
+              <a:rPr lang="es-CO" sz="900" dirty="0" smtClean="0">
+                <a:solidFill>
+                  <a:schemeClr val="tx1"/>
+                </a:solidFill>
+                <a:latin typeface="Arial" panose="020B0604020202020204" pitchFamily="34" charset="0"/>
+                <a:cs typeface="Arial" panose="020B0604020202020204" pitchFamily="34" charset="0"/>
+              </a:rPr>
+              <a:t>ominio   </a:t>
             </a:r>
             <a:r>
               <a:rPr lang="es-ES_tradnl" sz="900" i="1" dirty="0" smtClean="0">
                 <a:solidFill>
                   <a:schemeClr val="tx1"/>
                 </a:solidFill>
+                <a:latin typeface="Arial" panose="020B0604020202020204" pitchFamily="34" charset="0"/>
+                <a:cs typeface="Arial" panose="020B0604020202020204" pitchFamily="34" charset="0"/>
               </a:rPr>
               <a:t>ℝ</a:t>
             </a:r>
@@ -5683,7 +6054,8 @@
                 <a:solidFill>
                   <a:schemeClr val="tx1"/>
                 </a:solidFill>
-                <a:cs typeface="Arial" pitchFamily="34" charset="0"/>
+                <a:latin typeface="Arial" panose="020B0604020202020204" pitchFamily="34" charset="0"/>
+                <a:cs typeface="Arial" panose="020B0604020202020204" pitchFamily="34" charset="0"/>
               </a:rPr>
               <a:t>  Rango   </a:t>
             </a:r>
@@ -5692,6 +6064,8 @@
                 <a:solidFill>
                   <a:schemeClr val="tx1"/>
                 </a:solidFill>
+                <a:latin typeface="Arial" panose="020B0604020202020204" pitchFamily="34" charset="0"/>
+                <a:cs typeface="Arial" panose="020B0604020202020204" pitchFamily="34" charset="0"/>
               </a:rPr>
               <a:t>ℝ</a:t>
             </a:r>
@@ -5700,7 +6074,8 @@
                 <a:solidFill>
                   <a:schemeClr val="tx1"/>
                 </a:solidFill>
-                <a:cs typeface="Arial" pitchFamily="34" charset="0"/>
+                <a:latin typeface="Arial" panose="020B0604020202020204" pitchFamily="34" charset="0"/>
+                <a:cs typeface="Arial" panose="020B0604020202020204" pitchFamily="34" charset="0"/>
               </a:rPr>
               <a:t> </a:t>
             </a:r>
@@ -5709,10 +6084,212 @@
                 <a:solidFill>
                   <a:schemeClr val="tx1"/>
                 </a:solidFill>
-                <a:cs typeface="Arial" pitchFamily="34" charset="0"/>
+                <a:latin typeface="Arial" panose="020B0604020202020204" pitchFamily="34" charset="0"/>
+                <a:cs typeface="Arial" panose="020B0604020202020204" pitchFamily="34" charset="0"/>
               </a:rPr>
               <a:t>+</a:t>
             </a:r>
+            <a:r>
+              <a:rPr lang="es-CO" sz="900" dirty="0" smtClean="0">
+                <a:solidFill>
+                  <a:schemeClr val="tx1"/>
+                </a:solidFill>
+                <a:latin typeface="Arial" panose="020B0604020202020204" pitchFamily="34" charset="0"/>
+                <a:cs typeface="Arial" panose="020B0604020202020204" pitchFamily="34" charset="0"/>
+              </a:rPr>
+              <a:t>  </a:t>
+            </a:r>
+            <a:endParaRPr lang="es-CO" sz="900" b="1" dirty="0" smtClean="0">
+              <a:solidFill>
+                <a:schemeClr val="tx1"/>
+              </a:solidFill>
+              <a:latin typeface="Arial" panose="020B0604020202020204" pitchFamily="34" charset="0"/>
+              <a:cs typeface="Arial" panose="020B0604020202020204" pitchFamily="34" charset="0"/>
+            </a:endParaRPr>
+          </a:p>
+          <a:p>
+            <a:pPr algn="ctr"/>
+            <a:endParaRPr lang="es-CO" sz="900" b="1" dirty="0">
+              <a:solidFill>
+                <a:schemeClr val="tx1"/>
+              </a:solidFill>
+              <a:latin typeface="Arial" panose="020B0604020202020204" pitchFamily="34" charset="0"/>
+              <a:cs typeface="Arial" panose="020B0604020202020204" pitchFamily="34" charset="0"/>
+            </a:endParaRPr>
+          </a:p>
+        </p:txBody>
+      </p:sp>
+      <p:sp>
+        <p:nvSpPr>
+          <p:cNvPr id="111" name="Rectángulo 33"/>
+          <p:cNvSpPr/>
+          <p:nvPr/>
+        </p:nvSpPr>
+        <p:spPr>
+          <a:xfrm>
+            <a:off x="12215222" y="5011089"/>
+            <a:ext cx="950457" cy="449386"/>
+          </a:xfrm>
+          <a:prstGeom prst="rect">
+            <a:avLst/>
+          </a:prstGeom>
+          <a:solidFill>
+            <a:schemeClr val="bg2">
+              <a:lumMod val="90000"/>
+            </a:schemeClr>
+          </a:solidFill>
+        </p:spPr>
+        <p:style>
+          <a:lnRef idx="2">
+            <a:schemeClr val="dk1"/>
+          </a:lnRef>
+          <a:fillRef idx="1">
+            <a:schemeClr val="lt1"/>
+          </a:fillRef>
+          <a:effectRef idx="0">
+            <a:schemeClr val="dk1"/>
+          </a:effectRef>
+          <a:fontRef idx="minor">
+            <a:schemeClr val="dk1"/>
+          </a:fontRef>
+        </p:style>
+        <p:txBody>
+          <a:bodyPr lIns="105683" tIns="52841" rIns="105683" bIns="52841" rtlCol="0" anchor="ctr"/>
+          <a:lstStyle/>
+          <a:p>
+            <a:pPr algn="ctr"/>
+            <a:r>
+              <a:rPr lang="es-CO" sz="900" dirty="0" smtClean="0">
+                <a:solidFill>
+                  <a:schemeClr val="tx1"/>
+                </a:solidFill>
+                <a:latin typeface="Arial" panose="020B0604020202020204" pitchFamily="34" charset="0"/>
+                <a:cs typeface="Arial" panose="020B0604020202020204" pitchFamily="34" charset="0"/>
+              </a:rPr>
+              <a:t>  </a:t>
+            </a:r>
+            <a:endParaRPr lang="es-CO" sz="900" b="1" dirty="0" smtClean="0">
+              <a:solidFill>
+                <a:schemeClr val="tx1"/>
+              </a:solidFill>
+              <a:latin typeface="Arial" panose="020B0604020202020204" pitchFamily="34" charset="0"/>
+              <a:cs typeface="Arial" panose="020B0604020202020204" pitchFamily="34" charset="0"/>
+            </a:endParaRPr>
+          </a:p>
+          <a:p>
+            <a:pPr algn="ctr"/>
+            <a:r>
+              <a:rPr lang="es-CO" sz="900" dirty="0" smtClean="0">
+                <a:solidFill>
+                  <a:schemeClr val="tx1"/>
+                </a:solidFill>
+                <a:latin typeface="Arial" panose="020B0604020202020204" pitchFamily="34" charset="0"/>
+                <a:cs typeface="Arial" panose="020B0604020202020204" pitchFamily="34" charset="0"/>
+              </a:rPr>
+              <a:t>continuas  en    </a:t>
+            </a:r>
+          </a:p>
+          <a:p>
+            <a:pPr algn="ctr"/>
+            <a:r>
+              <a:rPr lang="es-ES_tradnl" sz="900" i="1" dirty="0" smtClean="0">
+                <a:solidFill>
+                  <a:schemeClr val="tx1"/>
+                </a:solidFill>
+                <a:latin typeface="Arial" panose="020B0604020202020204" pitchFamily="34" charset="0"/>
+                <a:cs typeface="Arial" panose="020B0604020202020204" pitchFamily="34" charset="0"/>
+              </a:rPr>
+              <a:t>ℝ</a:t>
+            </a:r>
+            <a:r>
+              <a:rPr lang="es-CO" sz="900" dirty="0" smtClean="0">
+                <a:solidFill>
+                  <a:schemeClr val="tx1"/>
+                </a:solidFill>
+                <a:latin typeface="Arial" panose="020B0604020202020204" pitchFamily="34" charset="0"/>
+                <a:cs typeface="Arial" panose="020B0604020202020204" pitchFamily="34" charset="0"/>
+              </a:rPr>
+              <a:t> </a:t>
+            </a:r>
+            <a:r>
+              <a:rPr lang="es-CO" sz="900" baseline="30000" dirty="0" smtClean="0">
+                <a:solidFill>
+                  <a:schemeClr val="tx1"/>
+                </a:solidFill>
+                <a:latin typeface="Arial" panose="020B0604020202020204" pitchFamily="34" charset="0"/>
+                <a:cs typeface="Arial" panose="020B0604020202020204" pitchFamily="34" charset="0"/>
+              </a:rPr>
+              <a:t>+</a:t>
+            </a:r>
+            <a:r>
+              <a:rPr lang="es-CO" sz="900" dirty="0" smtClean="0">
+                <a:solidFill>
+                  <a:schemeClr val="tx1"/>
+                </a:solidFill>
+                <a:latin typeface="Arial" panose="020B0604020202020204" pitchFamily="34" charset="0"/>
+                <a:cs typeface="Arial" panose="020B0604020202020204" pitchFamily="34" charset="0"/>
+              </a:rPr>
+              <a:t>  </a:t>
+            </a:r>
+            <a:endParaRPr lang="es-CO" sz="900" b="1" dirty="0" smtClean="0">
+              <a:solidFill>
+                <a:schemeClr val="tx1"/>
+              </a:solidFill>
+              <a:latin typeface="Arial" panose="020B0604020202020204" pitchFamily="34" charset="0"/>
+              <a:cs typeface="Arial" panose="020B0604020202020204" pitchFamily="34" charset="0"/>
+            </a:endParaRPr>
+          </a:p>
+          <a:p>
+            <a:pPr algn="ctr"/>
+            <a:endParaRPr lang="es-CO" sz="900" b="1" dirty="0">
+              <a:solidFill>
+                <a:schemeClr val="tx1"/>
+              </a:solidFill>
+              <a:latin typeface="Arial" panose="020B0604020202020204" pitchFamily="34" charset="0"/>
+              <a:cs typeface="Arial" panose="020B0604020202020204" pitchFamily="34" charset="0"/>
+            </a:endParaRPr>
+          </a:p>
+        </p:txBody>
+      </p:sp>
+      <p:sp>
+        <p:nvSpPr>
+          <p:cNvPr id="112" name="Rectángulo 33"/>
+          <p:cNvSpPr/>
+          <p:nvPr/>
+        </p:nvSpPr>
+        <p:spPr>
+          <a:xfrm>
+            <a:off x="12215222" y="5677767"/>
+            <a:ext cx="950457" cy="449386"/>
+          </a:xfrm>
+          <a:prstGeom prst="rect">
+            <a:avLst/>
+          </a:prstGeom>
+          <a:solidFill>
+            <a:schemeClr val="bg2">
+              <a:lumMod val="90000"/>
+            </a:schemeClr>
+          </a:solidFill>
+        </p:spPr>
+        <p:style>
+          <a:lnRef idx="2">
+            <a:schemeClr val="dk1"/>
+          </a:lnRef>
+          <a:fillRef idx="1">
+            <a:schemeClr val="lt1"/>
+          </a:fillRef>
+          <a:effectRef idx="0">
+            <a:schemeClr val="dk1"/>
+          </a:effectRef>
+          <a:fontRef idx="minor">
+            <a:schemeClr val="dk1"/>
+          </a:fontRef>
+        </p:style>
+        <p:txBody>
+          <a:bodyPr lIns="105683" tIns="52841" rIns="105683" bIns="52841" rtlCol="0" anchor="ctr"/>
+          <a:lstStyle/>
+          <a:p>
+            <a:pPr algn="ctr"/>
             <a:r>
               <a:rPr lang="es-CO" sz="900" dirty="0" smtClean="0">
                 <a:solidFill>
@@ -5730,205 +6307,17 @@
             </a:endParaRPr>
           </a:p>
           <a:p>
-            <a:pPr algn="ctr"/>
-            <a:endParaRPr lang="es-CO" sz="900" b="1" dirty="0">
-              <a:solidFill>
-                <a:schemeClr val="tx1"/>
-              </a:solidFill>
-              <a:cs typeface="Arial" pitchFamily="34" charset="0"/>
-            </a:endParaRPr>
-          </a:p>
-        </p:txBody>
-      </p:sp>
-      <p:sp>
-        <p:nvSpPr>
-          <p:cNvPr id="111" name="Rectángulo 33"/>
-          <p:cNvSpPr/>
-          <p:nvPr/>
-        </p:nvSpPr>
-        <p:spPr>
-          <a:xfrm>
-            <a:off x="12215222" y="5011089"/>
-            <a:ext cx="950457" cy="449386"/>
-          </a:xfrm>
-          <a:prstGeom prst="rect">
-            <a:avLst/>
-          </a:prstGeom>
-          <a:solidFill>
-            <a:schemeClr val="bg2">
-              <a:lumMod val="90000"/>
-            </a:schemeClr>
-          </a:solidFill>
-        </p:spPr>
-        <p:style>
-          <a:lnRef idx="2">
-            <a:schemeClr val="dk1"/>
-          </a:lnRef>
-          <a:fillRef idx="1">
-            <a:schemeClr val="lt1"/>
-          </a:fillRef>
-          <a:effectRef idx="0">
-            <a:schemeClr val="dk1"/>
-          </a:effectRef>
-          <a:fontRef idx="minor">
-            <a:schemeClr val="dk1"/>
-          </a:fontRef>
-        </p:style>
-        <p:txBody>
-          <a:bodyPr lIns="105683" tIns="52841" rIns="105683" bIns="52841" rtlCol="0" anchor="ctr"/>
-          <a:lstStyle/>
-          <a:p>
-            <a:pPr algn="ctr"/>
-            <a:r>
-              <a:rPr lang="es-CO" sz="900" dirty="0" smtClean="0">
+            <a:r>
+              <a:rPr lang="es-CO" sz="900" dirty="0">
                 <a:solidFill>
                   <a:schemeClr val="tx1"/>
                 </a:solidFill>
                 <a:cs typeface="Arial" pitchFamily="34" charset="0"/>
               </a:rPr>
-              <a:t>  </a:t>
-            </a:r>
-            <a:endParaRPr lang="es-CO" sz="900" b="1" dirty="0" smtClean="0">
-              <a:solidFill>
-                <a:schemeClr val="tx1"/>
-              </a:solidFill>
-              <a:cs typeface="Arial" pitchFamily="34" charset="0"/>
-            </a:endParaRPr>
-          </a:p>
-          <a:p>
-            <a:pPr algn="ctr"/>
-            <a:r>
-              <a:rPr lang="es-CO" sz="900" dirty="0" smtClean="0">
-                <a:solidFill>
-                  <a:schemeClr val="tx1"/>
-                </a:solidFill>
-                <a:cs typeface="Arial" pitchFamily="34" charset="0"/>
-              </a:rPr>
-              <a:t>continuas  en    </a:t>
-            </a:r>
-          </a:p>
-          <a:p>
-            <a:pPr algn="ctr"/>
-            <a:r>
-              <a:rPr lang="es-ES_tradnl" sz="900" i="1" dirty="0" smtClean="0">
-                <a:solidFill>
-                  <a:schemeClr val="tx1"/>
-                </a:solidFill>
-              </a:rPr>
-              <a:t>ℝ</a:t>
-            </a:r>
-            <a:r>
-              <a:rPr lang="es-CO" sz="900" dirty="0" smtClean="0">
-                <a:solidFill>
-                  <a:schemeClr val="tx1"/>
-                </a:solidFill>
-                <a:cs typeface="Arial" pitchFamily="34" charset="0"/>
-              </a:rPr>
-              <a:t> </a:t>
-            </a:r>
-            <a:r>
-              <a:rPr lang="es-CO" sz="900" baseline="30000" dirty="0" smtClean="0">
-                <a:solidFill>
-                  <a:schemeClr val="tx1"/>
-                </a:solidFill>
-                <a:cs typeface="Arial" pitchFamily="34" charset="0"/>
-              </a:rPr>
-              <a:t>+</a:t>
-            </a:r>
-            <a:r>
-              <a:rPr lang="es-CO" sz="900" dirty="0" smtClean="0">
-                <a:solidFill>
-                  <a:schemeClr val="tx1"/>
-                </a:solidFill>
-                <a:cs typeface="Arial" pitchFamily="34" charset="0"/>
-              </a:rPr>
-              <a:t>  </a:t>
-            </a:r>
-            <a:endParaRPr lang="es-CO" sz="900" b="1" dirty="0" smtClean="0">
-              <a:solidFill>
-                <a:schemeClr val="tx1"/>
-              </a:solidFill>
-              <a:cs typeface="Arial" pitchFamily="34" charset="0"/>
-            </a:endParaRPr>
-          </a:p>
-          <a:p>
-            <a:pPr algn="ctr"/>
-            <a:endParaRPr lang="es-CO" sz="900" b="1" dirty="0">
-              <a:solidFill>
-                <a:schemeClr val="tx1"/>
-              </a:solidFill>
-              <a:cs typeface="Arial" pitchFamily="34" charset="0"/>
-            </a:endParaRPr>
-          </a:p>
-        </p:txBody>
-      </p:sp>
-      <p:sp>
-        <p:nvSpPr>
-          <p:cNvPr id="112" name="Rectángulo 33"/>
-          <p:cNvSpPr/>
-          <p:nvPr/>
-        </p:nvSpPr>
-        <p:spPr>
-          <a:xfrm>
-            <a:off x="12215222" y="5677767"/>
-            <a:ext cx="950457" cy="449386"/>
-          </a:xfrm>
-          <a:prstGeom prst="rect">
-            <a:avLst/>
-          </a:prstGeom>
-          <a:solidFill>
-            <a:schemeClr val="bg2">
-              <a:lumMod val="90000"/>
-            </a:schemeClr>
-          </a:solidFill>
-        </p:spPr>
-        <p:style>
-          <a:lnRef idx="2">
-            <a:schemeClr val="dk1"/>
-          </a:lnRef>
-          <a:fillRef idx="1">
-            <a:schemeClr val="lt1"/>
-          </a:fillRef>
-          <a:effectRef idx="0">
-            <a:schemeClr val="dk1"/>
-          </a:effectRef>
-          <a:fontRef idx="minor">
-            <a:schemeClr val="dk1"/>
-          </a:fontRef>
-        </p:style>
-        <p:txBody>
-          <a:bodyPr lIns="105683" tIns="52841" rIns="105683" bIns="52841" rtlCol="0" anchor="ctr"/>
-          <a:lstStyle/>
-          <a:p>
-            <a:pPr algn="ctr"/>
-            <a:r>
-              <a:rPr lang="es-CO" sz="900" dirty="0" smtClean="0">
-                <a:solidFill>
-                  <a:schemeClr val="tx1"/>
-                </a:solidFill>
-                <a:cs typeface="Arial" pitchFamily="34" charset="0"/>
-              </a:rPr>
-              <a:t>  </a:t>
-            </a:r>
-            <a:endParaRPr lang="es-CO" sz="900" b="1" dirty="0" smtClean="0">
-              <a:solidFill>
-                <a:schemeClr val="tx1"/>
-              </a:solidFill>
-              <a:cs typeface="Arial" pitchFamily="34" charset="0"/>
-            </a:endParaRPr>
-          </a:p>
-          <a:p>
-            <a:r>
-              <a:rPr lang="es-CO" sz="900" dirty="0">
-                <a:solidFill>
-                  <a:schemeClr val="tx1"/>
-                </a:solidFill>
-                <a:cs typeface="Arial" pitchFamily="34" charset="0"/>
-              </a:rPr>
-              <a:t>c</a:t>
-            </a:r>
-            <a:r>
-              <a:rPr lang="es-CO" sz="900" smtClean="0">
+              <a:t>C</a:t>
+            </a:r>
+            <a:r>
+              <a:rPr lang="es-CO" sz="900" dirty="0" smtClean="0">
                 <a:solidFill>
                   <a:schemeClr val="tx1"/>
                 </a:solidFill>
@@ -6328,7 +6717,8 @@
                 <a:solidFill>
                   <a:schemeClr val="tx1"/>
                 </a:solidFill>
-                <a:cs typeface="Arial" pitchFamily="34" charset="0"/>
+                <a:latin typeface="Arial" panose="020B0604020202020204" pitchFamily="34" charset="0"/>
+                <a:cs typeface="Arial" panose="020B0604020202020204" pitchFamily="34" charset="0"/>
               </a:rPr>
               <a:t>crecimiento exponencial </a:t>
             </a:r>
@@ -6336,6 +6726,8 @@
               <a:solidFill>
                 <a:schemeClr val="tx1"/>
               </a:solidFill>
+              <a:latin typeface="Arial" panose="020B0604020202020204" pitchFamily="34" charset="0"/>
+              <a:cs typeface="Arial" panose="020B0604020202020204" pitchFamily="34" charset="0"/>
             </a:endParaRPr>
           </a:p>
         </p:txBody>
@@ -6384,7 +6776,8 @@
                 <a:solidFill>
                   <a:schemeClr val="tx1"/>
                 </a:solidFill>
-                <a:cs typeface="Arial" pitchFamily="34" charset="0"/>
+                <a:latin typeface="Arial" panose="020B0604020202020204" pitchFamily="34" charset="0"/>
+                <a:cs typeface="Arial" panose="020B0604020202020204" pitchFamily="34" charset="0"/>
               </a:rPr>
               <a:t>interés compuesto </a:t>
             </a:r>
@@ -6392,6 +6785,8 @@
               <a:solidFill>
                 <a:schemeClr val="tx1"/>
               </a:solidFill>
+              <a:latin typeface="Arial" panose="020B0604020202020204" pitchFamily="34" charset="0"/>
+              <a:cs typeface="Arial" panose="020B0604020202020204" pitchFamily="34" charset="0"/>
             </a:endParaRPr>
           </a:p>
         </p:txBody>
@@ -6440,7 +6835,8 @@
                 <a:solidFill>
                   <a:schemeClr val="tx1"/>
                 </a:solidFill>
-                <a:cs typeface="Arial" pitchFamily="34" charset="0"/>
+                <a:latin typeface="Arial" panose="020B0604020202020204" pitchFamily="34" charset="0"/>
+                <a:cs typeface="Arial" panose="020B0604020202020204" pitchFamily="34" charset="0"/>
               </a:rPr>
               <a:t>crecimiento  poblacional  </a:t>
             </a:r>
@@ -6448,6 +6844,8 @@
               <a:solidFill>
                 <a:schemeClr val="tx1"/>
               </a:solidFill>
+              <a:latin typeface="Arial" panose="020B0604020202020204" pitchFamily="34" charset="0"/>
+              <a:cs typeface="Arial" panose="020B0604020202020204" pitchFamily="34" charset="0"/>
             </a:endParaRPr>
           </a:p>
         </p:txBody>
@@ -6496,7 +6894,8 @@
                 <a:solidFill>
                   <a:schemeClr val="tx1"/>
                 </a:solidFill>
-                <a:cs typeface="Arial" pitchFamily="34" charset="0"/>
+                <a:latin typeface="Arial" panose="020B0604020202020204" pitchFamily="34" charset="0"/>
+                <a:cs typeface="Arial" panose="020B0604020202020204" pitchFamily="34" charset="0"/>
               </a:rPr>
               <a:t>decrecimiento exponencial </a:t>
             </a:r>
@@ -6504,6 +6903,8 @@
               <a:solidFill>
                 <a:schemeClr val="tx1"/>
               </a:solidFill>
+              <a:latin typeface="Arial" panose="020B0604020202020204" pitchFamily="34" charset="0"/>
+              <a:cs typeface="Arial" panose="020B0604020202020204" pitchFamily="34" charset="0"/>
             </a:endParaRPr>
           </a:p>
         </p:txBody>
@@ -6552,7 +6953,8 @@
                 <a:solidFill>
                   <a:schemeClr val="tx1"/>
                 </a:solidFill>
-                <a:cs typeface="Arial" pitchFamily="34" charset="0"/>
+                <a:latin typeface="Arial" panose="020B0604020202020204" pitchFamily="34" charset="0"/>
+                <a:cs typeface="Arial" panose="020B0604020202020204" pitchFamily="34" charset="0"/>
               </a:rPr>
               <a:t>descomposición radioactiva </a:t>
             </a:r>
@@ -6560,6 +6962,8 @@
               <a:solidFill>
                 <a:schemeClr val="tx1"/>
               </a:solidFill>
+              <a:latin typeface="Arial" panose="020B0604020202020204" pitchFamily="34" charset="0"/>
+              <a:cs typeface="Arial" panose="020B0604020202020204" pitchFamily="34" charset="0"/>
             </a:endParaRPr>
           </a:p>
         </p:txBody>
@@ -6902,7 +7306,8 @@
                 <a:solidFill>
                   <a:schemeClr val="tx1"/>
                 </a:solidFill>
-                <a:cs typeface="Arial" pitchFamily="34" charset="0"/>
+                <a:latin typeface="Arial" panose="020B0604020202020204" pitchFamily="34" charset="0"/>
+                <a:cs typeface="Arial" panose="020B0604020202020204" pitchFamily="34" charset="0"/>
               </a:rPr>
               <a:t>m</a:t>
             </a:r>
@@ -6911,7 +7316,8 @@
                 <a:solidFill>
                   <a:schemeClr val="tx1"/>
                 </a:solidFill>
-                <a:cs typeface="Arial" pitchFamily="34" charset="0"/>
+                <a:latin typeface="Arial" panose="020B0604020202020204" pitchFamily="34" charset="0"/>
+                <a:cs typeface="Arial" panose="020B0604020202020204" pitchFamily="34" charset="0"/>
               </a:rPr>
               <a:t>edición </a:t>
             </a:r>
@@ -6920,7 +7326,8 @@
                 <a:solidFill>
                   <a:schemeClr val="tx1"/>
                 </a:solidFill>
-                <a:cs typeface="Arial" pitchFamily="34" charset="0"/>
+                <a:latin typeface="Arial" panose="020B0604020202020204" pitchFamily="34" charset="0"/>
+                <a:cs typeface="Arial" panose="020B0604020202020204" pitchFamily="34" charset="0"/>
               </a:rPr>
               <a:t>temblores  </a:t>
             </a:r>
@@ -6928,6 +7335,8 @@
               <a:solidFill>
                 <a:schemeClr val="tx1"/>
               </a:solidFill>
+              <a:latin typeface="Arial" panose="020B0604020202020204" pitchFamily="34" charset="0"/>
+              <a:cs typeface="Arial" panose="020B0604020202020204" pitchFamily="34" charset="0"/>
             </a:endParaRPr>
           </a:p>
         </p:txBody>
@@ -6976,23 +7385,17 @@
                 <a:solidFill>
                   <a:schemeClr val="tx1"/>
                 </a:solidFill>
-                <a:cs typeface="Arial" pitchFamily="34" charset="0"/>
-              </a:rPr>
-              <a:t>Calculo antigüedad  objetos </a:t>
-            </a:r>
-            <a:r>
-              <a:rPr lang="es-CO" sz="900" dirty="0" smtClean="0">
-                <a:solidFill>
-                  <a:schemeClr val="tx1"/>
-                </a:solidFill>
-                <a:cs typeface="Arial" pitchFamily="34" charset="0"/>
-              </a:rPr>
-              <a:t> </a:t>
+                <a:latin typeface="Arial" panose="020B0604020202020204" pitchFamily="34" charset="0"/>
+                <a:cs typeface="Arial" panose="020B0604020202020204" pitchFamily="34" charset="0"/>
+              </a:rPr>
+              <a:t>Calculo antigüedad  objetos  </a:t>
             </a:r>
             <a:endParaRPr lang="es-ES_tradnl" sz="900" i="1" dirty="0" smtClean="0">
               <a:solidFill>
                 <a:schemeClr val="tx1"/>
               </a:solidFill>
+              <a:latin typeface="Arial" panose="020B0604020202020204" pitchFamily="34" charset="0"/>
+              <a:cs typeface="Arial" panose="020B0604020202020204" pitchFamily="34" charset="0"/>
             </a:endParaRPr>
           </a:p>
         </p:txBody>
@@ -7041,7 +7444,8 @@
                 <a:solidFill>
                   <a:schemeClr val="tx1"/>
                 </a:solidFill>
-                <a:cs typeface="Arial" pitchFamily="34" charset="0"/>
+                <a:latin typeface="Arial" panose="020B0604020202020204" pitchFamily="34" charset="0"/>
+                <a:cs typeface="Arial" panose="020B0604020202020204" pitchFamily="34" charset="0"/>
               </a:rPr>
               <a:t>m</a:t>
             </a:r>
@@ -7050,41 +7454,27 @@
                 <a:solidFill>
                   <a:schemeClr val="tx1"/>
                 </a:solidFill>
-                <a:cs typeface="Arial" pitchFamily="34" charset="0"/>
+                <a:latin typeface="Arial" panose="020B0604020202020204" pitchFamily="34" charset="0"/>
+                <a:cs typeface="Arial" panose="020B0604020202020204" pitchFamily="34" charset="0"/>
               </a:rPr>
               <a:t>edir  la acides </a:t>
             </a:r>
             <a:r>
-              <a:rPr lang="es-CO" sz="900" dirty="0" err="1" smtClean="0">
-                <a:solidFill>
-                  <a:schemeClr val="tx1"/>
-                </a:solidFill>
-                <a:cs typeface="Arial" pitchFamily="34" charset="0"/>
-              </a:rPr>
-              <a:t>Ph</a:t>
-            </a:r>
-            <a:r>
-              <a:rPr lang="es-CO" sz="900" dirty="0" smtClean="0">
-                <a:solidFill>
-                  <a:schemeClr val="tx1"/>
-                </a:solidFill>
-                <a:cs typeface="Arial" pitchFamily="34" charset="0"/>
-              </a:rPr>
-              <a:t> </a:t>
-            </a:r>
-            <a:r>
-              <a:rPr lang="es-CO" sz="900" dirty="0" smtClean="0">
-                <a:solidFill>
-                  <a:schemeClr val="tx1"/>
-                </a:solidFill>
-                <a:cs typeface="Arial" pitchFamily="34" charset="0"/>
-              </a:rPr>
-              <a:t>  </a:t>
+              <a:rPr lang="es-CO" sz="900" dirty="0" smtClean="0">
+                <a:solidFill>
+                  <a:schemeClr val="tx1"/>
+                </a:solidFill>
+                <a:latin typeface="Arial" panose="020B0604020202020204" pitchFamily="34" charset="0"/>
+                <a:cs typeface="Arial" panose="020B0604020202020204" pitchFamily="34" charset="0"/>
+              </a:rPr>
+              <a:t>pH   </a:t>
             </a:r>
             <a:endParaRPr lang="es-ES_tradnl" sz="900" i="1" dirty="0" smtClean="0">
               <a:solidFill>
                 <a:schemeClr val="tx1"/>
               </a:solidFill>
+              <a:latin typeface="Arial" panose="020B0604020202020204" pitchFamily="34" charset="0"/>
+              <a:cs typeface="Arial" panose="020B0604020202020204" pitchFamily="34" charset="0"/>
             </a:endParaRPr>
           </a:p>
         </p:txBody>
@@ -7478,7 +7868,7 @@
   <a:extraClrSchemeLst/>
   <a:extLst>
     <a:ext uri="{05A4C25C-085E-4340-85A3-A5531E510DB2}">
-      <thm15:themeFamily xmlns:thm15="http://schemas.microsoft.com/office/thememl/2012/main" xmlns="" name="Office Theme" id="{62F939B6-93AF-4DB8-9C6B-D6C7DFDC589F}" vid="{4A3C46E8-61CC-4603-A589-7422A47A8E4A}"/>
+      <thm15:themeFamily xmlns:thm15="http://schemas.microsoft.com/office/thememl/2012/main" name="Office Theme" id="{62F939B6-93AF-4DB8-9C6B-D6C7DFDC589F}" vid="{4A3C46E8-61CC-4603-A589-7422A47A8E4A}"/>
     </a:ext>
   </a:extLst>
 </a:theme>

</xml_diff>

<commit_message>
Cuaderno de estudio Tema 9
Cuaderno de estudio y mapa conceptual listos para revisión de estilo
</commit_message>
<xml_diff>
--- a/fuentes/contenidos/grado09/guion07/MapaConceptual_MA_09_07_CO.pptx
+++ b/fuentes/contenidos/grado09/guion07/MapaConceptual_MA_09_07_CO.pptx
@@ -106,7 +106,18 @@
   </p:defaultTextStyle>
   <p:extLst>
     <p:ext uri="{EFAFB233-063F-42B5-8137-9DF3F51BA10A}">
-      <p15:sldGuideLst xmlns:p15="http://schemas.microsoft.com/office/powerpoint/2012/main" xmlns=""/>
+      <p15:sldGuideLst xmlns:p15="http://schemas.microsoft.com/office/powerpoint/2012/main">
+        <p15:guide id="1" orient="horz" pos="2949">
+          <p15:clr>
+            <a:srgbClr val="A4A3A4"/>
+          </p15:clr>
+        </p15:guide>
+        <p15:guide id="2" pos="4309">
+          <p15:clr>
+            <a:srgbClr val="A4A3A4"/>
+          </p15:clr>
+        </p15:guide>
+      </p15:sldGuideLst>
     </p:ext>
   </p:extLst>
 </p:presentation>
@@ -451,7 +462,7 @@
             <a:fld id="{5001C876-01F7-4317-94B9-1AE222133113}" type="datetimeFigureOut">
               <a:rPr lang="es-ES" smtClean="0"/>
               <a:pPr/>
-              <a:t>04/11/2015</a:t>
+              <a:t>26/02/2016</a:t>
             </a:fld>
             <a:endParaRPr lang="es-ES"/>
           </a:p>
@@ -1272,14 +1283,18 @@
                 <a:solidFill>
                   <a:schemeClr val="bg1"/>
                 </a:solidFill>
-              </a:rPr>
-              <a:t>ƒ : ℝ → ℝ </a:t>
+                <a:latin typeface="Arial" panose="020B0604020202020204" pitchFamily="34" charset="0"/>
+                <a:cs typeface="Arial" panose="020B0604020202020204" pitchFamily="34" charset="0"/>
+              </a:rPr>
+              <a:t> f: ℝ → ℝ </a:t>
             </a:r>
             <a:r>
               <a:rPr lang="es-ES_tradnl" sz="1050" i="1" baseline="30000" dirty="0" smtClean="0">
                 <a:solidFill>
                   <a:schemeClr val="bg1"/>
                 </a:solidFill>
+                <a:latin typeface="Arial" panose="020B0604020202020204" pitchFamily="34" charset="0"/>
+                <a:cs typeface="Arial" panose="020B0604020202020204" pitchFamily="34" charset="0"/>
               </a:rPr>
               <a:t>+</a:t>
             </a:r>
@@ -1287,6 +1302,8 @@
               <a:solidFill>
                 <a:schemeClr val="bg1"/>
               </a:solidFill>
+              <a:latin typeface="Arial" panose="020B0604020202020204" pitchFamily="34" charset="0"/>
+              <a:cs typeface="Arial" panose="020B0604020202020204" pitchFamily="34" charset="0"/>
             </a:endParaRPr>
           </a:p>
           <a:p>
@@ -1296,25 +1313,78 @@
                 <a:solidFill>
                   <a:schemeClr val="bg1"/>
                 </a:solidFill>
-                <a:cs typeface="Arial" pitchFamily="34" charset="0"/>
-              </a:rPr>
-              <a:t>f(x) = a </a:t>
-            </a:r>
-            <a:r>
-              <a:rPr lang="es-CO" sz="1050" i="1" baseline="30000" dirty="0" smtClean="0">
+                <a:latin typeface="Arial" panose="020B0604020202020204" pitchFamily="34" charset="0"/>
+                <a:cs typeface="Arial" panose="020B0604020202020204" pitchFamily="34" charset="0"/>
+              </a:rPr>
+              <a:t>f</a:t>
+            </a:r>
+            <a:r>
+              <a:rPr lang="es-CO" sz="1050" dirty="0" smtClean="0">
                 <a:solidFill>
                   <a:schemeClr val="bg1"/>
                 </a:solidFill>
-                <a:cs typeface="Arial" pitchFamily="34" charset="0"/>
+                <a:latin typeface="Arial" panose="020B0604020202020204" pitchFamily="34" charset="0"/>
+                <a:cs typeface="Arial" panose="020B0604020202020204" pitchFamily="34" charset="0"/>
+              </a:rPr>
+              <a:t>(</a:t>
+            </a:r>
+            <a:r>
+              <a:rPr lang="es-CO" sz="1050" i="1" dirty="0" smtClean="0">
+                <a:solidFill>
+                  <a:schemeClr val="bg1"/>
+                </a:solidFill>
+                <a:latin typeface="Arial" panose="020B0604020202020204" pitchFamily="34" charset="0"/>
+                <a:cs typeface="Arial" panose="020B0604020202020204" pitchFamily="34" charset="0"/>
               </a:rPr>
               <a:t>x</a:t>
             </a:r>
             <a:r>
+              <a:rPr lang="es-CO" sz="1050" dirty="0" smtClean="0">
+                <a:solidFill>
+                  <a:schemeClr val="bg1"/>
+                </a:solidFill>
+                <a:latin typeface="Arial" panose="020B0604020202020204" pitchFamily="34" charset="0"/>
+                <a:cs typeface="Arial" panose="020B0604020202020204" pitchFamily="34" charset="0"/>
+              </a:rPr>
+              <a:t>)</a:t>
+            </a:r>
+            <a:r>
               <a:rPr lang="es-CO" sz="1050" i="1" dirty="0" smtClean="0">
                 <a:solidFill>
                   <a:schemeClr val="bg1"/>
                 </a:solidFill>
-                <a:cs typeface="Arial" pitchFamily="34" charset="0"/>
+                <a:latin typeface="Arial" panose="020B0604020202020204" pitchFamily="34" charset="0"/>
+                <a:cs typeface="Arial" panose="020B0604020202020204" pitchFamily="34" charset="0"/>
+              </a:rPr>
+              <a:t> = </a:t>
+            </a:r>
+            <a:r>
+              <a:rPr lang="es-CO" sz="1050" i="1" dirty="0" err="1" smtClean="0">
+                <a:solidFill>
+                  <a:schemeClr val="bg1"/>
+                </a:solidFill>
+                <a:latin typeface="Arial" panose="020B0604020202020204" pitchFamily="34" charset="0"/>
+                <a:cs typeface="Arial" panose="020B0604020202020204" pitchFamily="34" charset="0"/>
+              </a:rPr>
+              <a:t>a</a:t>
+            </a:r>
+            <a:r>
+              <a:rPr lang="es-CO" sz="1050" i="1" baseline="30000" dirty="0" err="1" smtClean="0">
+                <a:solidFill>
+                  <a:schemeClr val="bg1"/>
+                </a:solidFill>
+                <a:latin typeface="Arial" panose="020B0604020202020204" pitchFamily="34" charset="0"/>
+                <a:cs typeface="Arial" panose="020B0604020202020204" pitchFamily="34" charset="0"/>
+              </a:rPr>
+              <a:t>x</a:t>
+            </a:r>
+            <a:r>
+              <a:rPr lang="es-CO" sz="1050" i="1" dirty="0" smtClean="0">
+                <a:solidFill>
+                  <a:schemeClr val="bg1"/>
+                </a:solidFill>
+                <a:latin typeface="Arial" panose="020B0604020202020204" pitchFamily="34" charset="0"/>
+                <a:cs typeface="Arial" panose="020B0604020202020204" pitchFamily="34" charset="0"/>
               </a:rPr>
               <a:t> ,  a∈</a:t>
             </a:r>
@@ -1323,6 +1393,8 @@
                 <a:solidFill>
                   <a:schemeClr val="bg1"/>
                 </a:solidFill>
+                <a:latin typeface="Arial" panose="020B0604020202020204" pitchFamily="34" charset="0"/>
+                <a:cs typeface="Arial" panose="020B0604020202020204" pitchFamily="34" charset="0"/>
               </a:rPr>
               <a:t> ℝ </a:t>
             </a:r>
@@ -1331,6 +1403,8 @@
                 <a:solidFill>
                   <a:schemeClr val="bg1"/>
                 </a:solidFill>
+                <a:latin typeface="Arial" panose="020B0604020202020204" pitchFamily="34" charset="0"/>
+                <a:cs typeface="Arial" panose="020B0604020202020204" pitchFamily="34" charset="0"/>
               </a:rPr>
               <a:t>+</a:t>
             </a:r>
@@ -1339,7 +1413,8 @@
                 <a:solidFill>
                   <a:schemeClr val="bg1"/>
                 </a:solidFill>
-                <a:cs typeface="Arial" pitchFamily="34" charset="0"/>
+                <a:latin typeface="Arial" panose="020B0604020202020204" pitchFamily="34" charset="0"/>
+                <a:cs typeface="Arial" panose="020B0604020202020204" pitchFamily="34" charset="0"/>
               </a:rPr>
               <a:t>,  a ≠ 1 </a:t>
             </a:r>
@@ -1347,7 +1422,8 @@
               <a:solidFill>
                 <a:schemeClr val="bg1"/>
               </a:solidFill>
-              <a:cs typeface="Arial" pitchFamily="34" charset="0"/>
+              <a:latin typeface="Arial" panose="020B0604020202020204" pitchFamily="34" charset="0"/>
+              <a:cs typeface="Arial" panose="020B0604020202020204" pitchFamily="34" charset="0"/>
             </a:endParaRPr>
           </a:p>
         </p:txBody>
@@ -1433,7 +1509,8 @@
                 <a:solidFill>
                   <a:schemeClr val="tx1"/>
                 </a:solidFill>
-                <a:cs typeface="Arial" pitchFamily="34" charset="0"/>
+                <a:latin typeface="Arial" panose="020B0604020202020204" pitchFamily="34" charset="0"/>
+                <a:cs typeface="Arial" panose="020B0604020202020204" pitchFamily="34" charset="0"/>
               </a:rPr>
               <a:t>se puede representar  </a:t>
             </a:r>
@@ -1441,7 +1518,8 @@
               <a:solidFill>
                 <a:schemeClr val="tx1"/>
               </a:solidFill>
-              <a:cs typeface="Arial" pitchFamily="34" charset="0"/>
+              <a:latin typeface="Arial" panose="020B0604020202020204" pitchFamily="34" charset="0"/>
+              <a:cs typeface="Arial" panose="020B0604020202020204" pitchFamily="34" charset="0"/>
             </a:endParaRPr>
           </a:p>
         </p:txBody>
@@ -1543,7 +1621,8 @@
                 <a:solidFill>
                   <a:schemeClr val="tx1"/>
                 </a:solidFill>
-                <a:cs typeface="Arial" pitchFamily="34" charset="0"/>
+                <a:latin typeface="Arial" panose="020B0604020202020204" pitchFamily="34" charset="0"/>
+                <a:cs typeface="Arial" panose="020B0604020202020204" pitchFamily="34" charset="0"/>
               </a:rPr>
               <a:t>Cuando</a:t>
             </a:r>
@@ -1552,7 +1631,8 @@
                 <a:solidFill>
                   <a:srgbClr val="FF0000"/>
                 </a:solidFill>
-                <a:cs typeface="Arial" pitchFamily="34" charset="0"/>
+                <a:latin typeface="Arial" panose="020B0604020202020204" pitchFamily="34" charset="0"/>
+                <a:cs typeface="Arial" panose="020B0604020202020204" pitchFamily="34" charset="0"/>
               </a:rPr>
               <a:t>   </a:t>
             </a:r>
@@ -1560,7 +1640,8 @@
               <a:solidFill>
                 <a:srgbClr val="FF0000"/>
               </a:solidFill>
-              <a:cs typeface="Arial" pitchFamily="34" charset="0"/>
+              <a:latin typeface="Arial" panose="020B0604020202020204" pitchFamily="34" charset="0"/>
+              <a:cs typeface="Arial" panose="020B0604020202020204" pitchFamily="34" charset="0"/>
             </a:endParaRPr>
           </a:p>
         </p:txBody>
@@ -1689,7 +1770,8 @@
                 <a:solidFill>
                   <a:schemeClr val="tx1"/>
                 </a:solidFill>
-                <a:cs typeface="Arial" pitchFamily="34" charset="0"/>
+                <a:latin typeface="Arial" panose="020B0604020202020204" pitchFamily="34" charset="0"/>
+                <a:cs typeface="Arial" panose="020B0604020202020204" pitchFamily="34" charset="0"/>
               </a:rPr>
               <a:t>de forma algebraica </a:t>
             </a:r>
@@ -1697,7 +1779,8 @@
               <a:solidFill>
                 <a:schemeClr val="tx1"/>
               </a:solidFill>
-              <a:cs typeface="Arial" pitchFamily="34" charset="0"/>
+              <a:latin typeface="Arial" panose="020B0604020202020204" pitchFamily="34" charset="0"/>
+              <a:cs typeface="Arial" panose="020B0604020202020204" pitchFamily="34" charset="0"/>
             </a:endParaRPr>
           </a:p>
         </p:txBody>
@@ -1862,7 +1945,8 @@
                 <a:solidFill>
                   <a:schemeClr val="tx1"/>
                 </a:solidFill>
-                <a:cs typeface="Arial" pitchFamily="34" charset="0"/>
+                <a:latin typeface="Arial" panose="020B0604020202020204" pitchFamily="34" charset="0"/>
+                <a:cs typeface="Arial" panose="020B0604020202020204" pitchFamily="34" charset="0"/>
               </a:rPr>
               <a:t>determina una   </a:t>
             </a:r>
@@ -1870,7 +1954,8 @@
               <a:solidFill>
                 <a:schemeClr val="tx1"/>
               </a:solidFill>
-              <a:cs typeface="Arial" pitchFamily="34" charset="0"/>
+              <a:latin typeface="Arial" panose="020B0604020202020204" pitchFamily="34" charset="0"/>
+              <a:cs typeface="Arial" panose="020B0604020202020204" pitchFamily="34" charset="0"/>
             </a:endParaRPr>
           </a:p>
         </p:txBody>
@@ -1955,24 +2040,38 @@
                 <a:solidFill>
                   <a:schemeClr val="tx1"/>
                 </a:solidFill>
-                <a:cs typeface="Arial" pitchFamily="34" charset="0"/>
-              </a:rPr>
-              <a:t>ecuación  exponencial            y=</a:t>
+                <a:latin typeface="Arial" panose="020B0604020202020204" pitchFamily="34" charset="0"/>
+                <a:cs typeface="Arial" panose="020B0604020202020204" pitchFamily="34" charset="0"/>
+              </a:rPr>
+              <a:t>ecuación  exponencial            y =</a:t>
+            </a:r>
+            <a:r>
+              <a:rPr lang="es-ES_tradnl" sz="900" i="1" dirty="0" smtClean="0">
+                <a:solidFill>
+                  <a:schemeClr val="tx1"/>
+                </a:solidFill>
+                <a:latin typeface="Arial" panose="020B0604020202020204" pitchFamily="34" charset="0"/>
+                <a:cs typeface="Arial" panose="020B0604020202020204" pitchFamily="34" charset="0"/>
+              </a:rPr>
+              <a:t> </a:t>
             </a:r>
             <a:r>
               <a:rPr lang="es-ES_tradnl" sz="900" i="1" dirty="0">
                 <a:solidFill>
                   <a:schemeClr val="tx1"/>
                 </a:solidFill>
-              </a:rPr>
-              <a:t> a </a:t>
+                <a:latin typeface="Arial" panose="020B0604020202020204" pitchFamily="34" charset="0"/>
+                <a:cs typeface="Arial" panose="020B0604020202020204" pitchFamily="34" charset="0"/>
+              </a:rPr>
+              <a:t>a </a:t>
             </a:r>
             <a:r>
               <a:rPr lang="es-CO" sz="900" baseline="30000" dirty="0" smtClean="0">
                 <a:solidFill>
                   <a:schemeClr val="tx1"/>
                 </a:solidFill>
-                <a:cs typeface="Arial" pitchFamily="34" charset="0"/>
+                <a:latin typeface="Arial" panose="020B0604020202020204" pitchFamily="34" charset="0"/>
+                <a:cs typeface="Arial" panose="020B0604020202020204" pitchFamily="34" charset="0"/>
               </a:rPr>
               <a:t>x</a:t>
             </a:r>
@@ -1981,7 +2080,8 @@
                 <a:solidFill>
                   <a:schemeClr val="tx1"/>
                 </a:solidFill>
-                <a:cs typeface="Arial" pitchFamily="34" charset="0"/>
+                <a:latin typeface="Arial" panose="020B0604020202020204" pitchFamily="34" charset="0"/>
+                <a:cs typeface="Arial" panose="020B0604020202020204" pitchFamily="34" charset="0"/>
               </a:rPr>
               <a:t>  </a:t>
             </a:r>
@@ -1989,7 +2089,8 @@
               <a:solidFill>
                 <a:schemeClr val="tx1"/>
               </a:solidFill>
-              <a:cs typeface="Arial" pitchFamily="34" charset="0"/>
+              <a:latin typeface="Arial" panose="020B0604020202020204" pitchFamily="34" charset="0"/>
+              <a:cs typeface="Arial" panose="020B0604020202020204" pitchFamily="34" charset="0"/>
             </a:endParaRPr>
           </a:p>
         </p:txBody>
@@ -2207,15 +2308,17 @@
                 <a:solidFill>
                   <a:schemeClr val="tx1"/>
                 </a:solidFill>
-                <a:cs typeface="Arial" pitchFamily="34" charset="0"/>
-              </a:rPr>
-              <a:t>de forma grafica  </a:t>
+                <a:latin typeface="Arial" panose="020B0604020202020204" pitchFamily="34" charset="0"/>
+                <a:cs typeface="Arial" panose="020B0604020202020204" pitchFamily="34" charset="0"/>
+              </a:rPr>
+              <a:t>de forma gráfica  </a:t>
             </a:r>
             <a:endParaRPr lang="es-CO" sz="900" b="1" dirty="0">
               <a:solidFill>
                 <a:schemeClr val="tx1"/>
               </a:solidFill>
-              <a:cs typeface="Arial" pitchFamily="34" charset="0"/>
+              <a:latin typeface="Arial" panose="020B0604020202020204" pitchFamily="34" charset="0"/>
+              <a:cs typeface="Arial" panose="020B0604020202020204" pitchFamily="34" charset="0"/>
             </a:endParaRPr>
           </a:p>
         </p:txBody>
@@ -2262,7 +2365,8 @@
                 <a:solidFill>
                   <a:schemeClr val="tx1"/>
                 </a:solidFill>
-                <a:cs typeface="Arial" pitchFamily="34" charset="0"/>
+                <a:latin typeface="Arial" panose="020B0604020202020204" pitchFamily="34" charset="0"/>
+                <a:cs typeface="Arial" panose="020B0604020202020204" pitchFamily="34" charset="0"/>
               </a:rPr>
               <a:t>ejemplo    </a:t>
             </a:r>
@@ -2270,7 +2374,8 @@
               <a:solidFill>
                 <a:schemeClr val="tx1"/>
               </a:solidFill>
-              <a:cs typeface="Arial" pitchFamily="34" charset="0"/>
+              <a:latin typeface="Arial" panose="020B0604020202020204" pitchFamily="34" charset="0"/>
+              <a:cs typeface="Arial" panose="020B0604020202020204" pitchFamily="34" charset="0"/>
             </a:endParaRPr>
           </a:p>
         </p:txBody>
@@ -2313,61 +2418,23 @@
           </a:fontRef>
         </p:style>
       </p:cxnSp>
-      <p:cxnSp>
-        <p:nvCxnSpPr>
-          <p:cNvPr id="95" name="94 Conector recto"/>
-          <p:cNvCxnSpPr>
-            <a:stCxn id="159" idx="2"/>
-            <a:endCxn id="98" idx="0"/>
-          </p:cNvCxnSpPr>
-          <p:nvPr/>
-        </p:nvCxnSpPr>
-        <p:spPr>
-          <a:xfrm>
-            <a:off x="11139354" y="6774520"/>
-            <a:ext cx="4256" cy="205917"/>
-          </a:xfrm>
-          <a:prstGeom prst="line">
-            <a:avLst/>
-          </a:prstGeom>
-          <a:ln w="12700">
-            <a:solidFill>
-              <a:schemeClr val="tx1"/>
-            </a:solidFill>
-          </a:ln>
-        </p:spPr>
-        <p:style>
-          <a:lnRef idx="1">
-            <a:schemeClr val="accent1"/>
-          </a:lnRef>
-          <a:fillRef idx="0">
-            <a:schemeClr val="accent1"/>
-          </a:fillRef>
-          <a:effectRef idx="0">
-            <a:schemeClr val="accent1"/>
-          </a:effectRef>
-          <a:fontRef idx="minor">
-            <a:schemeClr val="tx1"/>
-          </a:fontRef>
-        </p:style>
-      </p:cxnSp>
       <p:sp>
         <p:nvSpPr>
-          <p:cNvPr id="98" name="Rectángulo 35"/>
+          <p:cNvPr id="102" name="Rectángulo 33"/>
           <p:cNvSpPr/>
           <p:nvPr/>
         </p:nvSpPr>
         <p:spPr>
           <a:xfrm>
-            <a:off x="10689427" y="6980437"/>
-            <a:ext cx="908365" cy="175800"/>
+            <a:off x="153797" y="7398459"/>
+            <a:ext cx="1535872" cy="715539"/>
           </a:xfrm>
           <a:prstGeom prst="rect">
             <a:avLst/>
           </a:prstGeom>
-          <a:ln>
-            <a:noFill/>
-          </a:ln>
+          <a:solidFill>
+            <a:schemeClr val="bg1"/>
+          </a:solidFill>
         </p:spPr>
         <p:style>
           <a:lnRef idx="2">
@@ -2393,88 +2460,37 @@
                 <a:solidFill>
                   <a:schemeClr val="tx1"/>
                 </a:solidFill>
-                <a:cs typeface="Arial" pitchFamily="34" charset="0"/>
-              </a:rPr>
-              <a:t>ejemplo    </a:t>
+                <a:latin typeface="Arial" panose="020B0604020202020204" pitchFamily="34" charset="0"/>
+                <a:cs typeface="Arial" panose="020B0604020202020204" pitchFamily="34" charset="0"/>
+              </a:rPr>
+              <a:t>y = 3</a:t>
+            </a:r>
+            <a:r>
+              <a:rPr lang="es-CO" sz="900" baseline="30000" dirty="0" smtClean="0">
+                <a:solidFill>
+                  <a:schemeClr val="tx1"/>
+                </a:solidFill>
+                <a:latin typeface="Arial" panose="020B0604020202020204" pitchFamily="34" charset="0"/>
+                <a:cs typeface="Arial" panose="020B0604020202020204" pitchFamily="34" charset="0"/>
+              </a:rPr>
+              <a:t>x</a:t>
+            </a:r>
+            <a:r>
+              <a:rPr lang="es-CO" sz="900" dirty="0" smtClean="0">
+                <a:solidFill>
+                  <a:schemeClr val="tx1"/>
+                </a:solidFill>
+                <a:latin typeface="Arial" panose="020B0604020202020204" pitchFamily="34" charset="0"/>
+                <a:cs typeface="Arial" panose="020B0604020202020204" pitchFamily="34" charset="0"/>
+              </a:rPr>
+              <a:t>  </a:t>
             </a:r>
             <a:endParaRPr lang="es-CO" sz="900" dirty="0">
               <a:solidFill>
                 <a:schemeClr val="tx1"/>
               </a:solidFill>
-              <a:cs typeface="Arial" pitchFamily="34" charset="0"/>
-            </a:endParaRPr>
-          </a:p>
-        </p:txBody>
-      </p:sp>
-      <p:sp>
-        <p:nvSpPr>
-          <p:cNvPr id="102" name="Rectángulo 33"/>
-          <p:cNvSpPr/>
-          <p:nvPr/>
-        </p:nvSpPr>
-        <p:spPr>
-          <a:xfrm>
-            <a:off x="153797" y="7398459"/>
-            <a:ext cx="1535872" cy="715539"/>
-          </a:xfrm>
-          <a:prstGeom prst="rect">
-            <a:avLst/>
-          </a:prstGeom>
-          <a:solidFill>
-            <a:schemeClr val="bg1"/>
-          </a:solidFill>
-        </p:spPr>
-        <p:style>
-          <a:lnRef idx="2">
-            <a:schemeClr val="dk1"/>
-          </a:lnRef>
-          <a:fillRef idx="1">
-            <a:schemeClr val="lt1"/>
-          </a:fillRef>
-          <a:effectRef idx="0">
-            <a:schemeClr val="dk1"/>
-          </a:effectRef>
-          <a:fontRef idx="minor">
-            <a:schemeClr val="dk1"/>
-          </a:fontRef>
-        </p:style>
-        <p:txBody>
-          <a:bodyPr lIns="105683" tIns="52841" rIns="105683" bIns="52841" rtlCol="0" anchor="ctr"/>
-          <a:lstStyle/>
-          <a:p>
-            <a:pPr algn="ctr"/>
-            <a:r>
-              <a:rPr lang="es-CO" sz="900" dirty="0" smtClean="0">
-                <a:solidFill>
-                  <a:schemeClr val="tx1"/>
-                </a:solidFill>
-                <a:cs typeface="Arial" pitchFamily="34" charset="0"/>
-              </a:rPr>
-              <a:t>y = 3 </a:t>
-            </a:r>
-            <a:r>
-              <a:rPr lang="es-CO" sz="900" baseline="30000" dirty="0" smtClean="0">
-                <a:solidFill>
-                  <a:schemeClr val="tx1"/>
-                </a:solidFill>
-                <a:cs typeface="Arial" pitchFamily="34" charset="0"/>
-              </a:rPr>
-              <a:t>x</a:t>
-            </a:r>
-            <a:r>
-              <a:rPr lang="es-CO" sz="900" dirty="0" smtClean="0">
-                <a:solidFill>
-                  <a:schemeClr val="tx1"/>
-                </a:solidFill>
-                <a:cs typeface="Arial" pitchFamily="34" charset="0"/>
-              </a:rPr>
-              <a:t>  </a:t>
-            </a:r>
-            <a:endParaRPr lang="es-CO" sz="900" dirty="0">
-              <a:solidFill>
-                <a:schemeClr val="tx1"/>
-              </a:solidFill>
-              <a:cs typeface="Arial" pitchFamily="34" charset="0"/>
+              <a:latin typeface="Arial" panose="020B0604020202020204" pitchFamily="34" charset="0"/>
+              <a:cs typeface="Arial" panose="020B0604020202020204" pitchFamily="34" charset="0"/>
             </a:endParaRPr>
           </a:p>
         </p:txBody>
@@ -2519,99 +2535,6 @@
       </p:cxnSp>
       <p:sp>
         <p:nvSpPr>
-          <p:cNvPr id="108" name="Rectángulo 33"/>
-          <p:cNvSpPr/>
-          <p:nvPr/>
-        </p:nvSpPr>
-        <p:spPr>
-          <a:xfrm>
-            <a:off x="2258615" y="7261503"/>
-            <a:ext cx="1535872" cy="1339033"/>
-          </a:xfrm>
-          <a:prstGeom prst="rect">
-            <a:avLst/>
-          </a:prstGeom>
-          <a:solidFill>
-            <a:schemeClr val="bg1"/>
-          </a:solidFill>
-        </p:spPr>
-        <p:style>
-          <a:lnRef idx="2">
-            <a:schemeClr val="dk1"/>
-          </a:lnRef>
-          <a:fillRef idx="1">
-            <a:schemeClr val="lt1"/>
-          </a:fillRef>
-          <a:effectRef idx="0">
-            <a:schemeClr val="dk1"/>
-          </a:effectRef>
-          <a:fontRef idx="minor">
-            <a:schemeClr val="dk1"/>
-          </a:fontRef>
-        </p:style>
-        <p:txBody>
-          <a:bodyPr lIns="105683" tIns="52841" rIns="105683" bIns="52841" rtlCol="0" anchor="ctr"/>
-          <a:lstStyle/>
-          <a:p>
-            <a:pPr algn="ctr"/>
-            <a:r>
-              <a:rPr lang="es-CO" sz="1000" dirty="0" smtClean="0">
-                <a:solidFill>
-                  <a:srgbClr val="FF0000"/>
-                </a:solidFill>
-                <a:cs typeface="Arial" pitchFamily="34" charset="0"/>
-              </a:rPr>
-              <a:t>  </a:t>
-            </a:r>
-            <a:endParaRPr lang="es-CO" sz="1000" dirty="0">
-              <a:solidFill>
-                <a:srgbClr val="FF0000"/>
-              </a:solidFill>
-              <a:cs typeface="Arial" pitchFamily="34" charset="0"/>
-            </a:endParaRPr>
-          </a:p>
-        </p:txBody>
-      </p:sp>
-      <p:cxnSp>
-        <p:nvCxnSpPr>
-          <p:cNvPr id="109" name="108 Conector recto"/>
-          <p:cNvCxnSpPr>
-            <a:stCxn id="98" idx="2"/>
-            <a:endCxn id="223" idx="0"/>
-          </p:cNvCxnSpPr>
-          <p:nvPr/>
-        </p:nvCxnSpPr>
-        <p:spPr>
-          <a:xfrm>
-            <a:off x="11143610" y="7156237"/>
-            <a:ext cx="4682" cy="215128"/>
-          </a:xfrm>
-          <a:prstGeom prst="line">
-            <a:avLst/>
-          </a:prstGeom>
-          <a:ln w="12700">
-            <a:solidFill>
-              <a:schemeClr val="tx1"/>
-            </a:solidFill>
-          </a:ln>
-        </p:spPr>
-        <p:style>
-          <a:lnRef idx="1">
-            <a:schemeClr val="accent1"/>
-          </a:lnRef>
-          <a:fillRef idx="0">
-            <a:schemeClr val="accent1"/>
-          </a:fillRef>
-          <a:effectRef idx="0">
-            <a:schemeClr val="accent1"/>
-          </a:effectRef>
-          <a:fontRef idx="minor">
-            <a:schemeClr val="tx1"/>
-          </a:fontRef>
-        </p:style>
-      </p:cxnSp>
-      <p:sp>
-        <p:nvSpPr>
           <p:cNvPr id="114" name="Rectángulo 33"/>
           <p:cNvSpPr/>
           <p:nvPr/>
@@ -2654,6 +2577,8 @@
                 <a:solidFill>
                   <a:schemeClr val="bg1"/>
                 </a:solidFill>
+                <a:latin typeface="Arial" panose="020B0604020202020204" pitchFamily="34" charset="0"/>
+                <a:cs typeface="Arial" panose="020B0604020202020204" pitchFamily="34" charset="0"/>
               </a:rPr>
               <a:t>ƒ : ℝ → ℝ </a:t>
             </a:r>
@@ -2662,6 +2587,8 @@
                 <a:solidFill>
                   <a:schemeClr val="bg1"/>
                 </a:solidFill>
+                <a:latin typeface="Arial" panose="020B0604020202020204" pitchFamily="34" charset="0"/>
+                <a:cs typeface="Arial" panose="020B0604020202020204" pitchFamily="34" charset="0"/>
               </a:rPr>
               <a:t>+</a:t>
             </a:r>
@@ -2670,7 +2597,8 @@
                 <a:solidFill>
                   <a:schemeClr val="bg1"/>
                 </a:solidFill>
-                <a:cs typeface="Arial" pitchFamily="34" charset="0"/>
+                <a:latin typeface="Arial" panose="020B0604020202020204" pitchFamily="34" charset="0"/>
+                <a:cs typeface="Arial" panose="020B0604020202020204" pitchFamily="34" charset="0"/>
               </a:rPr>
               <a:t> </a:t>
             </a:r>
@@ -2678,7 +2606,8 @@
               <a:solidFill>
                 <a:schemeClr val="bg1"/>
               </a:solidFill>
-              <a:cs typeface="Arial" pitchFamily="34" charset="0"/>
+              <a:latin typeface="Arial" panose="020B0604020202020204" pitchFamily="34" charset="0"/>
+              <a:cs typeface="Arial" panose="020B0604020202020204" pitchFamily="34" charset="0"/>
             </a:endParaRPr>
           </a:p>
           <a:p>
@@ -2688,6 +2617,8 @@
                 <a:solidFill>
                   <a:schemeClr val="bg1"/>
                 </a:solidFill>
+                <a:latin typeface="Arial" panose="020B0604020202020204" pitchFamily="34" charset="0"/>
+                <a:cs typeface="Arial" panose="020B0604020202020204" pitchFamily="34" charset="0"/>
               </a:rPr>
               <a:t>ƒ(x</a:t>
             </a:r>
@@ -2696,6 +2627,8 @@
                 <a:solidFill>
                   <a:schemeClr val="bg1"/>
                 </a:solidFill>
+                <a:latin typeface="Arial" panose="020B0604020202020204" pitchFamily="34" charset="0"/>
+                <a:cs typeface="Arial" panose="020B0604020202020204" pitchFamily="34" charset="0"/>
               </a:rPr>
               <a:t>)= log </a:t>
             </a:r>
@@ -2704,6 +2637,8 @@
                 <a:solidFill>
                   <a:schemeClr val="bg1"/>
                 </a:solidFill>
+                <a:latin typeface="Arial" panose="020B0604020202020204" pitchFamily="34" charset="0"/>
+                <a:cs typeface="Arial" panose="020B0604020202020204" pitchFamily="34" charset="0"/>
               </a:rPr>
               <a:t>a</a:t>
             </a:r>
@@ -2712,6 +2647,8 @@
                 <a:solidFill>
                   <a:schemeClr val="bg1"/>
                 </a:solidFill>
+                <a:latin typeface="Arial" panose="020B0604020202020204" pitchFamily="34" charset="0"/>
+                <a:cs typeface="Arial" panose="020B0604020202020204" pitchFamily="34" charset="0"/>
               </a:rPr>
               <a:t>a</a:t>
             </a:r>
@@ -2720,6 +2657,8 @@
                 <a:solidFill>
                   <a:schemeClr val="bg1"/>
                 </a:solidFill>
+                <a:latin typeface="Arial" panose="020B0604020202020204" pitchFamily="34" charset="0"/>
+                <a:cs typeface="Arial" panose="020B0604020202020204" pitchFamily="34" charset="0"/>
               </a:rPr>
               <a:t> </a:t>
             </a:r>
@@ -2728,6 +2667,8 @@
                 <a:solidFill>
                   <a:schemeClr val="bg1"/>
                 </a:solidFill>
+                <a:latin typeface="Arial" panose="020B0604020202020204" pitchFamily="34" charset="0"/>
+                <a:cs typeface="Arial" panose="020B0604020202020204" pitchFamily="34" charset="0"/>
               </a:rPr>
               <a:t>x</a:t>
             </a:r>
@@ -2736,6 +2677,8 @@
                 <a:solidFill>
                   <a:schemeClr val="bg1"/>
                 </a:solidFill>
+                <a:latin typeface="Arial" panose="020B0604020202020204" pitchFamily="34" charset="0"/>
+                <a:cs typeface="Arial" panose="020B0604020202020204" pitchFamily="34" charset="0"/>
               </a:rPr>
               <a:t>, </a:t>
             </a:r>
@@ -2744,7 +2687,8 @@
                 <a:solidFill>
                   <a:schemeClr val="bg1"/>
                 </a:solidFill>
-                <a:cs typeface="Arial" pitchFamily="34" charset="0"/>
+                <a:latin typeface="Arial" panose="020B0604020202020204" pitchFamily="34" charset="0"/>
+                <a:cs typeface="Arial" panose="020B0604020202020204" pitchFamily="34" charset="0"/>
               </a:rPr>
               <a:t>a∈</a:t>
             </a:r>
@@ -2753,6 +2697,8 @@
                 <a:solidFill>
                   <a:schemeClr val="bg1"/>
                 </a:solidFill>
+                <a:latin typeface="Arial" panose="020B0604020202020204" pitchFamily="34" charset="0"/>
+                <a:cs typeface="Arial" panose="020B0604020202020204" pitchFamily="34" charset="0"/>
               </a:rPr>
               <a:t> ℝ </a:t>
             </a:r>
@@ -2761,6 +2707,8 @@
                 <a:solidFill>
                   <a:schemeClr val="bg1"/>
                 </a:solidFill>
+                <a:latin typeface="Arial" panose="020B0604020202020204" pitchFamily="34" charset="0"/>
+                <a:cs typeface="Arial" panose="020B0604020202020204" pitchFamily="34" charset="0"/>
               </a:rPr>
               <a:t>+</a:t>
             </a:r>
@@ -2769,6 +2717,8 @@
                 <a:solidFill>
                   <a:schemeClr val="bg1"/>
                 </a:solidFill>
+                <a:latin typeface="Arial" panose="020B0604020202020204" pitchFamily="34" charset="0"/>
+                <a:cs typeface="Arial" panose="020B0604020202020204" pitchFamily="34" charset="0"/>
               </a:rPr>
               <a:t>  , </a:t>
             </a:r>
@@ -2777,6 +2727,8 @@
                 <a:solidFill>
                   <a:schemeClr val="bg1"/>
                 </a:solidFill>
+                <a:latin typeface="Arial" panose="020B0604020202020204" pitchFamily="34" charset="0"/>
+                <a:cs typeface="Arial" panose="020B0604020202020204" pitchFamily="34" charset="0"/>
               </a:rPr>
               <a:t>a </a:t>
             </a:r>
@@ -2785,6 +2737,8 @@
                 <a:solidFill>
                   <a:schemeClr val="bg1"/>
                 </a:solidFill>
+                <a:latin typeface="Arial" panose="020B0604020202020204" pitchFamily="34" charset="0"/>
+                <a:cs typeface="Arial" panose="020B0604020202020204" pitchFamily="34" charset="0"/>
               </a:rPr>
               <a:t>≠ 1</a:t>
             </a:r>
@@ -2792,6 +2746,8 @@
               <a:solidFill>
                 <a:schemeClr val="bg1"/>
               </a:solidFill>
+              <a:latin typeface="Arial" panose="020B0604020202020204" pitchFamily="34" charset="0"/>
+              <a:cs typeface="Arial" panose="020B0604020202020204" pitchFamily="34" charset="0"/>
             </a:endParaRPr>
           </a:p>
         </p:txBody>
@@ -2837,7 +2793,8 @@
                 <a:solidFill>
                   <a:srgbClr val="FF0000"/>
                 </a:solidFill>
-                <a:cs typeface="Arial" pitchFamily="34" charset="0"/>
+                <a:latin typeface="Arial" panose="020B0604020202020204" pitchFamily="34" charset="0"/>
+                <a:cs typeface="Arial" panose="020B0604020202020204" pitchFamily="34" charset="0"/>
               </a:rPr>
               <a:t>    </a:t>
             </a:r>
@@ -2845,19 +2802,22 @@
           <a:p>
             <a:pPr algn="ctr"/>
             <a:r>
-              <a:rPr lang="es-CO" sz="900" smtClean="0">
-                <a:solidFill>
-                  <a:schemeClr val="tx1"/>
-                </a:solidFill>
-                <a:cs typeface="Arial" pitchFamily="34" charset="0"/>
+              <a:rPr lang="es-CO" sz="900" dirty="0" smtClean="0">
+                <a:solidFill>
+                  <a:schemeClr val="tx1"/>
+                </a:solidFill>
+                <a:latin typeface="Arial" panose="020B0604020202020204" pitchFamily="34" charset="0"/>
+                <a:cs typeface="Arial" panose="020B0604020202020204" pitchFamily="34" charset="0"/>
               </a:rPr>
               <a:t>0 &lt; </a:t>
             </a:r>
             <a:r>
-              <a:rPr lang="es-ES_tradnl" sz="900" i="1" smtClean="0">
-                <a:solidFill>
-                  <a:schemeClr val="tx1"/>
-                </a:solidFill>
+              <a:rPr lang="es-ES_tradnl" sz="900" i="1" dirty="0" smtClean="0">
+                <a:solidFill>
+                  <a:schemeClr val="tx1"/>
+                </a:solidFill>
+                <a:latin typeface="Arial" panose="020B0604020202020204" pitchFamily="34" charset="0"/>
+                <a:cs typeface="Arial" panose="020B0604020202020204" pitchFamily="34" charset="0"/>
               </a:rPr>
               <a:t>a </a:t>
             </a:r>
@@ -2866,7 +2826,8 @@
                 <a:solidFill>
                   <a:schemeClr val="tx1"/>
                 </a:solidFill>
-                <a:cs typeface="Arial" pitchFamily="34" charset="0"/>
+                <a:latin typeface="Arial" panose="020B0604020202020204" pitchFamily="34" charset="0"/>
+                <a:cs typeface="Arial" panose="020B0604020202020204" pitchFamily="34" charset="0"/>
               </a:rPr>
               <a:t>&lt; 1 </a:t>
             </a:r>
@@ -2875,9 +2836,30 @@
                 <a:solidFill>
                   <a:schemeClr val="tx1"/>
                 </a:solidFill>
-                <a:cs typeface="Arial" pitchFamily="34" charset="0"/>
-              </a:rPr>
-              <a:t>la grafica es decreciente   </a:t>
+                <a:latin typeface="Arial" panose="020B0604020202020204" pitchFamily="34" charset="0"/>
+                <a:cs typeface="Arial" panose="020B0604020202020204" pitchFamily="34" charset="0"/>
+              </a:rPr>
+              <a:t>la </a:t>
+            </a:r>
+            <a:r>
+              <a:rPr lang="es-CO" sz="900" dirty="0" smtClean="0">
+                <a:solidFill>
+                  <a:schemeClr val="tx1"/>
+                </a:solidFill>
+                <a:latin typeface="Arial" panose="020B0604020202020204" pitchFamily="34" charset="0"/>
+                <a:cs typeface="Arial" panose="020B0604020202020204" pitchFamily="34" charset="0"/>
+              </a:rPr>
+              <a:t>gráfica </a:t>
+            </a:r>
+            <a:r>
+              <a:rPr lang="es-CO" sz="900" dirty="0">
+                <a:solidFill>
+                  <a:schemeClr val="tx1"/>
+                </a:solidFill>
+                <a:latin typeface="Arial" panose="020B0604020202020204" pitchFamily="34" charset="0"/>
+                <a:cs typeface="Arial" panose="020B0604020202020204" pitchFamily="34" charset="0"/>
+              </a:rPr>
+              <a:t>es decreciente   </a:t>
             </a:r>
           </a:p>
           <a:p>
@@ -2887,7 +2869,8 @@
                 <a:solidFill>
                   <a:srgbClr val="FF0000"/>
                 </a:solidFill>
-                <a:cs typeface="Arial" pitchFamily="34" charset="0"/>
+                <a:latin typeface="Arial" panose="020B0604020202020204" pitchFamily="34" charset="0"/>
+                <a:cs typeface="Arial" panose="020B0604020202020204" pitchFamily="34" charset="0"/>
               </a:rPr>
               <a:t> </a:t>
             </a:r>
@@ -2895,155 +2878,8 @@
               <a:solidFill>
                 <a:srgbClr val="FF0000"/>
               </a:solidFill>
-              <a:cs typeface="Arial" pitchFamily="34" charset="0"/>
-            </a:endParaRPr>
-          </a:p>
-        </p:txBody>
-      </p:sp>
-      <p:cxnSp>
-        <p:nvCxnSpPr>
-          <p:cNvPr id="212" name="211 Conector recto"/>
-          <p:cNvCxnSpPr/>
-          <p:nvPr/>
-        </p:nvCxnSpPr>
-        <p:spPr>
-          <a:xfrm>
-            <a:off x="10495245" y="6452652"/>
-            <a:ext cx="2207" cy="135635"/>
-          </a:xfrm>
-          <a:prstGeom prst="line">
-            <a:avLst/>
-          </a:prstGeom>
-          <a:ln w="12700">
-            <a:solidFill>
-              <a:schemeClr val="tx1"/>
-            </a:solidFill>
-          </a:ln>
-        </p:spPr>
-        <p:style>
-          <a:lnRef idx="1">
-            <a:schemeClr val="accent1"/>
-          </a:lnRef>
-          <a:fillRef idx="0">
-            <a:schemeClr val="accent1"/>
-          </a:fillRef>
-          <a:effectRef idx="0">
-            <a:schemeClr val="accent1"/>
-          </a:effectRef>
-          <a:fontRef idx="minor">
-            <a:schemeClr val="tx1"/>
-          </a:fontRef>
-        </p:style>
-      </p:cxnSp>
-      <p:sp>
-        <p:nvSpPr>
-          <p:cNvPr id="159" name="Rectángulo 33"/>
-          <p:cNvSpPr/>
-          <p:nvPr/>
-        </p:nvSpPr>
-        <p:spPr>
-          <a:xfrm>
-            <a:off x="10517286" y="6403624"/>
-            <a:ext cx="1244135" cy="370896"/>
-          </a:xfrm>
-          <a:prstGeom prst="rect">
-            <a:avLst/>
-          </a:prstGeom>
-          <a:solidFill>
-            <a:schemeClr val="bg1"/>
-          </a:solidFill>
-        </p:spPr>
-        <p:style>
-          <a:lnRef idx="2">
-            <a:schemeClr val="dk1"/>
-          </a:lnRef>
-          <a:fillRef idx="1">
-            <a:schemeClr val="lt1"/>
-          </a:fillRef>
-          <a:effectRef idx="0">
-            <a:schemeClr val="dk1"/>
-          </a:effectRef>
-          <a:fontRef idx="minor">
-            <a:schemeClr val="dk1"/>
-          </a:fontRef>
-        </p:style>
-        <p:txBody>
-          <a:bodyPr lIns="105683" tIns="52841" rIns="105683" bIns="52841" rtlCol="0" anchor="ctr"/>
-          <a:lstStyle/>
-          <a:p>
-            <a:r>
-              <a:rPr lang="es-CO" sz="900" dirty="0" smtClean="0">
-                <a:solidFill>
-                  <a:srgbClr val="FF0000"/>
-                </a:solidFill>
-                <a:cs typeface="Arial" pitchFamily="34" charset="0"/>
-              </a:rPr>
-              <a:t> </a:t>
-            </a:r>
-          </a:p>
-          <a:p>
-            <a:pPr algn="ctr"/>
-            <a:endParaRPr lang="es-CO" sz="900" dirty="0" smtClean="0">
-              <a:solidFill>
-                <a:srgbClr val="FF0000"/>
-              </a:solidFill>
-              <a:cs typeface="Arial" pitchFamily="34" charset="0"/>
-            </a:endParaRPr>
-          </a:p>
-          <a:p>
-            <a:pPr algn="ctr"/>
-            <a:r>
-              <a:rPr lang="es-ES_tradnl" sz="900" i="1" dirty="0">
-                <a:solidFill>
-                  <a:schemeClr val="tx1"/>
-                </a:solidFill>
-              </a:rPr>
-              <a:t>a</a:t>
-            </a:r>
-            <a:r>
-              <a:rPr lang="es-CO" sz="900" dirty="0" smtClean="0">
-                <a:solidFill>
-                  <a:schemeClr val="tx1"/>
-                </a:solidFill>
-                <a:cs typeface="Arial" pitchFamily="34" charset="0"/>
-              </a:rPr>
-              <a:t> &gt; 1 </a:t>
-            </a:r>
-            <a:r>
-              <a:rPr lang="es-CO" sz="900" dirty="0">
-                <a:solidFill>
-                  <a:schemeClr val="tx1"/>
-                </a:solidFill>
-                <a:cs typeface="Arial" pitchFamily="34" charset="0"/>
-              </a:rPr>
-              <a:t>la grafica es creciente </a:t>
-            </a:r>
-          </a:p>
-          <a:p>
-            <a:pPr algn="ctr"/>
-            <a:endParaRPr lang="es-CO" sz="900" dirty="0" smtClean="0">
-              <a:solidFill>
-                <a:srgbClr val="FF0000"/>
-              </a:solidFill>
-              <a:cs typeface="Arial" pitchFamily="34" charset="0"/>
-            </a:endParaRPr>
-          </a:p>
-          <a:p>
-            <a:pPr algn="ctr"/>
-            <a:r>
-              <a:rPr lang="es-CO" sz="900" dirty="0" smtClean="0">
-                <a:solidFill>
-                  <a:srgbClr val="FF0000"/>
-                </a:solidFill>
-                <a:cs typeface="Arial" pitchFamily="34" charset="0"/>
-              </a:rPr>
-              <a:t> </a:t>
-            </a:r>
-            <a:endParaRPr lang="es-CO" sz="900" dirty="0">
-              <a:solidFill>
-                <a:srgbClr val="FF0000"/>
-              </a:solidFill>
-              <a:cs typeface="Arial" pitchFamily="34" charset="0"/>
+              <a:latin typeface="Arial" panose="020B0604020202020204" pitchFamily="34" charset="0"/>
+              <a:cs typeface="Arial" panose="020B0604020202020204" pitchFamily="34" charset="0"/>
             </a:endParaRPr>
           </a:p>
         </p:txBody>
@@ -3092,7 +2928,6 @@
           <p:cNvPr id="174" name="173 Conector angular"/>
           <p:cNvCxnSpPr>
             <a:stCxn id="168" idx="2"/>
-            <a:endCxn id="159" idx="0"/>
           </p:cNvCxnSpPr>
           <p:nvPr/>
         </p:nvCxnSpPr>
@@ -3129,14 +2964,14 @@
       </p:cxnSp>
       <p:sp>
         <p:nvSpPr>
-          <p:cNvPr id="178" name="Rectángulo 35"/>
+          <p:cNvPr id="154" name="Rectángulo 35"/>
           <p:cNvSpPr/>
           <p:nvPr/>
         </p:nvSpPr>
         <p:spPr>
           <a:xfrm>
-            <a:off x="12346777" y="6980437"/>
-            <a:ext cx="908365" cy="175800"/>
+            <a:off x="3984468" y="3905976"/>
+            <a:ext cx="1191057" cy="384264"/>
           </a:xfrm>
           <a:prstGeom prst="rect">
             <a:avLst/>
@@ -3169,267 +3004,17 @@
                 <a:solidFill>
                   <a:schemeClr val="tx1"/>
                 </a:solidFill>
-                <a:cs typeface="Arial" pitchFamily="34" charset="0"/>
-              </a:rPr>
-              <a:t>ejemplo    </a:t>
+                <a:latin typeface="Arial" panose="020B0604020202020204" pitchFamily="34" charset="0"/>
+                <a:cs typeface="Arial" panose="020B0604020202020204" pitchFamily="34" charset="0"/>
+              </a:rPr>
+              <a:t>Sus características son   </a:t>
             </a:r>
             <a:endParaRPr lang="es-CO" sz="900" dirty="0">
               <a:solidFill>
                 <a:schemeClr val="tx1"/>
               </a:solidFill>
-              <a:cs typeface="Arial" pitchFamily="34" charset="0"/>
-            </a:endParaRPr>
-          </a:p>
-        </p:txBody>
-      </p:sp>
-      <p:sp>
-        <p:nvSpPr>
-          <p:cNvPr id="180" name="Rectángulo 33"/>
-          <p:cNvSpPr/>
-          <p:nvPr/>
-        </p:nvSpPr>
-        <p:spPr>
-          <a:xfrm>
-            <a:off x="3941366" y="7261503"/>
-            <a:ext cx="1535872" cy="1339033"/>
-          </a:xfrm>
-          <a:prstGeom prst="rect">
-            <a:avLst/>
-          </a:prstGeom>
-          <a:solidFill>
-            <a:schemeClr val="bg1"/>
-          </a:solidFill>
-        </p:spPr>
-        <p:style>
-          <a:lnRef idx="2">
-            <a:schemeClr val="dk1"/>
-          </a:lnRef>
-          <a:fillRef idx="1">
-            <a:schemeClr val="lt1"/>
-          </a:fillRef>
-          <a:effectRef idx="0">
-            <a:schemeClr val="dk1"/>
-          </a:effectRef>
-          <a:fontRef idx="minor">
-            <a:schemeClr val="dk1"/>
-          </a:fontRef>
-        </p:style>
-        <p:txBody>
-          <a:bodyPr lIns="105683" tIns="52841" rIns="105683" bIns="52841" rtlCol="0" anchor="ctr"/>
-          <a:lstStyle/>
-          <a:p>
-            <a:pPr algn="ctr"/>
-            <a:r>
-              <a:rPr lang="es-CO" sz="1000" dirty="0" smtClean="0">
-                <a:solidFill>
-                  <a:srgbClr val="FF0000"/>
-                </a:solidFill>
-                <a:cs typeface="Arial" pitchFamily="34" charset="0"/>
-              </a:rPr>
-              <a:t>  </a:t>
-            </a:r>
-            <a:endParaRPr lang="es-CO" sz="1000" dirty="0">
-              <a:solidFill>
-                <a:srgbClr val="FF0000"/>
-              </a:solidFill>
-              <a:cs typeface="Arial" pitchFamily="34" charset="0"/>
-            </a:endParaRPr>
-          </a:p>
-        </p:txBody>
-      </p:sp>
-      <p:cxnSp>
-        <p:nvCxnSpPr>
-          <p:cNvPr id="182" name="181 Conector recto"/>
-          <p:cNvCxnSpPr>
-            <a:stCxn id="178" idx="2"/>
-            <a:endCxn id="224" idx="0"/>
-          </p:cNvCxnSpPr>
-          <p:nvPr/>
-        </p:nvCxnSpPr>
-        <p:spPr>
-          <a:xfrm>
-            <a:off x="12800960" y="7156237"/>
-            <a:ext cx="14207" cy="234178"/>
-          </a:xfrm>
-          <a:prstGeom prst="line">
-            <a:avLst/>
-          </a:prstGeom>
-          <a:ln w="12700">
-            <a:solidFill>
-              <a:schemeClr val="tx1"/>
-            </a:solidFill>
-          </a:ln>
-        </p:spPr>
-        <p:style>
-          <a:lnRef idx="1">
-            <a:schemeClr val="accent1"/>
-          </a:lnRef>
-          <a:fillRef idx="0">
-            <a:schemeClr val="accent1"/>
-          </a:fillRef>
-          <a:effectRef idx="0">
-            <a:schemeClr val="accent1"/>
-          </a:effectRef>
-          <a:fontRef idx="minor">
-            <a:schemeClr val="tx1"/>
-          </a:fontRef>
-        </p:style>
-      </p:cxnSp>
-      <p:cxnSp>
-        <p:nvCxnSpPr>
-          <p:cNvPr id="184" name="183 Conector recto"/>
-          <p:cNvCxnSpPr>
-            <a:stCxn id="164" idx="2"/>
-            <a:endCxn id="178" idx="0"/>
-          </p:cNvCxnSpPr>
-          <p:nvPr/>
-        </p:nvCxnSpPr>
-        <p:spPr>
-          <a:xfrm flipH="1">
-            <a:off x="12800960" y="6766256"/>
-            <a:ext cx="69" cy="214181"/>
-          </a:xfrm>
-          <a:prstGeom prst="line">
-            <a:avLst/>
-          </a:prstGeom>
-          <a:ln w="12700">
-            <a:solidFill>
-              <a:schemeClr val="tx1"/>
-            </a:solidFill>
-          </a:ln>
-        </p:spPr>
-        <p:style>
-          <a:lnRef idx="1">
-            <a:schemeClr val="accent1"/>
-          </a:lnRef>
-          <a:fillRef idx="0">
-            <a:schemeClr val="accent1"/>
-          </a:fillRef>
-          <a:effectRef idx="0">
-            <a:schemeClr val="accent1"/>
-          </a:effectRef>
-          <a:fontRef idx="minor">
-            <a:schemeClr val="tx1"/>
-          </a:fontRef>
-        </p:style>
-      </p:cxnSp>
-      <p:pic>
-        <p:nvPicPr>
-          <p:cNvPr id="185" name="184 Imagen" descr="J:\ecuaciones guion 7\imagenes\1.jpg"/>
-          <p:cNvPicPr/>
-          <p:nvPr/>
-        </p:nvPicPr>
-        <p:blipFill>
-          <a:blip r:embed="rId2" cstate="print">
-            <a:extLst>
-              <a:ext uri="{28A0092B-C50C-407E-A947-70E740481C1C}">
-                <a14:useLocalDpi xmlns:a14="http://schemas.microsoft.com/office/drawing/2010/main" val="0"/>
-              </a:ext>
-            </a:extLst>
-          </a:blip>
-          <a:srcRect/>
-          <a:stretch>
-            <a:fillRect/>
-          </a:stretch>
-        </p:blipFill>
-        <p:spPr bwMode="auto">
-          <a:xfrm>
-            <a:off x="2360673" y="7382017"/>
-            <a:ext cx="1391140" cy="1167487"/>
-          </a:xfrm>
-          <a:prstGeom prst="rect">
-            <a:avLst/>
-          </a:prstGeom>
-          <a:noFill/>
-          <a:ln>
-            <a:noFill/>
-          </a:ln>
-        </p:spPr>
-      </p:pic>
-      <p:pic>
-        <p:nvPicPr>
-          <p:cNvPr id="186" name="185 Imagen" descr="J:\ecuaciones guion 7\imagenes\2.jpg"/>
-          <p:cNvPicPr/>
-          <p:nvPr/>
-        </p:nvPicPr>
-        <p:blipFill>
-          <a:blip r:embed="rId3" cstate="print">
-            <a:extLst>
-              <a:ext uri="{28A0092B-C50C-407E-A947-70E740481C1C}">
-                <a14:useLocalDpi xmlns:a14="http://schemas.microsoft.com/office/drawing/2010/main" val="0"/>
-              </a:ext>
-            </a:extLst>
-          </a:blip>
-          <a:srcRect/>
-          <a:stretch>
-            <a:fillRect/>
-          </a:stretch>
-        </p:blipFill>
-        <p:spPr bwMode="auto">
-          <a:xfrm>
-            <a:off x="4037242" y="7410571"/>
-            <a:ext cx="1334613" cy="1120590"/>
-          </a:xfrm>
-          <a:prstGeom prst="rect">
-            <a:avLst/>
-          </a:prstGeom>
-          <a:noFill/>
-          <a:ln>
-            <a:noFill/>
-          </a:ln>
-        </p:spPr>
-      </p:pic>
-      <p:sp>
-        <p:nvSpPr>
-          <p:cNvPr id="154" name="Rectángulo 35"/>
-          <p:cNvSpPr/>
-          <p:nvPr/>
-        </p:nvSpPr>
-        <p:spPr>
-          <a:xfrm>
-            <a:off x="3984468" y="3905976"/>
-            <a:ext cx="1191057" cy="384264"/>
-          </a:xfrm>
-          <a:prstGeom prst="rect">
-            <a:avLst/>
-          </a:prstGeom>
-          <a:ln>
-            <a:noFill/>
-          </a:ln>
-        </p:spPr>
-        <p:style>
-          <a:lnRef idx="2">
-            <a:schemeClr val="dk1"/>
-          </a:lnRef>
-          <a:fillRef idx="1">
-            <a:schemeClr val="lt1"/>
-          </a:fillRef>
-          <a:effectRef idx="0">
-            <a:schemeClr val="dk1"/>
-          </a:effectRef>
-          <a:fontRef idx="minor">
-            <a:schemeClr val="dk1"/>
-          </a:fontRef>
-        </p:style>
-        <p:txBody>
-          <a:bodyPr lIns="105683" tIns="52841" rIns="105683" bIns="52841" rtlCol="0" anchor="ctr"/>
-          <a:lstStyle/>
-          <a:p>
-            <a:pPr algn="ctr"/>
-            <a:r>
-              <a:rPr lang="es-CO" sz="900" dirty="0" smtClean="0">
-                <a:solidFill>
-                  <a:schemeClr val="tx1"/>
-                </a:solidFill>
-                <a:cs typeface="Arial" pitchFamily="34" charset="0"/>
-              </a:rPr>
-              <a:t>Sus características son   </a:t>
-            </a:r>
-            <a:endParaRPr lang="es-CO" sz="900" dirty="0">
-              <a:solidFill>
-                <a:schemeClr val="tx1"/>
-              </a:solidFill>
-              <a:cs typeface="Arial" pitchFamily="34" charset="0"/>
+              <a:latin typeface="Arial" panose="020B0604020202020204" pitchFamily="34" charset="0"/>
+              <a:cs typeface="Arial" panose="020B0604020202020204" pitchFamily="34" charset="0"/>
             </a:endParaRPr>
           </a:p>
         </p:txBody>
@@ -3556,7 +3141,8 @@
               <a:solidFill>
                 <a:schemeClr val="tx1"/>
               </a:solidFill>
-              <a:cs typeface="Arial" pitchFamily="34" charset="0"/>
+              <a:latin typeface="Arial" panose="020B0604020202020204" pitchFamily="34" charset="0"/>
+              <a:cs typeface="Arial" panose="020B0604020202020204" pitchFamily="34" charset="0"/>
             </a:endParaRPr>
           </a:p>
           <a:p>
@@ -3566,7 +3152,8 @@
                 <a:solidFill>
                   <a:schemeClr val="tx1"/>
                 </a:solidFill>
-                <a:cs typeface="Arial" pitchFamily="34" charset="0"/>
+                <a:latin typeface="Arial" panose="020B0604020202020204" pitchFamily="34" charset="0"/>
+                <a:cs typeface="Arial" panose="020B0604020202020204" pitchFamily="34" charset="0"/>
               </a:rPr>
               <a:t>Dominio   </a:t>
             </a:r>
@@ -3575,6 +3162,8 @@
                 <a:solidFill>
                   <a:schemeClr val="tx1"/>
                 </a:solidFill>
+                <a:latin typeface="Arial" panose="020B0604020202020204" pitchFamily="34" charset="0"/>
+                <a:cs typeface="Arial" panose="020B0604020202020204" pitchFamily="34" charset="0"/>
               </a:rPr>
               <a:t>ℝ</a:t>
             </a:r>
@@ -3586,7 +3175,8 @@
                 <a:solidFill>
                   <a:schemeClr val="tx1"/>
                 </a:solidFill>
-                <a:cs typeface="Arial" pitchFamily="34" charset="0"/>
+                <a:latin typeface="Arial" panose="020B0604020202020204" pitchFamily="34" charset="0"/>
+                <a:cs typeface="Arial" panose="020B0604020202020204" pitchFamily="34" charset="0"/>
               </a:rPr>
               <a:t>  Rango   </a:t>
             </a:r>
@@ -3595,6 +3185,8 @@
                 <a:solidFill>
                   <a:schemeClr val="tx1"/>
                 </a:solidFill>
+                <a:latin typeface="Arial" panose="020B0604020202020204" pitchFamily="34" charset="0"/>
+                <a:cs typeface="Arial" panose="020B0604020202020204" pitchFamily="34" charset="0"/>
               </a:rPr>
               <a:t>ℝ</a:t>
             </a:r>
@@ -3603,7 +3195,8 @@
                 <a:solidFill>
                   <a:schemeClr val="tx1"/>
                 </a:solidFill>
-                <a:cs typeface="Arial" pitchFamily="34" charset="0"/>
+                <a:latin typeface="Arial" panose="020B0604020202020204" pitchFamily="34" charset="0"/>
+                <a:cs typeface="Arial" panose="020B0604020202020204" pitchFamily="34" charset="0"/>
               </a:rPr>
               <a:t> </a:t>
             </a:r>
@@ -3612,7 +3205,8 @@
                 <a:solidFill>
                   <a:schemeClr val="tx1"/>
                 </a:solidFill>
-                <a:cs typeface="Arial" pitchFamily="34" charset="0"/>
+                <a:latin typeface="Arial" panose="020B0604020202020204" pitchFamily="34" charset="0"/>
+                <a:cs typeface="Arial" panose="020B0604020202020204" pitchFamily="34" charset="0"/>
               </a:rPr>
               <a:t>+</a:t>
             </a:r>
@@ -3621,7 +3215,8 @@
                 <a:solidFill>
                   <a:schemeClr val="tx1"/>
                 </a:solidFill>
-                <a:cs typeface="Arial" pitchFamily="34" charset="0"/>
+                <a:latin typeface="Arial" panose="020B0604020202020204" pitchFamily="34" charset="0"/>
+                <a:cs typeface="Arial" panose="020B0604020202020204" pitchFamily="34" charset="0"/>
               </a:rPr>
               <a:t>  </a:t>
             </a:r>
@@ -3629,7 +3224,8 @@
               <a:solidFill>
                 <a:schemeClr val="tx1"/>
               </a:solidFill>
-              <a:cs typeface="Arial" pitchFamily="34" charset="0"/>
+              <a:latin typeface="Arial" panose="020B0604020202020204" pitchFamily="34" charset="0"/>
+              <a:cs typeface="Arial" panose="020B0604020202020204" pitchFamily="34" charset="0"/>
             </a:endParaRPr>
           </a:p>
           <a:p>
@@ -3638,7 +3234,8 @@
               <a:solidFill>
                 <a:schemeClr val="tx1"/>
               </a:solidFill>
-              <a:cs typeface="Arial" pitchFamily="34" charset="0"/>
+              <a:latin typeface="Arial" panose="020B0604020202020204" pitchFamily="34" charset="0"/>
+              <a:cs typeface="Arial" panose="020B0604020202020204" pitchFamily="34" charset="0"/>
             </a:endParaRPr>
           </a:p>
         </p:txBody>
@@ -3727,7 +3324,8 @@
                 <a:solidFill>
                   <a:schemeClr val="tx1"/>
                 </a:solidFill>
-                <a:cs typeface="Arial" pitchFamily="34" charset="0"/>
+                <a:latin typeface="Arial" panose="020B0604020202020204" pitchFamily="34" charset="0"/>
+                <a:cs typeface="Arial" panose="020B0604020202020204" pitchFamily="34" charset="0"/>
               </a:rPr>
               <a:t>  </a:t>
             </a:r>
@@ -3735,7 +3333,8 @@
               <a:solidFill>
                 <a:schemeClr val="tx1"/>
               </a:solidFill>
-              <a:cs typeface="Arial" pitchFamily="34" charset="0"/>
+              <a:latin typeface="Arial" panose="020B0604020202020204" pitchFamily="34" charset="0"/>
+              <a:cs typeface="Arial" panose="020B0604020202020204" pitchFamily="34" charset="0"/>
             </a:endParaRPr>
           </a:p>
           <a:p>
@@ -3745,7 +3344,8 @@
                 <a:solidFill>
                   <a:schemeClr val="tx1"/>
                 </a:solidFill>
-                <a:cs typeface="Arial" pitchFamily="34" charset="0"/>
+                <a:latin typeface="Arial" panose="020B0604020202020204" pitchFamily="34" charset="0"/>
+                <a:cs typeface="Arial" panose="020B0604020202020204" pitchFamily="34" charset="0"/>
               </a:rPr>
               <a:t>Continuas  en    </a:t>
             </a:r>
@@ -3757,6 +3357,8 @@
                 <a:solidFill>
                   <a:schemeClr val="tx1"/>
                 </a:solidFill>
+                <a:latin typeface="Arial" panose="020B0604020202020204" pitchFamily="34" charset="0"/>
+                <a:cs typeface="Arial" panose="020B0604020202020204" pitchFamily="34" charset="0"/>
               </a:rPr>
               <a:t>ℝ</a:t>
             </a:r>
@@ -3765,7 +3367,8 @@
                 <a:solidFill>
                   <a:schemeClr val="tx1"/>
                 </a:solidFill>
-                <a:cs typeface="Arial" pitchFamily="34" charset="0"/>
+                <a:latin typeface="Arial" panose="020B0604020202020204" pitchFamily="34" charset="0"/>
+                <a:cs typeface="Arial" panose="020B0604020202020204" pitchFamily="34" charset="0"/>
               </a:rPr>
               <a:t> </a:t>
             </a:r>
@@ -3774,7 +3377,8 @@
                 <a:solidFill>
                   <a:schemeClr val="tx1"/>
                 </a:solidFill>
-                <a:cs typeface="Arial" pitchFamily="34" charset="0"/>
+                <a:latin typeface="Arial" panose="020B0604020202020204" pitchFamily="34" charset="0"/>
+                <a:cs typeface="Arial" panose="020B0604020202020204" pitchFamily="34" charset="0"/>
               </a:rPr>
               <a:t>+</a:t>
             </a:r>
@@ -3783,7 +3387,8 @@
                 <a:solidFill>
                   <a:schemeClr val="tx1"/>
                 </a:solidFill>
-                <a:cs typeface="Arial" pitchFamily="34" charset="0"/>
+                <a:latin typeface="Arial" panose="020B0604020202020204" pitchFamily="34" charset="0"/>
+                <a:cs typeface="Arial" panose="020B0604020202020204" pitchFamily="34" charset="0"/>
               </a:rPr>
               <a:t>  </a:t>
             </a:r>
@@ -3791,7 +3396,8 @@
               <a:solidFill>
                 <a:schemeClr val="tx1"/>
               </a:solidFill>
-              <a:cs typeface="Arial" pitchFamily="34" charset="0"/>
+              <a:latin typeface="Arial" panose="020B0604020202020204" pitchFamily="34" charset="0"/>
+              <a:cs typeface="Arial" panose="020B0604020202020204" pitchFamily="34" charset="0"/>
             </a:endParaRPr>
           </a:p>
           <a:p>
@@ -3800,7 +3406,8 @@
               <a:solidFill>
                 <a:schemeClr val="tx1"/>
               </a:solidFill>
-              <a:cs typeface="Arial" pitchFamily="34" charset="0"/>
+              <a:latin typeface="Arial" panose="020B0604020202020204" pitchFamily="34" charset="0"/>
+              <a:cs typeface="Arial" panose="020B0604020202020204" pitchFamily="34" charset="0"/>
             </a:endParaRPr>
           </a:p>
         </p:txBody>
@@ -3849,7 +3456,8 @@
                 <a:solidFill>
                   <a:schemeClr val="tx1"/>
                 </a:solidFill>
-                <a:cs typeface="Arial" pitchFamily="34" charset="0"/>
+                <a:latin typeface="Arial" panose="020B0604020202020204" pitchFamily="34" charset="0"/>
+                <a:cs typeface="Arial" panose="020B0604020202020204" pitchFamily="34" charset="0"/>
               </a:rPr>
               <a:t>  </a:t>
             </a:r>
@@ -3857,7 +3465,8 @@
               <a:solidFill>
                 <a:schemeClr val="tx1"/>
               </a:solidFill>
-              <a:cs typeface="Arial" pitchFamily="34" charset="0"/>
+              <a:latin typeface="Arial" panose="020B0604020202020204" pitchFamily="34" charset="0"/>
+              <a:cs typeface="Arial" panose="020B0604020202020204" pitchFamily="34" charset="0"/>
             </a:endParaRPr>
           </a:p>
           <a:p>
@@ -3866,7 +3475,8 @@
                 <a:solidFill>
                   <a:schemeClr val="tx1"/>
                 </a:solidFill>
-                <a:cs typeface="Arial" pitchFamily="34" charset="0"/>
+                <a:latin typeface="Arial" panose="020B0604020202020204" pitchFamily="34" charset="0"/>
+                <a:cs typeface="Arial" panose="020B0604020202020204" pitchFamily="34" charset="0"/>
               </a:rPr>
               <a:t>Corta al eje Y en 1 , No corta al eje X</a:t>
             </a:r>
@@ -3877,7 +3487,8 @@
               <a:solidFill>
                 <a:schemeClr val="tx1"/>
               </a:solidFill>
-              <a:cs typeface="Arial" pitchFamily="34" charset="0"/>
+              <a:latin typeface="Arial" panose="020B0604020202020204" pitchFamily="34" charset="0"/>
+              <a:cs typeface="Arial" panose="020B0604020202020204" pitchFamily="34" charset="0"/>
             </a:endParaRPr>
           </a:p>
         </p:txBody>
@@ -3924,7 +3535,8 @@
                 <a:solidFill>
                   <a:schemeClr val="tx1"/>
                 </a:solidFill>
-                <a:cs typeface="Arial" pitchFamily="34" charset="0"/>
+                <a:latin typeface="Arial" panose="020B0604020202020204" pitchFamily="34" charset="0"/>
+                <a:cs typeface="Arial" panose="020B0604020202020204" pitchFamily="34" charset="0"/>
               </a:rPr>
               <a:t>se puede representar  </a:t>
             </a:r>
@@ -3932,7 +3544,8 @@
               <a:solidFill>
                 <a:schemeClr val="tx1"/>
               </a:solidFill>
-              <a:cs typeface="Arial" pitchFamily="34" charset="0"/>
+              <a:latin typeface="Arial" panose="020B0604020202020204" pitchFamily="34" charset="0"/>
+              <a:cs typeface="Arial" panose="020B0604020202020204" pitchFamily="34" charset="0"/>
             </a:endParaRPr>
           </a:p>
         </p:txBody>
@@ -3979,7 +3592,8 @@
                 <a:solidFill>
                   <a:schemeClr val="tx1"/>
                 </a:solidFill>
-                <a:cs typeface="Arial" pitchFamily="34" charset="0"/>
+                <a:latin typeface="Arial" panose="020B0604020202020204" pitchFamily="34" charset="0"/>
+                <a:cs typeface="Arial" panose="020B0604020202020204" pitchFamily="34" charset="0"/>
               </a:rPr>
               <a:t>Cuando</a:t>
             </a:r>
@@ -3988,7 +3602,8 @@
                 <a:solidFill>
                   <a:srgbClr val="FF0000"/>
                 </a:solidFill>
-                <a:cs typeface="Arial" pitchFamily="34" charset="0"/>
+                <a:latin typeface="Arial" panose="020B0604020202020204" pitchFamily="34" charset="0"/>
+                <a:cs typeface="Arial" panose="020B0604020202020204" pitchFamily="34" charset="0"/>
               </a:rPr>
               <a:t>   </a:t>
             </a:r>
@@ -3996,7 +3611,8 @@
               <a:solidFill>
                 <a:srgbClr val="FF0000"/>
               </a:solidFill>
-              <a:cs typeface="Arial" pitchFamily="34" charset="0"/>
+              <a:latin typeface="Arial" panose="020B0604020202020204" pitchFamily="34" charset="0"/>
+              <a:cs typeface="Arial" panose="020B0604020202020204" pitchFamily="34" charset="0"/>
             </a:endParaRPr>
           </a:p>
         </p:txBody>
@@ -4045,7 +3661,8 @@
                 <a:solidFill>
                   <a:schemeClr val="tx1"/>
                 </a:solidFill>
-                <a:cs typeface="Arial" pitchFamily="34" charset="0"/>
+                <a:latin typeface="Arial" panose="020B0604020202020204" pitchFamily="34" charset="0"/>
+                <a:cs typeface="Arial" panose="020B0604020202020204" pitchFamily="34" charset="0"/>
               </a:rPr>
               <a:t>de forma algebraica </a:t>
             </a:r>
@@ -4053,7 +3670,8 @@
               <a:solidFill>
                 <a:schemeClr val="tx1"/>
               </a:solidFill>
-              <a:cs typeface="Arial" pitchFamily="34" charset="0"/>
+              <a:latin typeface="Arial" panose="020B0604020202020204" pitchFamily="34" charset="0"/>
+              <a:cs typeface="Arial" panose="020B0604020202020204" pitchFamily="34" charset="0"/>
             </a:endParaRPr>
           </a:p>
         </p:txBody>
@@ -4218,7 +3836,8 @@
                 <a:solidFill>
                   <a:schemeClr val="tx1"/>
                 </a:solidFill>
-                <a:cs typeface="Arial" pitchFamily="34" charset="0"/>
+                <a:latin typeface="Arial" panose="020B0604020202020204" pitchFamily="34" charset="0"/>
+                <a:cs typeface="Arial" panose="020B0604020202020204" pitchFamily="34" charset="0"/>
               </a:rPr>
               <a:t>determina una   </a:t>
             </a:r>
@@ -4226,7 +3845,8 @@
               <a:solidFill>
                 <a:schemeClr val="tx1"/>
               </a:solidFill>
-              <a:cs typeface="Arial" pitchFamily="34" charset="0"/>
+              <a:latin typeface="Arial" panose="020B0604020202020204" pitchFamily="34" charset="0"/>
+              <a:cs typeface="Arial" panose="020B0604020202020204" pitchFamily="34" charset="0"/>
             </a:endParaRPr>
           </a:p>
         </p:txBody>
@@ -4313,15 +3933,17 @@
                 <a:solidFill>
                   <a:schemeClr val="tx1"/>
                 </a:solidFill>
-                <a:cs typeface="Arial" pitchFamily="34" charset="0"/>
-              </a:rPr>
-              <a:t>de forma grafica  </a:t>
+                <a:latin typeface="Arial" panose="020B0604020202020204" pitchFamily="34" charset="0"/>
+                <a:cs typeface="Arial" panose="020B0604020202020204" pitchFamily="34" charset="0"/>
+              </a:rPr>
+              <a:t>de forma gráfica  </a:t>
             </a:r>
             <a:endParaRPr lang="es-CO" sz="900" b="1" dirty="0">
               <a:solidFill>
                 <a:schemeClr val="tx1"/>
               </a:solidFill>
-              <a:cs typeface="Arial" pitchFamily="34" charset="0"/>
+              <a:latin typeface="Arial" panose="020B0604020202020204" pitchFamily="34" charset="0"/>
+              <a:cs typeface="Arial" panose="020B0604020202020204" pitchFamily="34" charset="0"/>
             </a:endParaRPr>
           </a:p>
         </p:txBody>
@@ -4334,7 +3956,7 @@
         </p:nvSpPr>
         <p:spPr>
           <a:xfrm>
-            <a:off x="8661774" y="6112147"/>
+            <a:off x="8661774" y="6054997"/>
             <a:ext cx="1535872" cy="715539"/>
           </a:xfrm>
           <a:prstGeom prst="rect">
@@ -4368,32 +3990,47 @@
                 <a:solidFill>
                   <a:schemeClr val="tx1"/>
                 </a:solidFill>
-                <a:cs typeface="Arial" pitchFamily="34" charset="0"/>
+                <a:latin typeface="Arial" panose="020B0604020202020204" pitchFamily="34" charset="0"/>
+                <a:cs typeface="Arial" panose="020B0604020202020204" pitchFamily="34" charset="0"/>
               </a:rPr>
               <a:t>ecuación  logarítmica            y = log</a:t>
             </a:r>
             <a:r>
-              <a:rPr lang="es-ES_tradnl" sz="900" i="1" baseline="-25000" dirty="0">
-                <a:solidFill>
-                  <a:schemeClr val="tx1"/>
-                </a:solidFill>
-              </a:rPr>
-              <a:t>a</a:t>
-            </a:r>
-            <a:r>
-              <a:rPr lang="es-CO" sz="900" dirty="0" smtClean="0">
-                <a:solidFill>
-                  <a:schemeClr val="tx1"/>
-                </a:solidFill>
-                <a:cs typeface="Arial" pitchFamily="34" charset="0"/>
-              </a:rPr>
-              <a:t>x  </a:t>
+              <a:rPr lang="es-ES_tradnl" sz="900" i="1" baseline="-25000" dirty="0" smtClean="0">
+                <a:solidFill>
+                  <a:schemeClr val="tx1"/>
+                </a:solidFill>
+                <a:latin typeface="Arial" panose="020B0604020202020204" pitchFamily="34" charset="0"/>
+                <a:cs typeface="Arial" panose="020B0604020202020204" pitchFamily="34" charset="0"/>
+              </a:rPr>
+              <a:t>a </a:t>
+            </a:r>
+            <a:r>
+              <a:rPr lang="es-CO" sz="900" i="1" dirty="0" smtClean="0">
+                <a:solidFill>
+                  <a:schemeClr val="tx1"/>
+                </a:solidFill>
+                <a:latin typeface="Arial" panose="020B0604020202020204" pitchFamily="34" charset="0"/>
+                <a:cs typeface="Arial" panose="020B0604020202020204" pitchFamily="34" charset="0"/>
+              </a:rPr>
+              <a:t>x</a:t>
+            </a:r>
+            <a:r>
+              <a:rPr lang="es-CO" sz="900" dirty="0" smtClean="0">
+                <a:solidFill>
+                  <a:schemeClr val="tx1"/>
+                </a:solidFill>
+                <a:latin typeface="Arial" panose="020B0604020202020204" pitchFamily="34" charset="0"/>
+                <a:cs typeface="Arial" panose="020B0604020202020204" pitchFamily="34" charset="0"/>
+              </a:rPr>
+              <a:t>  </a:t>
             </a:r>
             <a:endParaRPr lang="es-CO" sz="900" dirty="0">
               <a:solidFill>
                 <a:schemeClr val="tx1"/>
               </a:solidFill>
-              <a:cs typeface="Arial" pitchFamily="34" charset="0"/>
+              <a:latin typeface="Arial" panose="020B0604020202020204" pitchFamily="34" charset="0"/>
+              <a:cs typeface="Arial" panose="020B0604020202020204" pitchFamily="34" charset="0"/>
             </a:endParaRPr>
           </a:p>
         </p:txBody>
@@ -4477,7 +4114,8 @@
                 <a:solidFill>
                   <a:schemeClr val="tx1"/>
                 </a:solidFill>
-                <a:cs typeface="Arial" pitchFamily="34" charset="0"/>
+                <a:latin typeface="Arial" panose="020B0604020202020204" pitchFamily="34" charset="0"/>
+                <a:cs typeface="Arial" panose="020B0604020202020204" pitchFamily="34" charset="0"/>
               </a:rPr>
               <a:t>ejemplo    </a:t>
             </a:r>
@@ -4485,7 +4123,8 @@
               <a:solidFill>
                 <a:schemeClr val="tx1"/>
               </a:solidFill>
-              <a:cs typeface="Arial" pitchFamily="34" charset="0"/>
+              <a:latin typeface="Arial" panose="020B0604020202020204" pitchFamily="34" charset="0"/>
+              <a:cs typeface="Arial" panose="020B0604020202020204" pitchFamily="34" charset="0"/>
             </a:endParaRPr>
           </a:p>
         </p:txBody>
@@ -4535,7 +4174,7 @@
         </p:nvSpPr>
         <p:spPr>
           <a:xfrm>
-            <a:off x="8709647" y="7499614"/>
+            <a:off x="8696947" y="7334514"/>
             <a:ext cx="1535872" cy="715539"/>
           </a:xfrm>
           <a:prstGeom prst="rect">
@@ -4569,7 +4208,8 @@
                 <a:solidFill>
                   <a:schemeClr val="tx1"/>
                 </a:solidFill>
-                <a:cs typeface="Arial" pitchFamily="34" charset="0"/>
+                <a:latin typeface="Arial" panose="020B0604020202020204" pitchFamily="34" charset="0"/>
+                <a:cs typeface="Arial" panose="020B0604020202020204" pitchFamily="34" charset="0"/>
               </a:rPr>
               <a:t>y =log </a:t>
             </a:r>
@@ -4578,7 +4218,8 @@
                 <a:solidFill>
                   <a:schemeClr val="tx1"/>
                 </a:solidFill>
-                <a:cs typeface="Arial" pitchFamily="34" charset="0"/>
+                <a:latin typeface="Arial" panose="020B0604020202020204" pitchFamily="34" charset="0"/>
+                <a:cs typeface="Arial" panose="020B0604020202020204" pitchFamily="34" charset="0"/>
               </a:rPr>
               <a:t>3</a:t>
             </a:r>
@@ -4587,7 +4228,8 @@
                 <a:solidFill>
                   <a:schemeClr val="tx1"/>
                 </a:solidFill>
-                <a:cs typeface="Arial" pitchFamily="34" charset="0"/>
+                <a:latin typeface="Arial" panose="020B0604020202020204" pitchFamily="34" charset="0"/>
+                <a:cs typeface="Arial" panose="020B0604020202020204" pitchFamily="34" charset="0"/>
               </a:rPr>
               <a:t> x  </a:t>
             </a:r>
@@ -4595,7 +4237,8 @@
               <a:solidFill>
                 <a:schemeClr val="tx1"/>
               </a:solidFill>
-              <a:cs typeface="Arial" pitchFamily="34" charset="0"/>
+              <a:latin typeface="Arial" panose="020B0604020202020204" pitchFamily="34" charset="0"/>
+              <a:cs typeface="Arial" panose="020B0604020202020204" pitchFamily="34" charset="0"/>
             </a:endParaRPr>
           </a:p>
         </p:txBody>
@@ -4637,136 +4280,6 @@
           </a:fontRef>
         </p:style>
       </p:cxnSp>
-      <p:cxnSp>
-        <p:nvCxnSpPr>
-          <p:cNvPr id="207" name="206 Conector recto"/>
-          <p:cNvCxnSpPr>
-            <a:stCxn id="216" idx="2"/>
-            <a:endCxn id="211" idx="0"/>
-          </p:cNvCxnSpPr>
-          <p:nvPr/>
-        </p:nvCxnSpPr>
-        <p:spPr>
-          <a:xfrm>
-            <a:off x="3051952" y="6637212"/>
-            <a:ext cx="4256" cy="205917"/>
-          </a:xfrm>
-          <a:prstGeom prst="line">
-            <a:avLst/>
-          </a:prstGeom>
-          <a:ln w="12700">
-            <a:solidFill>
-              <a:schemeClr val="tx1"/>
-            </a:solidFill>
-          </a:ln>
-        </p:spPr>
-        <p:style>
-          <a:lnRef idx="1">
-            <a:schemeClr val="accent1"/>
-          </a:lnRef>
-          <a:fillRef idx="0">
-            <a:schemeClr val="accent1"/>
-          </a:fillRef>
-          <a:effectRef idx="0">
-            <a:schemeClr val="accent1"/>
-          </a:effectRef>
-          <a:fontRef idx="minor">
-            <a:schemeClr val="tx1"/>
-          </a:fontRef>
-        </p:style>
-      </p:cxnSp>
-      <p:sp>
-        <p:nvSpPr>
-          <p:cNvPr id="211" name="Rectángulo 35"/>
-          <p:cNvSpPr/>
-          <p:nvPr/>
-        </p:nvSpPr>
-        <p:spPr>
-          <a:xfrm>
-            <a:off x="2602025" y="6843129"/>
-            <a:ext cx="908365" cy="175800"/>
-          </a:xfrm>
-          <a:prstGeom prst="rect">
-            <a:avLst/>
-          </a:prstGeom>
-          <a:ln>
-            <a:noFill/>
-          </a:ln>
-        </p:spPr>
-        <p:style>
-          <a:lnRef idx="2">
-            <a:schemeClr val="dk1"/>
-          </a:lnRef>
-          <a:fillRef idx="1">
-            <a:schemeClr val="lt1"/>
-          </a:fillRef>
-          <a:effectRef idx="0">
-            <a:schemeClr val="dk1"/>
-          </a:effectRef>
-          <a:fontRef idx="minor">
-            <a:schemeClr val="dk1"/>
-          </a:fontRef>
-        </p:style>
-        <p:txBody>
-          <a:bodyPr lIns="105683" tIns="52841" rIns="105683" bIns="52841" rtlCol="0" anchor="ctr"/>
-          <a:lstStyle/>
-          <a:p>
-            <a:pPr algn="ctr"/>
-            <a:r>
-              <a:rPr lang="es-CO" sz="900" dirty="0" smtClean="0">
-                <a:solidFill>
-                  <a:schemeClr val="tx1"/>
-                </a:solidFill>
-                <a:cs typeface="Arial" pitchFamily="34" charset="0"/>
-              </a:rPr>
-              <a:t>ejemplo    </a:t>
-            </a:r>
-            <a:endParaRPr lang="es-CO" sz="900" dirty="0">
-              <a:solidFill>
-                <a:schemeClr val="tx1"/>
-              </a:solidFill>
-              <a:cs typeface="Arial" pitchFamily="34" charset="0"/>
-            </a:endParaRPr>
-          </a:p>
-        </p:txBody>
-      </p:sp>
-      <p:cxnSp>
-        <p:nvCxnSpPr>
-          <p:cNvPr id="213" name="212 Conector recto"/>
-          <p:cNvCxnSpPr>
-            <a:stCxn id="211" idx="2"/>
-          </p:cNvCxnSpPr>
-          <p:nvPr/>
-        </p:nvCxnSpPr>
-        <p:spPr>
-          <a:xfrm>
-            <a:off x="3056208" y="7018929"/>
-            <a:ext cx="8505" cy="251738"/>
-          </a:xfrm>
-          <a:prstGeom prst="line">
-            <a:avLst/>
-          </a:prstGeom>
-          <a:ln w="12700">
-            <a:solidFill>
-              <a:schemeClr val="tx1"/>
-            </a:solidFill>
-          </a:ln>
-        </p:spPr>
-        <p:style>
-          <a:lnRef idx="1">
-            <a:schemeClr val="accent1"/>
-          </a:lnRef>
-          <a:fillRef idx="0">
-            <a:schemeClr val="accent1"/>
-          </a:fillRef>
-          <a:effectRef idx="0">
-            <a:schemeClr val="accent1"/>
-          </a:effectRef>
-          <a:fontRef idx="minor">
-            <a:schemeClr val="tx1"/>
-          </a:fontRef>
-        </p:style>
-      </p:cxnSp>
       <p:sp>
         <p:nvSpPr>
           <p:cNvPr id="214" name="Rectángulo 33"/>
@@ -4808,7 +4321,8 @@
                 <a:solidFill>
                   <a:srgbClr val="FF0000"/>
                 </a:solidFill>
-                <a:cs typeface="Arial" pitchFamily="34" charset="0"/>
+                <a:latin typeface="Arial" panose="020B0604020202020204" pitchFamily="34" charset="0"/>
+                <a:cs typeface="Arial" panose="020B0604020202020204" pitchFamily="34" charset="0"/>
               </a:rPr>
               <a:t>    </a:t>
             </a:r>
@@ -4820,7 +4334,8 @@
                 <a:solidFill>
                   <a:schemeClr val="tx1"/>
                 </a:solidFill>
-                <a:cs typeface="Arial" pitchFamily="34" charset="0"/>
+                <a:latin typeface="Arial" panose="020B0604020202020204" pitchFamily="34" charset="0"/>
+                <a:cs typeface="Arial" panose="020B0604020202020204" pitchFamily="34" charset="0"/>
               </a:rPr>
               <a:t>0 &lt; </a:t>
             </a:r>
@@ -4829,6 +4344,8 @@
                 <a:solidFill>
                   <a:schemeClr val="tx1"/>
                 </a:solidFill>
+                <a:latin typeface="Arial" panose="020B0604020202020204" pitchFamily="34" charset="0"/>
+                <a:cs typeface="Arial" panose="020B0604020202020204" pitchFamily="34" charset="0"/>
               </a:rPr>
               <a:t>a</a:t>
             </a:r>
@@ -4837,7 +4354,8 @@
                 <a:solidFill>
                   <a:schemeClr val="tx1"/>
                 </a:solidFill>
-                <a:cs typeface="Arial" pitchFamily="34" charset="0"/>
+                <a:latin typeface="Arial" panose="020B0604020202020204" pitchFamily="34" charset="0"/>
+                <a:cs typeface="Arial" panose="020B0604020202020204" pitchFamily="34" charset="0"/>
               </a:rPr>
               <a:t> &lt; 1 </a:t>
             </a:r>
@@ -4846,9 +4364,30 @@
                 <a:solidFill>
                   <a:schemeClr val="tx1"/>
                 </a:solidFill>
-                <a:cs typeface="Arial" pitchFamily="34" charset="0"/>
-              </a:rPr>
-              <a:t>la grafica es decreciente   </a:t>
+                <a:latin typeface="Arial" panose="020B0604020202020204" pitchFamily="34" charset="0"/>
+                <a:cs typeface="Arial" panose="020B0604020202020204" pitchFamily="34" charset="0"/>
+              </a:rPr>
+              <a:t>la </a:t>
+            </a:r>
+            <a:r>
+              <a:rPr lang="es-CO" sz="900" dirty="0" smtClean="0">
+                <a:solidFill>
+                  <a:schemeClr val="tx1"/>
+                </a:solidFill>
+                <a:latin typeface="Arial" panose="020B0604020202020204" pitchFamily="34" charset="0"/>
+                <a:cs typeface="Arial" panose="020B0604020202020204" pitchFamily="34" charset="0"/>
+              </a:rPr>
+              <a:t>gráfica </a:t>
+            </a:r>
+            <a:r>
+              <a:rPr lang="es-CO" sz="900" dirty="0">
+                <a:solidFill>
+                  <a:schemeClr val="tx1"/>
+                </a:solidFill>
+                <a:latin typeface="Arial" panose="020B0604020202020204" pitchFamily="34" charset="0"/>
+                <a:cs typeface="Arial" panose="020B0604020202020204" pitchFamily="34" charset="0"/>
+              </a:rPr>
+              <a:t>es decreciente   </a:t>
             </a:r>
           </a:p>
           <a:p>
@@ -4858,7 +4397,8 @@
                 <a:solidFill>
                   <a:srgbClr val="FF0000"/>
                 </a:solidFill>
-                <a:cs typeface="Arial" pitchFamily="34" charset="0"/>
+                <a:latin typeface="Arial" panose="020B0604020202020204" pitchFamily="34" charset="0"/>
+                <a:cs typeface="Arial" panose="020B0604020202020204" pitchFamily="34" charset="0"/>
               </a:rPr>
               <a:t> </a:t>
             </a:r>
@@ -4866,163 +4406,8 @@
               <a:solidFill>
                 <a:srgbClr val="FF0000"/>
               </a:solidFill>
-              <a:cs typeface="Arial" pitchFamily="34" charset="0"/>
-            </a:endParaRPr>
-          </a:p>
-        </p:txBody>
-      </p:sp>
-      <p:cxnSp>
-        <p:nvCxnSpPr>
-          <p:cNvPr id="215" name="214 Conector recto"/>
-          <p:cNvCxnSpPr/>
-          <p:nvPr/>
-        </p:nvCxnSpPr>
-        <p:spPr>
-          <a:xfrm>
-            <a:off x="2407843" y="6315344"/>
-            <a:ext cx="2207" cy="135635"/>
-          </a:xfrm>
-          <a:prstGeom prst="line">
-            <a:avLst/>
-          </a:prstGeom>
-          <a:ln w="12700">
-            <a:solidFill>
-              <a:schemeClr val="tx1"/>
-            </a:solidFill>
-          </a:ln>
-        </p:spPr>
-        <p:style>
-          <a:lnRef idx="1">
-            <a:schemeClr val="accent1"/>
-          </a:lnRef>
-          <a:fillRef idx="0">
-            <a:schemeClr val="accent1"/>
-          </a:fillRef>
-          <a:effectRef idx="0">
-            <a:schemeClr val="accent1"/>
-          </a:effectRef>
-          <a:fontRef idx="minor">
-            <a:schemeClr val="tx1"/>
-          </a:fontRef>
-        </p:style>
-      </p:cxnSp>
-      <p:sp>
-        <p:nvSpPr>
-          <p:cNvPr id="216" name="Rectángulo 33"/>
-          <p:cNvSpPr/>
-          <p:nvPr/>
-        </p:nvSpPr>
-        <p:spPr>
-          <a:xfrm>
-            <a:off x="2429884" y="6266316"/>
-            <a:ext cx="1244135" cy="370896"/>
-          </a:xfrm>
-          <a:prstGeom prst="rect">
-            <a:avLst/>
-          </a:prstGeom>
-          <a:solidFill>
-            <a:schemeClr val="bg1"/>
-          </a:solidFill>
-        </p:spPr>
-        <p:style>
-          <a:lnRef idx="2">
-            <a:schemeClr val="dk1"/>
-          </a:lnRef>
-          <a:fillRef idx="1">
-            <a:schemeClr val="lt1"/>
-          </a:fillRef>
-          <a:effectRef idx="0">
-            <a:schemeClr val="dk1"/>
-          </a:effectRef>
-          <a:fontRef idx="minor">
-            <a:schemeClr val="dk1"/>
-          </a:fontRef>
-        </p:style>
-        <p:txBody>
-          <a:bodyPr lIns="105683" tIns="52841" rIns="105683" bIns="52841" rtlCol="0" anchor="ctr"/>
-          <a:lstStyle/>
-          <a:p>
-            <a:r>
-              <a:rPr lang="es-CO" sz="900" dirty="0" smtClean="0">
-                <a:solidFill>
-                  <a:srgbClr val="FF0000"/>
-                </a:solidFill>
-                <a:cs typeface="Arial" pitchFamily="34" charset="0"/>
-              </a:rPr>
-              <a:t> </a:t>
-            </a:r>
-          </a:p>
-          <a:p>
-            <a:pPr algn="ctr"/>
-            <a:endParaRPr lang="es-CO" sz="900" dirty="0" smtClean="0">
-              <a:solidFill>
-                <a:srgbClr val="FF0000"/>
-              </a:solidFill>
-              <a:cs typeface="Arial" pitchFamily="34" charset="0"/>
-            </a:endParaRPr>
-          </a:p>
-          <a:p>
-            <a:pPr algn="ctr"/>
-            <a:r>
-              <a:rPr lang="es-ES_tradnl" sz="900" i="1" dirty="0" err="1" smtClean="0">
-                <a:solidFill>
-                  <a:schemeClr val="bg1"/>
-                </a:solidFill>
-              </a:rPr>
-              <a:t>a</a:t>
-            </a:r>
-            <a:r>
-              <a:rPr lang="es-ES_tradnl" sz="900" i="1" dirty="0" err="1" smtClean="0">
-                <a:solidFill>
-                  <a:schemeClr val="tx1"/>
-                </a:solidFill>
-              </a:rPr>
-              <a:t>a</a:t>
-            </a:r>
-            <a:r>
-              <a:rPr lang="es-CO" sz="900" dirty="0" smtClean="0">
-                <a:solidFill>
-                  <a:schemeClr val="tx1"/>
-                </a:solidFill>
-                <a:cs typeface="Arial" pitchFamily="34" charset="0"/>
-              </a:rPr>
-              <a:t> &gt; 1 </a:t>
-            </a:r>
-            <a:r>
-              <a:rPr lang="es-CO" sz="900" dirty="0">
-                <a:solidFill>
-                  <a:schemeClr val="tx1"/>
-                </a:solidFill>
-                <a:cs typeface="Arial" pitchFamily="34" charset="0"/>
-              </a:rPr>
-              <a:t>la grafica es creciente </a:t>
-            </a:r>
-          </a:p>
-          <a:p>
-            <a:pPr algn="ctr"/>
-            <a:endParaRPr lang="es-CO" sz="900" dirty="0" smtClean="0">
-              <a:solidFill>
-                <a:srgbClr val="FF0000"/>
-              </a:solidFill>
-              <a:cs typeface="Arial" pitchFamily="34" charset="0"/>
-            </a:endParaRPr>
-          </a:p>
-          <a:p>
-            <a:pPr algn="ctr"/>
-            <a:r>
-              <a:rPr lang="es-CO" sz="900" dirty="0" smtClean="0">
-                <a:solidFill>
-                  <a:srgbClr val="FF0000"/>
-                </a:solidFill>
-                <a:cs typeface="Arial" pitchFamily="34" charset="0"/>
-              </a:rPr>
-              <a:t> </a:t>
-            </a:r>
-            <a:endParaRPr lang="es-CO" sz="900" dirty="0">
-              <a:solidFill>
-                <a:srgbClr val="FF0000"/>
-              </a:solidFill>
-              <a:cs typeface="Arial" pitchFamily="34" charset="0"/>
+              <a:latin typeface="Arial" panose="020B0604020202020204" pitchFamily="34" charset="0"/>
+              <a:cs typeface="Arial" panose="020B0604020202020204" pitchFamily="34" charset="0"/>
             </a:endParaRPr>
           </a:p>
         </p:txBody>
@@ -5070,10 +4455,7 @@
       <p:cxnSp>
         <p:nvCxnSpPr>
           <p:cNvPr id="218" name="217 Conector angular"/>
-          <p:cNvCxnSpPr>
-            <a:stCxn id="396" idx="2"/>
-            <a:endCxn id="216" idx="0"/>
-          </p:cNvCxnSpPr>
+          <p:cNvCxnSpPr/>
           <p:nvPr/>
         </p:nvCxnSpPr>
         <p:spPr>
@@ -5083,7 +4465,7 @@
           </a:xfrm>
           <a:prstGeom prst="bentConnector3">
             <a:avLst>
-              <a:gd name="adj1" fmla="val 50000"/>
+              <a:gd name="adj1" fmla="val 51348"/>
             </a:avLst>
           </a:prstGeom>
           <a:ln w="12700">
@@ -5107,374 +4489,6 @@
           </a:fontRef>
         </p:style>
       </p:cxnSp>
-      <p:sp>
-        <p:nvSpPr>
-          <p:cNvPr id="219" name="Rectángulo 35"/>
-          <p:cNvSpPr/>
-          <p:nvPr/>
-        </p:nvSpPr>
-        <p:spPr>
-          <a:xfrm>
-            <a:off x="4259375" y="6843129"/>
-            <a:ext cx="908365" cy="175800"/>
-          </a:xfrm>
-          <a:prstGeom prst="rect">
-            <a:avLst/>
-          </a:prstGeom>
-          <a:ln>
-            <a:noFill/>
-          </a:ln>
-        </p:spPr>
-        <p:style>
-          <a:lnRef idx="2">
-            <a:schemeClr val="dk1"/>
-          </a:lnRef>
-          <a:fillRef idx="1">
-            <a:schemeClr val="lt1"/>
-          </a:fillRef>
-          <a:effectRef idx="0">
-            <a:schemeClr val="dk1"/>
-          </a:effectRef>
-          <a:fontRef idx="minor">
-            <a:schemeClr val="dk1"/>
-          </a:fontRef>
-        </p:style>
-        <p:txBody>
-          <a:bodyPr lIns="105683" tIns="52841" rIns="105683" bIns="52841" rtlCol="0" anchor="ctr"/>
-          <a:lstStyle/>
-          <a:p>
-            <a:pPr algn="ctr"/>
-            <a:r>
-              <a:rPr lang="es-CO" sz="900" dirty="0" smtClean="0">
-                <a:solidFill>
-                  <a:schemeClr val="tx1"/>
-                </a:solidFill>
-                <a:cs typeface="Arial" pitchFamily="34" charset="0"/>
-              </a:rPr>
-              <a:t>ejemplo    </a:t>
-            </a:r>
-            <a:endParaRPr lang="es-CO" sz="900" dirty="0">
-              <a:solidFill>
-                <a:schemeClr val="tx1"/>
-              </a:solidFill>
-              <a:cs typeface="Arial" pitchFamily="34" charset="0"/>
-            </a:endParaRPr>
-          </a:p>
-        </p:txBody>
-      </p:sp>
-      <p:cxnSp>
-        <p:nvCxnSpPr>
-          <p:cNvPr id="220" name="219 Conector recto"/>
-          <p:cNvCxnSpPr>
-            <a:stCxn id="219" idx="2"/>
-          </p:cNvCxnSpPr>
-          <p:nvPr/>
-        </p:nvCxnSpPr>
-        <p:spPr>
-          <a:xfrm>
-            <a:off x="4713558" y="7018929"/>
-            <a:ext cx="8505" cy="251738"/>
-          </a:xfrm>
-          <a:prstGeom prst="line">
-            <a:avLst/>
-          </a:prstGeom>
-          <a:ln w="12700">
-            <a:solidFill>
-              <a:schemeClr val="tx1"/>
-            </a:solidFill>
-          </a:ln>
-        </p:spPr>
-        <p:style>
-          <a:lnRef idx="1">
-            <a:schemeClr val="accent1"/>
-          </a:lnRef>
-          <a:fillRef idx="0">
-            <a:schemeClr val="accent1"/>
-          </a:fillRef>
-          <a:effectRef idx="0">
-            <a:schemeClr val="accent1"/>
-          </a:effectRef>
-          <a:fontRef idx="minor">
-            <a:schemeClr val="tx1"/>
-          </a:fontRef>
-        </p:style>
-      </p:cxnSp>
-      <p:cxnSp>
-        <p:nvCxnSpPr>
-          <p:cNvPr id="222" name="221 Conector recto"/>
-          <p:cNvCxnSpPr>
-            <a:stCxn id="214" idx="2"/>
-            <a:endCxn id="219" idx="0"/>
-          </p:cNvCxnSpPr>
-          <p:nvPr/>
-        </p:nvCxnSpPr>
-        <p:spPr>
-          <a:xfrm flipH="1">
-            <a:off x="4713558" y="6639834"/>
-            <a:ext cx="69" cy="203295"/>
-          </a:xfrm>
-          <a:prstGeom prst="line">
-            <a:avLst/>
-          </a:prstGeom>
-          <a:ln w="12700">
-            <a:solidFill>
-              <a:schemeClr val="tx1"/>
-            </a:solidFill>
-          </a:ln>
-        </p:spPr>
-        <p:style>
-          <a:lnRef idx="1">
-            <a:schemeClr val="accent1"/>
-          </a:lnRef>
-          <a:fillRef idx="0">
-            <a:schemeClr val="accent1"/>
-          </a:fillRef>
-          <a:effectRef idx="0">
-            <a:schemeClr val="accent1"/>
-          </a:effectRef>
-          <a:fontRef idx="minor">
-            <a:schemeClr val="tx1"/>
-          </a:fontRef>
-        </p:style>
-      </p:cxnSp>
-      <p:sp>
-        <p:nvSpPr>
-          <p:cNvPr id="223" name="Rectángulo 33"/>
-          <p:cNvSpPr/>
-          <p:nvPr/>
-        </p:nvSpPr>
-        <p:spPr>
-          <a:xfrm>
-            <a:off x="10380356" y="7371365"/>
-            <a:ext cx="1535872" cy="1711408"/>
-          </a:xfrm>
-          <a:prstGeom prst="rect">
-            <a:avLst/>
-          </a:prstGeom>
-          <a:solidFill>
-            <a:schemeClr val="bg1"/>
-          </a:solidFill>
-        </p:spPr>
-        <p:style>
-          <a:lnRef idx="2">
-            <a:schemeClr val="dk1"/>
-          </a:lnRef>
-          <a:fillRef idx="1">
-            <a:schemeClr val="lt1"/>
-          </a:fillRef>
-          <a:effectRef idx="0">
-            <a:schemeClr val="dk1"/>
-          </a:effectRef>
-          <a:fontRef idx="minor">
-            <a:schemeClr val="dk1"/>
-          </a:fontRef>
-        </p:style>
-        <p:txBody>
-          <a:bodyPr lIns="105683" tIns="52841" rIns="105683" bIns="52841" rtlCol="0" anchor="ctr"/>
-          <a:lstStyle/>
-          <a:p>
-            <a:pPr algn="ctr"/>
-            <a:r>
-              <a:rPr lang="es-CO" sz="1000" dirty="0" smtClean="0">
-                <a:solidFill>
-                  <a:srgbClr val="FF0000"/>
-                </a:solidFill>
-                <a:cs typeface="Arial" pitchFamily="34" charset="0"/>
-              </a:rPr>
-              <a:t>  </a:t>
-            </a:r>
-            <a:endParaRPr lang="es-CO" sz="1000" dirty="0">
-              <a:solidFill>
-                <a:srgbClr val="FF0000"/>
-              </a:solidFill>
-              <a:cs typeface="Arial" pitchFamily="34" charset="0"/>
-            </a:endParaRPr>
-          </a:p>
-        </p:txBody>
-      </p:sp>
-      <p:pic>
-        <p:nvPicPr>
-          <p:cNvPr id="1026" name="Picture 2"/>
-          <p:cNvPicPr>
-            <a:picLocks noChangeAspect="1" noChangeArrowheads="1"/>
-          </p:cNvPicPr>
-          <p:nvPr/>
-        </p:nvPicPr>
-        <p:blipFill>
-          <a:blip r:embed="rId4" cstate="print">
-            <a:extLst>
-              <a:ext uri="{28A0092B-C50C-407E-A947-70E740481C1C}">
-                <a14:useLocalDpi xmlns:a14="http://schemas.microsoft.com/office/drawing/2010/main" val="0"/>
-              </a:ext>
-            </a:extLst>
-          </a:blip>
-          <a:srcRect/>
-          <a:stretch>
-            <a:fillRect/>
-          </a:stretch>
-        </p:blipFill>
-        <p:spPr bwMode="auto">
-          <a:xfrm>
-            <a:off x="10457731" y="7530340"/>
-            <a:ext cx="1394251" cy="1466479"/>
-          </a:xfrm>
-          <a:prstGeom prst="rect">
-            <a:avLst/>
-          </a:prstGeom>
-          <a:noFill/>
-          <a:ln>
-            <a:noFill/>
-          </a:ln>
-          <a:effectLst/>
-          <a:extLst>
-            <a:ext uri="{909E8E84-426E-40DD-AFC4-6F175D3DCCD1}">
-              <a14:hiddenFill xmlns:a14="http://schemas.microsoft.com/office/drawing/2010/main">
-                <a:solidFill>
-                  <a:schemeClr val="accent1"/>
-                </a:solidFill>
-              </a14:hiddenFill>
-            </a:ext>
-            <a:ext uri="{91240B29-F687-4F45-9708-019B960494DF}">
-              <a14:hiddenLine xmlns:a14="http://schemas.microsoft.com/office/drawing/2010/main" w="9525">
-                <a:solidFill>
-                  <a:schemeClr val="tx1"/>
-                </a:solidFill>
-                <a:miter lim="800000"/>
-                <a:headEnd/>
-                <a:tailEnd/>
-              </a14:hiddenLine>
-            </a:ext>
-            <a:ext uri="{AF507438-7753-43E0-B8FC-AC1667EBCBE1}">
-              <a14:hiddenEffects xmlns:a14="http://schemas.microsoft.com/office/drawing/2010/main">
-                <a:effectLst>
-                  <a:outerShdw dist="35921" dir="2700000" algn="ctr" rotWithShape="0">
-                    <a:schemeClr val="bg2"/>
-                  </a:outerShdw>
-                </a:effectLst>
-              </a14:hiddenEffects>
-            </a:ext>
-          </a:extLst>
-        </p:spPr>
-      </p:pic>
-      <p:sp>
-        <p:nvSpPr>
-          <p:cNvPr id="224" name="Rectángulo 33"/>
-          <p:cNvSpPr/>
-          <p:nvPr/>
-        </p:nvSpPr>
-        <p:spPr>
-          <a:xfrm>
-            <a:off x="12047231" y="7390415"/>
-            <a:ext cx="1535872" cy="1711408"/>
-          </a:xfrm>
-          <a:prstGeom prst="rect">
-            <a:avLst/>
-          </a:prstGeom>
-          <a:solidFill>
-            <a:schemeClr val="bg1"/>
-          </a:solidFill>
-        </p:spPr>
-        <p:style>
-          <a:lnRef idx="2">
-            <a:schemeClr val="dk1"/>
-          </a:lnRef>
-          <a:fillRef idx="1">
-            <a:schemeClr val="lt1"/>
-          </a:fillRef>
-          <a:effectRef idx="0">
-            <a:schemeClr val="dk1"/>
-          </a:effectRef>
-          <a:fontRef idx="minor">
-            <a:schemeClr val="dk1"/>
-          </a:fontRef>
-        </p:style>
-        <p:txBody>
-          <a:bodyPr lIns="105683" tIns="52841" rIns="105683" bIns="52841" rtlCol="0" anchor="ctr"/>
-          <a:lstStyle/>
-          <a:p>
-            <a:pPr algn="ctr"/>
-            <a:r>
-              <a:rPr lang="es-CO" sz="1000" dirty="0" smtClean="0">
-                <a:solidFill>
-                  <a:srgbClr val="FF0000"/>
-                </a:solidFill>
-                <a:cs typeface="Arial" pitchFamily="34" charset="0"/>
-              </a:rPr>
-              <a:t>  </a:t>
-            </a:r>
-            <a:endParaRPr lang="es-CO" sz="1000" dirty="0">
-              <a:solidFill>
-                <a:srgbClr val="FF0000"/>
-              </a:solidFill>
-              <a:cs typeface="Arial" pitchFamily="34" charset="0"/>
-            </a:endParaRPr>
-          </a:p>
-        </p:txBody>
-      </p:sp>
-      <p:pic>
-        <p:nvPicPr>
-          <p:cNvPr id="1027" name="Picture 3"/>
-          <p:cNvPicPr>
-            <a:picLocks noChangeAspect="1" noChangeArrowheads="1"/>
-          </p:cNvPicPr>
-          <p:nvPr/>
-        </p:nvPicPr>
-        <p:blipFill>
-          <a:blip r:embed="rId5" cstate="print">
-            <a:extLst>
-              <a:ext uri="{28A0092B-C50C-407E-A947-70E740481C1C}">
-                <a14:useLocalDpi xmlns:a14="http://schemas.microsoft.com/office/drawing/2010/main" val="0"/>
-              </a:ext>
-            </a:extLst>
-          </a:blip>
-          <a:srcRect/>
-          <a:stretch>
-            <a:fillRect/>
-          </a:stretch>
-        </p:blipFill>
-        <p:spPr bwMode="auto">
-          <a:xfrm>
-            <a:off x="12213900" y="7462105"/>
-            <a:ext cx="1256821" cy="1573303"/>
-          </a:xfrm>
-          <a:prstGeom prst="rect">
-            <a:avLst/>
-          </a:prstGeom>
-          <a:noFill/>
-          <a:ln>
-            <a:noFill/>
-          </a:ln>
-          <a:effectLst/>
-          <a:extLst>
-            <a:ext uri="{909E8E84-426E-40DD-AFC4-6F175D3DCCD1}">
-              <a14:hiddenFill xmlns:a14="http://schemas.microsoft.com/office/drawing/2010/main">
-                <a:solidFill>
-                  <a:schemeClr val="accent1"/>
-                </a:solidFill>
-              </a14:hiddenFill>
-            </a:ext>
-            <a:ext uri="{91240B29-F687-4F45-9708-019B960494DF}">
-              <a14:hiddenLine xmlns:a14="http://schemas.microsoft.com/office/drawing/2010/main" w="9525">
-                <a:solidFill>
-                  <a:schemeClr val="tx1"/>
-                </a:solidFill>
-                <a:miter lim="800000"/>
-                <a:headEnd/>
-                <a:tailEnd/>
-              </a14:hiddenLine>
-            </a:ext>
-            <a:ext uri="{AF507438-7753-43E0-B8FC-AC1667EBCBE1}">
-              <a14:hiddenEffects xmlns:a14="http://schemas.microsoft.com/office/drawing/2010/main">
-                <a:effectLst>
-                  <a:outerShdw dist="35921" dir="2700000" algn="ctr" rotWithShape="0">
-                    <a:schemeClr val="bg2"/>
-                  </a:outerShdw>
-                </a:effectLst>
-              </a14:hiddenEffects>
-            </a:ext>
-          </a:extLst>
-        </p:spPr>
-      </p:pic>
       <p:cxnSp>
         <p:nvCxnSpPr>
           <p:cNvPr id="97" name="160 Conector angular"/>
@@ -5553,19 +4567,31 @@
           <a:p>
             <a:pPr algn="ctr"/>
             <a:r>
-              <a:rPr lang="es-CO" sz="900" dirty="0" smtClean="0">
-                <a:solidFill>
-                  <a:schemeClr val="tx1"/>
-                </a:solidFill>
-                <a:cs typeface="Arial" pitchFamily="34" charset="0"/>
-              </a:rPr>
-              <a:t>Sus características  son   </a:t>
+              <a:rPr lang="es-CO" sz="900" dirty="0">
+                <a:solidFill>
+                  <a:schemeClr val="tx1"/>
+                </a:solidFill>
+                <a:latin typeface="Arial" panose="020B0604020202020204" pitchFamily="34" charset="0"/>
+                <a:cs typeface="Arial" panose="020B0604020202020204" pitchFamily="34" charset="0"/>
+              </a:rPr>
+              <a:t>s</a:t>
+            </a:r>
+            <a:r>
+              <a:rPr lang="es-CO" sz="900" dirty="0" smtClean="0">
+                <a:solidFill>
+                  <a:schemeClr val="tx1"/>
+                </a:solidFill>
+                <a:latin typeface="Arial" panose="020B0604020202020204" pitchFamily="34" charset="0"/>
+                <a:cs typeface="Arial" panose="020B0604020202020204" pitchFamily="34" charset="0"/>
+              </a:rPr>
+              <a:t>us características  son   </a:t>
             </a:r>
             <a:endParaRPr lang="es-CO" sz="900" dirty="0">
               <a:solidFill>
                 <a:schemeClr val="tx1"/>
               </a:solidFill>
-              <a:cs typeface="Arial" pitchFamily="34" charset="0"/>
+              <a:latin typeface="Arial" panose="020B0604020202020204" pitchFamily="34" charset="0"/>
+              <a:cs typeface="Arial" panose="020B0604020202020204" pitchFamily="34" charset="0"/>
             </a:endParaRPr>
           </a:p>
         </p:txBody>
@@ -5653,25 +4679,39 @@
               <a:solidFill>
                 <a:schemeClr val="tx1"/>
               </a:solidFill>
-              <a:cs typeface="Arial" pitchFamily="34" charset="0"/>
+              <a:latin typeface="Arial" panose="020B0604020202020204" pitchFamily="34" charset="0"/>
+              <a:cs typeface="Arial" panose="020B0604020202020204" pitchFamily="34" charset="0"/>
             </a:endParaRPr>
           </a:p>
           <a:p>
             <a:pPr algn="ctr"/>
             <a:r>
-              <a:rPr lang="es-CO" sz="900" dirty="0" smtClean="0">
-                <a:solidFill>
-                  <a:schemeClr val="tx1"/>
-                </a:solidFill>
-                <a:cs typeface="Arial" pitchFamily="34" charset="0"/>
-              </a:rPr>
-              <a:t>dominio   </a:t>
+              <a:rPr lang="es-CO" sz="900" dirty="0">
+                <a:solidFill>
+                  <a:schemeClr val="tx1"/>
+                </a:solidFill>
+                <a:latin typeface="Arial" panose="020B0604020202020204" pitchFamily="34" charset="0"/>
+                <a:cs typeface="Arial" panose="020B0604020202020204" pitchFamily="34" charset="0"/>
+              </a:rPr>
+              <a:t>D</a:t>
+            </a:r>
+            <a:r>
+              <a:rPr lang="es-CO" sz="900" dirty="0" smtClean="0">
+                <a:solidFill>
+                  <a:schemeClr val="tx1"/>
+                </a:solidFill>
+                <a:latin typeface="Arial" panose="020B0604020202020204" pitchFamily="34" charset="0"/>
+                <a:cs typeface="Arial" panose="020B0604020202020204" pitchFamily="34" charset="0"/>
+              </a:rPr>
+              <a:t>ominio   </a:t>
             </a:r>
             <a:r>
               <a:rPr lang="es-ES_tradnl" sz="900" i="1" dirty="0" smtClean="0">
                 <a:solidFill>
                   <a:schemeClr val="tx1"/>
                 </a:solidFill>
+                <a:latin typeface="Arial" panose="020B0604020202020204" pitchFamily="34" charset="0"/>
+                <a:cs typeface="Arial" panose="020B0604020202020204" pitchFamily="34" charset="0"/>
               </a:rPr>
               <a:t>ℝ</a:t>
             </a:r>
@@ -5683,7 +4723,8 @@
                 <a:solidFill>
                   <a:schemeClr val="tx1"/>
                 </a:solidFill>
-                <a:cs typeface="Arial" pitchFamily="34" charset="0"/>
+                <a:latin typeface="Arial" panose="020B0604020202020204" pitchFamily="34" charset="0"/>
+                <a:cs typeface="Arial" panose="020B0604020202020204" pitchFamily="34" charset="0"/>
               </a:rPr>
               <a:t>  Rango   </a:t>
             </a:r>
@@ -5692,6 +4733,8 @@
                 <a:solidFill>
                   <a:schemeClr val="tx1"/>
                 </a:solidFill>
+                <a:latin typeface="Arial" panose="020B0604020202020204" pitchFamily="34" charset="0"/>
+                <a:cs typeface="Arial" panose="020B0604020202020204" pitchFamily="34" charset="0"/>
               </a:rPr>
               <a:t>ℝ</a:t>
             </a:r>
@@ -5700,7 +4743,8 @@
                 <a:solidFill>
                   <a:schemeClr val="tx1"/>
                 </a:solidFill>
-                <a:cs typeface="Arial" pitchFamily="34" charset="0"/>
+                <a:latin typeface="Arial" panose="020B0604020202020204" pitchFamily="34" charset="0"/>
+                <a:cs typeface="Arial" panose="020B0604020202020204" pitchFamily="34" charset="0"/>
               </a:rPr>
               <a:t> </a:t>
             </a:r>
@@ -5709,7 +4753,8 @@
                 <a:solidFill>
                   <a:schemeClr val="tx1"/>
                 </a:solidFill>
-                <a:cs typeface="Arial" pitchFamily="34" charset="0"/>
+                <a:latin typeface="Arial" panose="020B0604020202020204" pitchFamily="34" charset="0"/>
+                <a:cs typeface="Arial" panose="020B0604020202020204" pitchFamily="34" charset="0"/>
               </a:rPr>
               <a:t>+</a:t>
             </a:r>
@@ -5718,7 +4763,8 @@
                 <a:solidFill>
                   <a:schemeClr val="tx1"/>
                 </a:solidFill>
-                <a:cs typeface="Arial" pitchFamily="34" charset="0"/>
+                <a:latin typeface="Arial" panose="020B0604020202020204" pitchFamily="34" charset="0"/>
+                <a:cs typeface="Arial" panose="020B0604020202020204" pitchFamily="34" charset="0"/>
               </a:rPr>
               <a:t>  </a:t>
             </a:r>
@@ -5726,7 +4772,8 @@
               <a:solidFill>
                 <a:schemeClr val="tx1"/>
               </a:solidFill>
-              <a:cs typeface="Arial" pitchFamily="34" charset="0"/>
+              <a:latin typeface="Arial" panose="020B0604020202020204" pitchFamily="34" charset="0"/>
+              <a:cs typeface="Arial" panose="020B0604020202020204" pitchFamily="34" charset="0"/>
             </a:endParaRPr>
           </a:p>
           <a:p>
@@ -5735,7 +4782,8 @@
               <a:solidFill>
                 <a:schemeClr val="tx1"/>
               </a:solidFill>
-              <a:cs typeface="Arial" pitchFamily="34" charset="0"/>
+              <a:latin typeface="Arial" panose="020B0604020202020204" pitchFamily="34" charset="0"/>
+              <a:cs typeface="Arial" panose="020B0604020202020204" pitchFamily="34" charset="0"/>
             </a:endParaRPr>
           </a:p>
         </p:txBody>
@@ -5784,7 +4832,8 @@
                 <a:solidFill>
                   <a:schemeClr val="tx1"/>
                 </a:solidFill>
-                <a:cs typeface="Arial" pitchFamily="34" charset="0"/>
+                <a:latin typeface="Arial" panose="020B0604020202020204" pitchFamily="34" charset="0"/>
+                <a:cs typeface="Arial" panose="020B0604020202020204" pitchFamily="34" charset="0"/>
               </a:rPr>
               <a:t>  </a:t>
             </a:r>
@@ -5792,7 +4841,8 @@
               <a:solidFill>
                 <a:schemeClr val="tx1"/>
               </a:solidFill>
-              <a:cs typeface="Arial" pitchFamily="34" charset="0"/>
+              <a:latin typeface="Arial" panose="020B0604020202020204" pitchFamily="34" charset="0"/>
+              <a:cs typeface="Arial" panose="020B0604020202020204" pitchFamily="34" charset="0"/>
             </a:endParaRPr>
           </a:p>
           <a:p>
@@ -5802,7 +4852,8 @@
                 <a:solidFill>
                   <a:schemeClr val="tx1"/>
                 </a:solidFill>
-                <a:cs typeface="Arial" pitchFamily="34" charset="0"/>
+                <a:latin typeface="Arial" panose="020B0604020202020204" pitchFamily="34" charset="0"/>
+                <a:cs typeface="Arial" panose="020B0604020202020204" pitchFamily="34" charset="0"/>
               </a:rPr>
               <a:t>continuas  en    </a:t>
             </a:r>
@@ -5814,6 +4865,8 @@
                 <a:solidFill>
                   <a:schemeClr val="tx1"/>
                 </a:solidFill>
+                <a:latin typeface="Arial" panose="020B0604020202020204" pitchFamily="34" charset="0"/>
+                <a:cs typeface="Arial" panose="020B0604020202020204" pitchFamily="34" charset="0"/>
               </a:rPr>
               <a:t>ℝ</a:t>
             </a:r>
@@ -5822,7 +4875,8 @@
                 <a:solidFill>
                   <a:schemeClr val="tx1"/>
                 </a:solidFill>
-                <a:cs typeface="Arial" pitchFamily="34" charset="0"/>
+                <a:latin typeface="Arial" panose="020B0604020202020204" pitchFamily="34" charset="0"/>
+                <a:cs typeface="Arial" panose="020B0604020202020204" pitchFamily="34" charset="0"/>
               </a:rPr>
               <a:t> </a:t>
             </a:r>
@@ -5831,7 +4885,8 @@
                 <a:solidFill>
                   <a:schemeClr val="tx1"/>
                 </a:solidFill>
-                <a:cs typeface="Arial" pitchFamily="34" charset="0"/>
+                <a:latin typeface="Arial" panose="020B0604020202020204" pitchFamily="34" charset="0"/>
+                <a:cs typeface="Arial" panose="020B0604020202020204" pitchFamily="34" charset="0"/>
               </a:rPr>
               <a:t>+</a:t>
             </a:r>
@@ -5840,7 +4895,8 @@
                 <a:solidFill>
                   <a:schemeClr val="tx1"/>
                 </a:solidFill>
-                <a:cs typeface="Arial" pitchFamily="34" charset="0"/>
+                <a:latin typeface="Arial" panose="020B0604020202020204" pitchFamily="34" charset="0"/>
+                <a:cs typeface="Arial" panose="020B0604020202020204" pitchFamily="34" charset="0"/>
               </a:rPr>
               <a:t>  </a:t>
             </a:r>
@@ -5848,7 +4904,8 @@
               <a:solidFill>
                 <a:schemeClr val="tx1"/>
               </a:solidFill>
-              <a:cs typeface="Arial" pitchFamily="34" charset="0"/>
+              <a:latin typeface="Arial" panose="020B0604020202020204" pitchFamily="34" charset="0"/>
+              <a:cs typeface="Arial" panose="020B0604020202020204" pitchFamily="34" charset="0"/>
             </a:endParaRPr>
           </a:p>
           <a:p>
@@ -5857,7 +4914,8 @@
               <a:solidFill>
                 <a:schemeClr val="tx1"/>
               </a:solidFill>
-              <a:cs typeface="Arial" pitchFamily="34" charset="0"/>
+              <a:latin typeface="Arial" panose="020B0604020202020204" pitchFamily="34" charset="0"/>
+              <a:cs typeface="Arial" panose="020B0604020202020204" pitchFamily="34" charset="0"/>
             </a:endParaRPr>
           </a:p>
         </p:txBody>
@@ -5906,7 +4964,8 @@
                 <a:solidFill>
                   <a:schemeClr val="tx1"/>
                 </a:solidFill>
-                <a:cs typeface="Arial" pitchFamily="34" charset="0"/>
+                <a:latin typeface="Arial" panose="020B0604020202020204" pitchFamily="34" charset="0"/>
+                <a:cs typeface="Arial" panose="020B0604020202020204" pitchFamily="34" charset="0"/>
               </a:rPr>
               <a:t>  </a:t>
             </a:r>
@@ -5914,7 +4973,8 @@
               <a:solidFill>
                 <a:schemeClr val="tx1"/>
               </a:solidFill>
-              <a:cs typeface="Arial" pitchFamily="34" charset="0"/>
+              <a:latin typeface="Arial" panose="020B0604020202020204" pitchFamily="34" charset="0"/>
+              <a:cs typeface="Arial" panose="020B0604020202020204" pitchFamily="34" charset="0"/>
             </a:endParaRPr>
           </a:p>
           <a:p>
@@ -5923,27 +4983,40 @@
                 <a:solidFill>
                   <a:schemeClr val="tx1"/>
                 </a:solidFill>
-                <a:cs typeface="Arial" pitchFamily="34" charset="0"/>
-              </a:rPr>
-              <a:t>c</a:t>
-            </a:r>
-            <a:r>
-              <a:rPr lang="es-CO" sz="900" smtClean="0">
-                <a:solidFill>
-                  <a:schemeClr val="tx1"/>
-                </a:solidFill>
-                <a:cs typeface="Arial" pitchFamily="34" charset="0"/>
-              </a:rPr>
-              <a:t>orta </a:t>
-            </a:r>
-            <a:r>
-              <a:rPr lang="es-CO" sz="900" dirty="0" smtClean="0">
-                <a:solidFill>
-                  <a:schemeClr val="tx1"/>
-                </a:solidFill>
-                <a:cs typeface="Arial" pitchFamily="34" charset="0"/>
-              </a:rPr>
-              <a:t>al eje X en 1 , No corta al eje  Y</a:t>
+                <a:latin typeface="Arial" panose="020B0604020202020204" pitchFamily="34" charset="0"/>
+                <a:cs typeface="Arial" panose="020B0604020202020204" pitchFamily="34" charset="0"/>
+              </a:rPr>
+              <a:t>C</a:t>
+            </a:r>
+            <a:r>
+              <a:rPr lang="es-CO" sz="900" dirty="0" smtClean="0">
+                <a:solidFill>
+                  <a:schemeClr val="tx1"/>
+                </a:solidFill>
+                <a:latin typeface="Arial" panose="020B0604020202020204" pitchFamily="34" charset="0"/>
+                <a:cs typeface="Arial" panose="020B0604020202020204" pitchFamily="34" charset="0"/>
+              </a:rPr>
+              <a:t>orta al eje X en </a:t>
+            </a:r>
+            <a:r>
+              <a:rPr lang="es-CO" sz="900" dirty="0" smtClean="0">
+                <a:solidFill>
+                  <a:schemeClr val="tx1"/>
+                </a:solidFill>
+                <a:latin typeface="Arial" panose="020B0604020202020204" pitchFamily="34" charset="0"/>
+                <a:cs typeface="Arial" panose="020B0604020202020204" pitchFamily="34" charset="0"/>
+              </a:rPr>
+              <a:t>1, </a:t>
+            </a:r>
+            <a:r>
+              <a:rPr lang="es-CO" sz="900" dirty="0" smtClean="0">
+                <a:solidFill>
+                  <a:schemeClr val="tx1"/>
+                </a:solidFill>
+                <a:latin typeface="Arial" panose="020B0604020202020204" pitchFamily="34" charset="0"/>
+                <a:cs typeface="Arial" panose="020B0604020202020204" pitchFamily="34" charset="0"/>
+              </a:rPr>
+              <a:t>No corta al eje  Y</a:t>
             </a:r>
           </a:p>
           <a:p>
@@ -5952,7 +5025,8 @@
               <a:solidFill>
                 <a:schemeClr val="tx1"/>
               </a:solidFill>
-              <a:cs typeface="Arial" pitchFamily="34" charset="0"/>
+              <a:latin typeface="Arial" panose="020B0604020202020204" pitchFamily="34" charset="0"/>
+              <a:cs typeface="Arial" panose="020B0604020202020204" pitchFamily="34" charset="0"/>
             </a:endParaRPr>
           </a:p>
         </p:txBody>
@@ -6222,7 +5296,8 @@
                 <a:solidFill>
                   <a:schemeClr val="tx1"/>
                 </a:solidFill>
-                <a:cs typeface="Arial" pitchFamily="34" charset="0"/>
+                <a:latin typeface="Arial" panose="020B0604020202020204" pitchFamily="34" charset="0"/>
+                <a:cs typeface="Arial" panose="020B0604020202020204" pitchFamily="34" charset="0"/>
               </a:rPr>
               <a:t>s</a:t>
             </a:r>
@@ -6231,7 +5306,8 @@
                 <a:solidFill>
                   <a:schemeClr val="tx1"/>
                 </a:solidFill>
-                <a:cs typeface="Arial" pitchFamily="34" charset="0"/>
+                <a:latin typeface="Arial" panose="020B0604020202020204" pitchFamily="34" charset="0"/>
+                <a:cs typeface="Arial" panose="020B0604020202020204" pitchFamily="34" charset="0"/>
               </a:rPr>
               <a:t>us aplicaciones se dan en      </a:t>
             </a:r>
@@ -6239,7 +5315,8 @@
               <a:solidFill>
                 <a:schemeClr val="tx1"/>
               </a:solidFill>
-              <a:cs typeface="Arial" pitchFamily="34" charset="0"/>
+              <a:latin typeface="Arial" panose="020B0604020202020204" pitchFamily="34" charset="0"/>
+              <a:cs typeface="Arial" panose="020B0604020202020204" pitchFamily="34" charset="0"/>
             </a:endParaRPr>
           </a:p>
         </p:txBody>
@@ -6328,7 +5405,8 @@
                 <a:solidFill>
                   <a:schemeClr val="tx1"/>
                 </a:solidFill>
-                <a:cs typeface="Arial" pitchFamily="34" charset="0"/>
+                <a:latin typeface="Arial" panose="020B0604020202020204" pitchFamily="34" charset="0"/>
+                <a:cs typeface="Arial" panose="020B0604020202020204" pitchFamily="34" charset="0"/>
               </a:rPr>
               <a:t>crecimiento exponencial </a:t>
             </a:r>
@@ -6336,6 +5414,8 @@
               <a:solidFill>
                 <a:schemeClr val="tx1"/>
               </a:solidFill>
+              <a:latin typeface="Arial" panose="020B0604020202020204" pitchFamily="34" charset="0"/>
+              <a:cs typeface="Arial" panose="020B0604020202020204" pitchFamily="34" charset="0"/>
             </a:endParaRPr>
           </a:p>
         </p:txBody>
@@ -6384,7 +5464,8 @@
                 <a:solidFill>
                   <a:schemeClr val="tx1"/>
                 </a:solidFill>
-                <a:cs typeface="Arial" pitchFamily="34" charset="0"/>
+                <a:latin typeface="Arial" panose="020B0604020202020204" pitchFamily="34" charset="0"/>
+                <a:cs typeface="Arial" panose="020B0604020202020204" pitchFamily="34" charset="0"/>
               </a:rPr>
               <a:t>interés compuesto </a:t>
             </a:r>
@@ -6392,6 +5473,8 @@
               <a:solidFill>
                 <a:schemeClr val="tx1"/>
               </a:solidFill>
+              <a:latin typeface="Arial" panose="020B0604020202020204" pitchFamily="34" charset="0"/>
+              <a:cs typeface="Arial" panose="020B0604020202020204" pitchFamily="34" charset="0"/>
             </a:endParaRPr>
           </a:p>
         </p:txBody>
@@ -6440,7 +5523,8 @@
                 <a:solidFill>
                   <a:schemeClr val="tx1"/>
                 </a:solidFill>
-                <a:cs typeface="Arial" pitchFamily="34" charset="0"/>
+                <a:latin typeface="Arial" panose="020B0604020202020204" pitchFamily="34" charset="0"/>
+                <a:cs typeface="Arial" panose="020B0604020202020204" pitchFamily="34" charset="0"/>
               </a:rPr>
               <a:t>crecimiento  poblacional  </a:t>
             </a:r>
@@ -6448,6 +5532,8 @@
               <a:solidFill>
                 <a:schemeClr val="tx1"/>
               </a:solidFill>
+              <a:latin typeface="Arial" panose="020B0604020202020204" pitchFamily="34" charset="0"/>
+              <a:cs typeface="Arial" panose="020B0604020202020204" pitchFamily="34" charset="0"/>
             </a:endParaRPr>
           </a:p>
         </p:txBody>
@@ -6496,7 +5582,8 @@
                 <a:solidFill>
                   <a:schemeClr val="tx1"/>
                 </a:solidFill>
-                <a:cs typeface="Arial" pitchFamily="34" charset="0"/>
+                <a:latin typeface="Arial" panose="020B0604020202020204" pitchFamily="34" charset="0"/>
+                <a:cs typeface="Arial" panose="020B0604020202020204" pitchFamily="34" charset="0"/>
               </a:rPr>
               <a:t>decrecimiento exponencial </a:t>
             </a:r>
@@ -6504,6 +5591,8 @@
               <a:solidFill>
                 <a:schemeClr val="tx1"/>
               </a:solidFill>
+              <a:latin typeface="Arial" panose="020B0604020202020204" pitchFamily="34" charset="0"/>
+              <a:cs typeface="Arial" panose="020B0604020202020204" pitchFamily="34" charset="0"/>
             </a:endParaRPr>
           </a:p>
         </p:txBody>
@@ -6516,8 +5605,8 @@
         </p:nvSpPr>
         <p:spPr>
           <a:xfrm>
-            <a:off x="5575877" y="6935186"/>
-            <a:ext cx="1029345" cy="449386"/>
+            <a:off x="5556827" y="6935186"/>
+            <a:ext cx="1057097" cy="449386"/>
           </a:xfrm>
           <a:prstGeom prst="rect">
             <a:avLst/>
@@ -6552,7 +5641,8 @@
                 <a:solidFill>
                   <a:schemeClr val="tx1"/>
                 </a:solidFill>
-                <a:cs typeface="Arial" pitchFamily="34" charset="0"/>
+                <a:latin typeface="Arial" panose="020B0604020202020204" pitchFamily="34" charset="0"/>
+                <a:cs typeface="Arial" panose="020B0604020202020204" pitchFamily="34" charset="0"/>
               </a:rPr>
               <a:t>descomposición radioactiva </a:t>
             </a:r>
@@ -6560,6 +5650,8 @@
               <a:solidFill>
                 <a:schemeClr val="tx1"/>
               </a:solidFill>
+              <a:latin typeface="Arial" panose="020B0604020202020204" pitchFamily="34" charset="0"/>
+              <a:cs typeface="Arial" panose="020B0604020202020204" pitchFamily="34" charset="0"/>
             </a:endParaRPr>
           </a:p>
         </p:txBody>
@@ -6728,7 +5820,7 @@
         <p:spPr>
           <a:xfrm>
             <a:off x="6083767" y="6709673"/>
-            <a:ext cx="6783" cy="225513"/>
+            <a:ext cx="1609" cy="225513"/>
           </a:xfrm>
           <a:prstGeom prst="line">
             <a:avLst/>
@@ -6796,7 +5888,8 @@
                 <a:solidFill>
                   <a:schemeClr val="tx1"/>
                 </a:solidFill>
-                <a:cs typeface="Arial" pitchFamily="34" charset="0"/>
+                <a:latin typeface="Arial" panose="020B0604020202020204" pitchFamily="34" charset="0"/>
+                <a:cs typeface="Arial" panose="020B0604020202020204" pitchFamily="34" charset="0"/>
               </a:rPr>
               <a:t>s</a:t>
             </a:r>
@@ -6805,7 +5898,8 @@
                 <a:solidFill>
                   <a:schemeClr val="tx1"/>
                 </a:solidFill>
-                <a:cs typeface="Arial" pitchFamily="34" charset="0"/>
+                <a:latin typeface="Arial" panose="020B0604020202020204" pitchFamily="34" charset="0"/>
+                <a:cs typeface="Arial" panose="020B0604020202020204" pitchFamily="34" charset="0"/>
               </a:rPr>
               <a:t>us aplicaciones se dan en      </a:t>
             </a:r>
@@ -6813,7 +5907,8 @@
               <a:solidFill>
                 <a:schemeClr val="tx1"/>
               </a:solidFill>
-              <a:cs typeface="Arial" pitchFamily="34" charset="0"/>
+              <a:latin typeface="Arial" panose="020B0604020202020204" pitchFamily="34" charset="0"/>
+              <a:cs typeface="Arial" panose="020B0604020202020204" pitchFamily="34" charset="0"/>
             </a:endParaRPr>
           </a:p>
         </p:txBody>
@@ -6898,29 +5993,22 @@
           <a:p>
             <a:pPr algn="ctr"/>
             <a:r>
-              <a:rPr lang="es-CO" sz="900">
-                <a:solidFill>
-                  <a:schemeClr val="tx1"/>
-                </a:solidFill>
-                <a:cs typeface="Arial" pitchFamily="34" charset="0"/>
-              </a:rPr>
-              <a:t>m</a:t>
-            </a:r>
-            <a:r>
-              <a:rPr lang="es-CO" sz="900" smtClean="0">
-                <a:solidFill>
-                  <a:schemeClr val="tx1"/>
-                </a:solidFill>
-                <a:cs typeface="Arial" pitchFamily="34" charset="0"/>
-              </a:rPr>
-              <a:t>edición </a:t>
-            </a:r>
-            <a:r>
-              <a:rPr lang="es-CO" sz="900" dirty="0" smtClean="0">
-                <a:solidFill>
-                  <a:schemeClr val="tx1"/>
-                </a:solidFill>
-                <a:cs typeface="Arial" pitchFamily="34" charset="0"/>
+              <a:rPr lang="es-CO" sz="900" dirty="0" smtClean="0">
+                <a:solidFill>
+                  <a:schemeClr val="tx1"/>
+                </a:solidFill>
+                <a:latin typeface="Arial" panose="020B0604020202020204" pitchFamily="34" charset="0"/>
+                <a:cs typeface="Arial" panose="020B0604020202020204" pitchFamily="34" charset="0"/>
+              </a:rPr>
+              <a:t>Medición de  </a:t>
+            </a:r>
+            <a:r>
+              <a:rPr lang="es-CO" sz="900" dirty="0" smtClean="0">
+                <a:solidFill>
+                  <a:schemeClr val="tx1"/>
+                </a:solidFill>
+                <a:latin typeface="Arial" panose="020B0604020202020204" pitchFamily="34" charset="0"/>
+                <a:cs typeface="Arial" panose="020B0604020202020204" pitchFamily="34" charset="0"/>
               </a:rPr>
               <a:t>temblores  </a:t>
             </a:r>
@@ -6928,6 +6016,8 @@
               <a:solidFill>
                 <a:schemeClr val="tx1"/>
               </a:solidFill>
+              <a:latin typeface="Arial" panose="020B0604020202020204" pitchFamily="34" charset="0"/>
+              <a:cs typeface="Arial" panose="020B0604020202020204" pitchFamily="34" charset="0"/>
             </a:endParaRPr>
           </a:p>
         </p:txBody>
@@ -6976,23 +6066,17 @@
                 <a:solidFill>
                   <a:schemeClr val="tx1"/>
                 </a:solidFill>
-                <a:cs typeface="Arial" pitchFamily="34" charset="0"/>
-              </a:rPr>
-              <a:t>Calculo antigüedad  objetos </a:t>
-            </a:r>
-            <a:r>
-              <a:rPr lang="es-CO" sz="900" dirty="0" smtClean="0">
-                <a:solidFill>
-                  <a:schemeClr val="tx1"/>
-                </a:solidFill>
-                <a:cs typeface="Arial" pitchFamily="34" charset="0"/>
-              </a:rPr>
-              <a:t> </a:t>
+                <a:latin typeface="Arial" panose="020B0604020202020204" pitchFamily="34" charset="0"/>
+                <a:cs typeface="Arial" panose="020B0604020202020204" pitchFamily="34" charset="0"/>
+              </a:rPr>
+              <a:t>Calculo antigüedad  objetos  </a:t>
             </a:r>
             <a:endParaRPr lang="es-ES_tradnl" sz="900" i="1" dirty="0" smtClean="0">
               <a:solidFill>
                 <a:schemeClr val="tx1"/>
               </a:solidFill>
+              <a:latin typeface="Arial" panose="020B0604020202020204" pitchFamily="34" charset="0"/>
+              <a:cs typeface="Arial" panose="020B0604020202020204" pitchFamily="34" charset="0"/>
             </a:endParaRPr>
           </a:p>
         </p:txBody>
@@ -7041,7 +6125,8 @@
                 <a:solidFill>
                   <a:schemeClr val="tx1"/>
                 </a:solidFill>
-                <a:cs typeface="Arial" pitchFamily="34" charset="0"/>
+                <a:latin typeface="Arial" panose="020B0604020202020204" pitchFamily="34" charset="0"/>
+                <a:cs typeface="Arial" panose="020B0604020202020204" pitchFamily="34" charset="0"/>
               </a:rPr>
               <a:t>m</a:t>
             </a:r>
@@ -7050,41 +6135,37 @@
                 <a:solidFill>
                   <a:schemeClr val="tx1"/>
                 </a:solidFill>
-                <a:cs typeface="Arial" pitchFamily="34" charset="0"/>
-              </a:rPr>
-              <a:t>edir  la acides </a:t>
-            </a:r>
-            <a:r>
-              <a:rPr lang="es-CO" sz="900" dirty="0" err="1" smtClean="0">
-                <a:solidFill>
-                  <a:schemeClr val="tx1"/>
-                </a:solidFill>
-                <a:cs typeface="Arial" pitchFamily="34" charset="0"/>
-              </a:rPr>
-              <a:t>Ph</a:t>
-            </a:r>
-            <a:r>
-              <a:rPr lang="es-CO" sz="900" dirty="0" smtClean="0">
-                <a:solidFill>
-                  <a:schemeClr val="tx1"/>
-                </a:solidFill>
-                <a:cs typeface="Arial" pitchFamily="34" charset="0"/>
-              </a:rPr>
-              <a:t> </a:t>
-            </a:r>
-            <a:r>
-              <a:rPr lang="es-CO" sz="900" dirty="0" smtClean="0">
-                <a:solidFill>
-                  <a:schemeClr val="tx1"/>
-                </a:solidFill>
-                <a:cs typeface="Arial" pitchFamily="34" charset="0"/>
-              </a:rPr>
-              <a:t>  </a:t>
+                <a:latin typeface="Arial" panose="020B0604020202020204" pitchFamily="34" charset="0"/>
+                <a:cs typeface="Arial" panose="020B0604020202020204" pitchFamily="34" charset="0"/>
+              </a:rPr>
+              <a:t>edir  la </a:t>
+            </a:r>
+            <a:r>
+              <a:rPr lang="es-CO" sz="900" dirty="0" smtClean="0">
+                <a:solidFill>
+                  <a:schemeClr val="tx1"/>
+                </a:solidFill>
+                <a:latin typeface="Arial" panose="020B0604020202020204" pitchFamily="34" charset="0"/>
+                <a:cs typeface="Arial" panose="020B0604020202020204" pitchFamily="34" charset="0"/>
+              </a:rPr>
+              <a:t>acidez </a:t>
+            </a:r>
+            <a:r>
+              <a:rPr lang="es-CO" sz="900" dirty="0" smtClean="0">
+                <a:solidFill>
+                  <a:schemeClr val="tx1"/>
+                </a:solidFill>
+                <a:latin typeface="Arial" panose="020B0604020202020204" pitchFamily="34" charset="0"/>
+                <a:cs typeface="Arial" panose="020B0604020202020204" pitchFamily="34" charset="0"/>
+              </a:rPr>
+              <a:t>pH   </a:t>
             </a:r>
             <a:endParaRPr lang="es-ES_tradnl" sz="900" i="1" dirty="0" smtClean="0">
               <a:solidFill>
                 <a:schemeClr val="tx1"/>
               </a:solidFill>
+              <a:latin typeface="Arial" panose="020B0604020202020204" pitchFamily="34" charset="0"/>
+              <a:cs typeface="Arial" panose="020B0604020202020204" pitchFamily="34" charset="0"/>
             </a:endParaRPr>
           </a:p>
         </p:txBody>
@@ -7203,6 +6284,532 @@
           </a:fontRef>
         </p:style>
       </p:cxnSp>
+      <p:sp>
+        <p:nvSpPr>
+          <p:cNvPr id="124" name="Rectángulo 123"/>
+          <p:cNvSpPr/>
+          <p:nvPr/>
+        </p:nvSpPr>
+        <p:spPr>
+          <a:xfrm>
+            <a:off x="2429803" y="6266316"/>
+            <a:ext cx="1244135" cy="370896"/>
+          </a:xfrm>
+          <a:prstGeom prst="rect">
+            <a:avLst/>
+          </a:prstGeom>
+          <a:solidFill>
+            <a:schemeClr val="bg1"/>
+          </a:solidFill>
+        </p:spPr>
+        <p:style>
+          <a:lnRef idx="2">
+            <a:schemeClr val="dk1"/>
+          </a:lnRef>
+          <a:fillRef idx="1">
+            <a:schemeClr val="lt1"/>
+          </a:fillRef>
+          <a:effectRef idx="0">
+            <a:schemeClr val="dk1"/>
+          </a:effectRef>
+          <a:fontRef idx="minor">
+            <a:schemeClr val="dk1"/>
+          </a:fontRef>
+        </p:style>
+        <p:txBody>
+          <a:bodyPr lIns="105683" tIns="52841" rIns="105683" bIns="52841" rtlCol="0" anchor="ctr"/>
+          <a:lstStyle>
+            <a:defPPr>
+              <a:defRPr lang="es-ES"/>
+            </a:defPPr>
+            <a:lvl1pPr marL="0" algn="l" defTabSz="1056822" rtl="0" eaLnBrk="1" latinLnBrk="0" hangingPunct="1">
+              <a:defRPr sz="2100" kern="1200">
+                <a:solidFill>
+                  <a:schemeClr val="dk1"/>
+                </a:solidFill>
+                <a:latin typeface="+mn-lt"/>
+                <a:ea typeface="+mn-ea"/>
+                <a:cs typeface="+mn-cs"/>
+              </a:defRPr>
+            </a:lvl1pPr>
+            <a:lvl2pPr marL="528411" algn="l" defTabSz="1056822" rtl="0" eaLnBrk="1" latinLnBrk="0" hangingPunct="1">
+              <a:defRPr sz="2100" kern="1200">
+                <a:solidFill>
+                  <a:schemeClr val="dk1"/>
+                </a:solidFill>
+                <a:latin typeface="+mn-lt"/>
+                <a:ea typeface="+mn-ea"/>
+                <a:cs typeface="+mn-cs"/>
+              </a:defRPr>
+            </a:lvl2pPr>
+            <a:lvl3pPr marL="1056822" algn="l" defTabSz="1056822" rtl="0" eaLnBrk="1" latinLnBrk="0" hangingPunct="1">
+              <a:defRPr sz="2100" kern="1200">
+                <a:solidFill>
+                  <a:schemeClr val="dk1"/>
+                </a:solidFill>
+                <a:latin typeface="+mn-lt"/>
+                <a:ea typeface="+mn-ea"/>
+                <a:cs typeface="+mn-cs"/>
+              </a:defRPr>
+            </a:lvl3pPr>
+            <a:lvl4pPr marL="1585233" algn="l" defTabSz="1056822" rtl="0" eaLnBrk="1" latinLnBrk="0" hangingPunct="1">
+              <a:defRPr sz="2100" kern="1200">
+                <a:solidFill>
+                  <a:schemeClr val="dk1"/>
+                </a:solidFill>
+                <a:latin typeface="+mn-lt"/>
+                <a:ea typeface="+mn-ea"/>
+                <a:cs typeface="+mn-cs"/>
+              </a:defRPr>
+            </a:lvl4pPr>
+            <a:lvl5pPr marL="2113645" algn="l" defTabSz="1056822" rtl="0" eaLnBrk="1" latinLnBrk="0" hangingPunct="1">
+              <a:defRPr sz="2100" kern="1200">
+                <a:solidFill>
+                  <a:schemeClr val="dk1"/>
+                </a:solidFill>
+                <a:latin typeface="+mn-lt"/>
+                <a:ea typeface="+mn-ea"/>
+                <a:cs typeface="+mn-cs"/>
+              </a:defRPr>
+            </a:lvl5pPr>
+            <a:lvl6pPr marL="2642056" algn="l" defTabSz="1056822" rtl="0" eaLnBrk="1" latinLnBrk="0" hangingPunct="1">
+              <a:defRPr sz="2100" kern="1200">
+                <a:solidFill>
+                  <a:schemeClr val="dk1"/>
+                </a:solidFill>
+                <a:latin typeface="+mn-lt"/>
+                <a:ea typeface="+mn-ea"/>
+                <a:cs typeface="+mn-cs"/>
+              </a:defRPr>
+            </a:lvl6pPr>
+            <a:lvl7pPr marL="3170466" algn="l" defTabSz="1056822" rtl="0" eaLnBrk="1" latinLnBrk="0" hangingPunct="1">
+              <a:defRPr sz="2100" kern="1200">
+                <a:solidFill>
+                  <a:schemeClr val="dk1"/>
+                </a:solidFill>
+                <a:latin typeface="+mn-lt"/>
+                <a:ea typeface="+mn-ea"/>
+                <a:cs typeface="+mn-cs"/>
+              </a:defRPr>
+            </a:lvl7pPr>
+            <a:lvl8pPr marL="3698878" algn="l" defTabSz="1056822" rtl="0" eaLnBrk="1" latinLnBrk="0" hangingPunct="1">
+              <a:defRPr sz="2100" kern="1200">
+                <a:solidFill>
+                  <a:schemeClr val="dk1"/>
+                </a:solidFill>
+                <a:latin typeface="+mn-lt"/>
+                <a:ea typeface="+mn-ea"/>
+                <a:cs typeface="+mn-cs"/>
+              </a:defRPr>
+            </a:lvl8pPr>
+            <a:lvl9pPr marL="4227289" algn="l" defTabSz="1056822" rtl="0" eaLnBrk="1" latinLnBrk="0" hangingPunct="1">
+              <a:defRPr sz="2100" kern="1200">
+                <a:solidFill>
+                  <a:schemeClr val="dk1"/>
+                </a:solidFill>
+                <a:latin typeface="+mn-lt"/>
+                <a:ea typeface="+mn-ea"/>
+                <a:cs typeface="+mn-cs"/>
+              </a:defRPr>
+            </a:lvl9pPr>
+          </a:lstStyle>
+          <a:p>
+            <a:r>
+              <a:rPr lang="es-CO" sz="900" dirty="0" smtClean="0">
+                <a:solidFill>
+                  <a:srgbClr val="FF0000"/>
+                </a:solidFill>
+                <a:latin typeface="Arial" panose="020B0604020202020204" pitchFamily="34" charset="0"/>
+                <a:cs typeface="Arial" panose="020B0604020202020204" pitchFamily="34" charset="0"/>
+              </a:rPr>
+              <a:t>    </a:t>
+            </a:r>
+          </a:p>
+          <a:p>
+            <a:pPr algn="ctr"/>
+            <a:r>
+              <a:rPr lang="es-ES_tradnl" sz="900" i="1" dirty="0" smtClean="0">
+                <a:solidFill>
+                  <a:schemeClr val="tx1"/>
+                </a:solidFill>
+                <a:latin typeface="Arial" panose="020B0604020202020204" pitchFamily="34" charset="0"/>
+                <a:cs typeface="Arial" panose="020B0604020202020204" pitchFamily="34" charset="0"/>
+              </a:rPr>
+              <a:t>a</a:t>
+            </a:r>
+            <a:r>
+              <a:rPr lang="es-CO" sz="900" dirty="0" smtClean="0">
+                <a:solidFill>
+                  <a:schemeClr val="tx1"/>
+                </a:solidFill>
+                <a:latin typeface="Arial" panose="020B0604020202020204" pitchFamily="34" charset="0"/>
+                <a:cs typeface="Arial" panose="020B0604020202020204" pitchFamily="34" charset="0"/>
+              </a:rPr>
+              <a:t> </a:t>
+            </a:r>
+            <a:r>
+              <a:rPr lang="es-CO" sz="900" dirty="0" smtClean="0">
+                <a:solidFill>
+                  <a:schemeClr val="tx1"/>
+                </a:solidFill>
+                <a:latin typeface="Arial" panose="020B0604020202020204" pitchFamily="34" charset="0"/>
+                <a:cs typeface="Arial" panose="020B0604020202020204" pitchFamily="34" charset="0"/>
+              </a:rPr>
+              <a:t>&gt;</a:t>
+            </a:r>
+            <a:r>
+              <a:rPr lang="es-CO" sz="900" dirty="0" smtClean="0">
+                <a:solidFill>
+                  <a:schemeClr val="tx1"/>
+                </a:solidFill>
+                <a:latin typeface="Arial" panose="020B0604020202020204" pitchFamily="34" charset="0"/>
+                <a:cs typeface="Arial" panose="020B0604020202020204" pitchFamily="34" charset="0"/>
+              </a:rPr>
+              <a:t> </a:t>
+            </a:r>
+            <a:r>
+              <a:rPr lang="es-CO" sz="900" dirty="0" smtClean="0">
+                <a:solidFill>
+                  <a:schemeClr val="tx1"/>
+                </a:solidFill>
+                <a:latin typeface="Arial" panose="020B0604020202020204" pitchFamily="34" charset="0"/>
+                <a:cs typeface="Arial" panose="020B0604020202020204" pitchFamily="34" charset="0"/>
+              </a:rPr>
+              <a:t>1 </a:t>
+            </a:r>
+            <a:r>
+              <a:rPr lang="es-CO" sz="900" dirty="0">
+                <a:solidFill>
+                  <a:schemeClr val="tx1"/>
+                </a:solidFill>
+                <a:latin typeface="Arial" panose="020B0604020202020204" pitchFamily="34" charset="0"/>
+                <a:cs typeface="Arial" panose="020B0604020202020204" pitchFamily="34" charset="0"/>
+              </a:rPr>
+              <a:t>la </a:t>
+            </a:r>
+            <a:r>
+              <a:rPr lang="es-CO" sz="900" dirty="0" smtClean="0">
+                <a:solidFill>
+                  <a:schemeClr val="tx1"/>
+                </a:solidFill>
+                <a:latin typeface="Arial" panose="020B0604020202020204" pitchFamily="34" charset="0"/>
+                <a:cs typeface="Arial" panose="020B0604020202020204" pitchFamily="34" charset="0"/>
+              </a:rPr>
+              <a:t>gráfica </a:t>
+            </a:r>
+            <a:r>
+              <a:rPr lang="es-CO" sz="900" dirty="0">
+                <a:solidFill>
+                  <a:schemeClr val="tx1"/>
+                </a:solidFill>
+                <a:latin typeface="Arial" panose="020B0604020202020204" pitchFamily="34" charset="0"/>
+                <a:cs typeface="Arial" panose="020B0604020202020204" pitchFamily="34" charset="0"/>
+              </a:rPr>
+              <a:t>es </a:t>
+            </a:r>
+            <a:r>
+              <a:rPr lang="es-CO" sz="900" dirty="0" smtClean="0">
+                <a:solidFill>
+                  <a:schemeClr val="tx1"/>
+                </a:solidFill>
+                <a:latin typeface="Arial" panose="020B0604020202020204" pitchFamily="34" charset="0"/>
+                <a:cs typeface="Arial" panose="020B0604020202020204" pitchFamily="34" charset="0"/>
+              </a:rPr>
+              <a:t>creciente   </a:t>
+            </a:r>
+            <a:endParaRPr lang="es-CO" sz="900" dirty="0">
+              <a:solidFill>
+                <a:schemeClr val="tx1"/>
+              </a:solidFill>
+              <a:latin typeface="Arial" panose="020B0604020202020204" pitchFamily="34" charset="0"/>
+              <a:cs typeface="Arial" panose="020B0604020202020204" pitchFamily="34" charset="0"/>
+            </a:endParaRPr>
+          </a:p>
+          <a:p>
+            <a:pPr algn="ctr"/>
+            <a:r>
+              <a:rPr lang="es-CO" sz="900" dirty="0" smtClean="0">
+                <a:solidFill>
+                  <a:srgbClr val="FF0000"/>
+                </a:solidFill>
+                <a:latin typeface="Arial" panose="020B0604020202020204" pitchFamily="34" charset="0"/>
+                <a:cs typeface="Arial" panose="020B0604020202020204" pitchFamily="34" charset="0"/>
+              </a:rPr>
+              <a:t> </a:t>
+            </a:r>
+            <a:endParaRPr lang="es-CO" sz="900" dirty="0">
+              <a:solidFill>
+                <a:srgbClr val="FF0000"/>
+              </a:solidFill>
+              <a:latin typeface="Arial" panose="020B0604020202020204" pitchFamily="34" charset="0"/>
+              <a:cs typeface="Arial" panose="020B0604020202020204" pitchFamily="34" charset="0"/>
+            </a:endParaRPr>
+          </a:p>
+        </p:txBody>
+      </p:sp>
+      <p:sp>
+        <p:nvSpPr>
+          <p:cNvPr id="131" name="Rectángulo 130"/>
+          <p:cNvSpPr/>
+          <p:nvPr/>
+        </p:nvSpPr>
+        <p:spPr>
+          <a:xfrm>
+            <a:off x="10500319" y="6412766"/>
+            <a:ext cx="1244135" cy="370896"/>
+          </a:xfrm>
+          <a:prstGeom prst="rect">
+            <a:avLst/>
+          </a:prstGeom>
+          <a:solidFill>
+            <a:schemeClr val="bg1"/>
+          </a:solidFill>
+        </p:spPr>
+        <p:style>
+          <a:lnRef idx="2">
+            <a:schemeClr val="dk1"/>
+          </a:lnRef>
+          <a:fillRef idx="1">
+            <a:schemeClr val="lt1"/>
+          </a:fillRef>
+          <a:effectRef idx="0">
+            <a:schemeClr val="dk1"/>
+          </a:effectRef>
+          <a:fontRef idx="minor">
+            <a:schemeClr val="dk1"/>
+          </a:fontRef>
+        </p:style>
+        <p:txBody>
+          <a:bodyPr lIns="105683" tIns="52841" rIns="105683" bIns="52841" rtlCol="0" anchor="ctr"/>
+          <a:lstStyle>
+            <a:defPPr>
+              <a:defRPr lang="es-ES"/>
+            </a:defPPr>
+            <a:lvl1pPr marL="0" algn="l" defTabSz="1056822" rtl="0" eaLnBrk="1" latinLnBrk="0" hangingPunct="1">
+              <a:defRPr sz="2100" kern="1200">
+                <a:solidFill>
+                  <a:schemeClr val="dk1"/>
+                </a:solidFill>
+                <a:latin typeface="+mn-lt"/>
+                <a:ea typeface="+mn-ea"/>
+                <a:cs typeface="+mn-cs"/>
+              </a:defRPr>
+            </a:lvl1pPr>
+            <a:lvl2pPr marL="528411" algn="l" defTabSz="1056822" rtl="0" eaLnBrk="1" latinLnBrk="0" hangingPunct="1">
+              <a:defRPr sz="2100" kern="1200">
+                <a:solidFill>
+                  <a:schemeClr val="dk1"/>
+                </a:solidFill>
+                <a:latin typeface="+mn-lt"/>
+                <a:ea typeface="+mn-ea"/>
+                <a:cs typeface="+mn-cs"/>
+              </a:defRPr>
+            </a:lvl2pPr>
+            <a:lvl3pPr marL="1056822" algn="l" defTabSz="1056822" rtl="0" eaLnBrk="1" latinLnBrk="0" hangingPunct="1">
+              <a:defRPr sz="2100" kern="1200">
+                <a:solidFill>
+                  <a:schemeClr val="dk1"/>
+                </a:solidFill>
+                <a:latin typeface="+mn-lt"/>
+                <a:ea typeface="+mn-ea"/>
+                <a:cs typeface="+mn-cs"/>
+              </a:defRPr>
+            </a:lvl3pPr>
+            <a:lvl4pPr marL="1585233" algn="l" defTabSz="1056822" rtl="0" eaLnBrk="1" latinLnBrk="0" hangingPunct="1">
+              <a:defRPr sz="2100" kern="1200">
+                <a:solidFill>
+                  <a:schemeClr val="dk1"/>
+                </a:solidFill>
+                <a:latin typeface="+mn-lt"/>
+                <a:ea typeface="+mn-ea"/>
+                <a:cs typeface="+mn-cs"/>
+              </a:defRPr>
+            </a:lvl4pPr>
+            <a:lvl5pPr marL="2113645" algn="l" defTabSz="1056822" rtl="0" eaLnBrk="1" latinLnBrk="0" hangingPunct="1">
+              <a:defRPr sz="2100" kern="1200">
+                <a:solidFill>
+                  <a:schemeClr val="dk1"/>
+                </a:solidFill>
+                <a:latin typeface="+mn-lt"/>
+                <a:ea typeface="+mn-ea"/>
+                <a:cs typeface="+mn-cs"/>
+              </a:defRPr>
+            </a:lvl5pPr>
+            <a:lvl6pPr marL="2642056" algn="l" defTabSz="1056822" rtl="0" eaLnBrk="1" latinLnBrk="0" hangingPunct="1">
+              <a:defRPr sz="2100" kern="1200">
+                <a:solidFill>
+                  <a:schemeClr val="dk1"/>
+                </a:solidFill>
+                <a:latin typeface="+mn-lt"/>
+                <a:ea typeface="+mn-ea"/>
+                <a:cs typeface="+mn-cs"/>
+              </a:defRPr>
+            </a:lvl6pPr>
+            <a:lvl7pPr marL="3170466" algn="l" defTabSz="1056822" rtl="0" eaLnBrk="1" latinLnBrk="0" hangingPunct="1">
+              <a:defRPr sz="2100" kern="1200">
+                <a:solidFill>
+                  <a:schemeClr val="dk1"/>
+                </a:solidFill>
+                <a:latin typeface="+mn-lt"/>
+                <a:ea typeface="+mn-ea"/>
+                <a:cs typeface="+mn-cs"/>
+              </a:defRPr>
+            </a:lvl7pPr>
+            <a:lvl8pPr marL="3698878" algn="l" defTabSz="1056822" rtl="0" eaLnBrk="1" latinLnBrk="0" hangingPunct="1">
+              <a:defRPr sz="2100" kern="1200">
+                <a:solidFill>
+                  <a:schemeClr val="dk1"/>
+                </a:solidFill>
+                <a:latin typeface="+mn-lt"/>
+                <a:ea typeface="+mn-ea"/>
+                <a:cs typeface="+mn-cs"/>
+              </a:defRPr>
+            </a:lvl8pPr>
+            <a:lvl9pPr marL="4227289" algn="l" defTabSz="1056822" rtl="0" eaLnBrk="1" latinLnBrk="0" hangingPunct="1">
+              <a:defRPr sz="2100" kern="1200">
+                <a:solidFill>
+                  <a:schemeClr val="dk1"/>
+                </a:solidFill>
+                <a:latin typeface="+mn-lt"/>
+                <a:ea typeface="+mn-ea"/>
+                <a:cs typeface="+mn-cs"/>
+              </a:defRPr>
+            </a:lvl9pPr>
+          </a:lstStyle>
+          <a:p>
+            <a:r>
+              <a:rPr lang="es-CO" sz="900" dirty="0" smtClean="0">
+                <a:solidFill>
+                  <a:srgbClr val="FF0000"/>
+                </a:solidFill>
+                <a:latin typeface="Arial" panose="020B0604020202020204" pitchFamily="34" charset="0"/>
+                <a:cs typeface="Arial" panose="020B0604020202020204" pitchFamily="34" charset="0"/>
+              </a:rPr>
+              <a:t>    </a:t>
+            </a:r>
+          </a:p>
+          <a:p>
+            <a:pPr algn="ctr"/>
+            <a:r>
+              <a:rPr lang="es-ES_tradnl" sz="900" i="1" dirty="0" smtClean="0">
+                <a:solidFill>
+                  <a:schemeClr val="tx1"/>
+                </a:solidFill>
+                <a:latin typeface="Arial" panose="020B0604020202020204" pitchFamily="34" charset="0"/>
+                <a:cs typeface="Arial" panose="020B0604020202020204" pitchFamily="34" charset="0"/>
+              </a:rPr>
+              <a:t>a</a:t>
+            </a:r>
+            <a:r>
+              <a:rPr lang="es-CO" sz="900" dirty="0" smtClean="0">
+                <a:solidFill>
+                  <a:schemeClr val="tx1"/>
+                </a:solidFill>
+                <a:latin typeface="Arial" panose="020B0604020202020204" pitchFamily="34" charset="0"/>
+                <a:cs typeface="Arial" panose="020B0604020202020204" pitchFamily="34" charset="0"/>
+              </a:rPr>
+              <a:t> </a:t>
+            </a:r>
+            <a:r>
+              <a:rPr lang="es-CO" sz="900" dirty="0" smtClean="0">
+                <a:solidFill>
+                  <a:schemeClr val="tx1"/>
+                </a:solidFill>
+                <a:latin typeface="Arial" panose="020B0604020202020204" pitchFamily="34" charset="0"/>
+                <a:cs typeface="Arial" panose="020B0604020202020204" pitchFamily="34" charset="0"/>
+              </a:rPr>
+              <a:t>&gt;</a:t>
+            </a:r>
+            <a:r>
+              <a:rPr lang="es-CO" sz="900" dirty="0" smtClean="0">
+                <a:solidFill>
+                  <a:schemeClr val="tx1"/>
+                </a:solidFill>
+                <a:latin typeface="Arial" panose="020B0604020202020204" pitchFamily="34" charset="0"/>
+                <a:cs typeface="Arial" panose="020B0604020202020204" pitchFamily="34" charset="0"/>
+              </a:rPr>
+              <a:t> </a:t>
+            </a:r>
+            <a:r>
+              <a:rPr lang="es-CO" sz="900" dirty="0" smtClean="0">
+                <a:solidFill>
+                  <a:schemeClr val="tx1"/>
+                </a:solidFill>
+                <a:latin typeface="Arial" panose="020B0604020202020204" pitchFamily="34" charset="0"/>
+                <a:cs typeface="Arial" panose="020B0604020202020204" pitchFamily="34" charset="0"/>
+              </a:rPr>
+              <a:t>1 </a:t>
+            </a:r>
+            <a:r>
+              <a:rPr lang="es-CO" sz="900" dirty="0">
+                <a:solidFill>
+                  <a:schemeClr val="tx1"/>
+                </a:solidFill>
+                <a:latin typeface="Arial" panose="020B0604020202020204" pitchFamily="34" charset="0"/>
+                <a:cs typeface="Arial" panose="020B0604020202020204" pitchFamily="34" charset="0"/>
+              </a:rPr>
+              <a:t>la </a:t>
+            </a:r>
+            <a:r>
+              <a:rPr lang="es-CO" sz="900" dirty="0" smtClean="0">
+                <a:solidFill>
+                  <a:schemeClr val="tx1"/>
+                </a:solidFill>
+                <a:latin typeface="Arial" panose="020B0604020202020204" pitchFamily="34" charset="0"/>
+                <a:cs typeface="Arial" panose="020B0604020202020204" pitchFamily="34" charset="0"/>
+              </a:rPr>
+              <a:t>gráfica </a:t>
+            </a:r>
+            <a:r>
+              <a:rPr lang="es-CO" sz="900" dirty="0">
+                <a:solidFill>
+                  <a:schemeClr val="tx1"/>
+                </a:solidFill>
+                <a:latin typeface="Arial" panose="020B0604020202020204" pitchFamily="34" charset="0"/>
+                <a:cs typeface="Arial" panose="020B0604020202020204" pitchFamily="34" charset="0"/>
+              </a:rPr>
+              <a:t>es </a:t>
+            </a:r>
+            <a:r>
+              <a:rPr lang="es-CO" sz="900" dirty="0" smtClean="0">
+                <a:solidFill>
+                  <a:schemeClr val="tx1"/>
+                </a:solidFill>
+                <a:latin typeface="Arial" panose="020B0604020202020204" pitchFamily="34" charset="0"/>
+                <a:cs typeface="Arial" panose="020B0604020202020204" pitchFamily="34" charset="0"/>
+              </a:rPr>
+              <a:t>creciente   </a:t>
+            </a:r>
+            <a:endParaRPr lang="es-CO" sz="900" dirty="0">
+              <a:solidFill>
+                <a:schemeClr val="tx1"/>
+              </a:solidFill>
+              <a:latin typeface="Arial" panose="020B0604020202020204" pitchFamily="34" charset="0"/>
+              <a:cs typeface="Arial" panose="020B0604020202020204" pitchFamily="34" charset="0"/>
+            </a:endParaRPr>
+          </a:p>
+          <a:p>
+            <a:pPr algn="ctr"/>
+            <a:r>
+              <a:rPr lang="es-CO" sz="900" dirty="0" smtClean="0">
+                <a:solidFill>
+                  <a:srgbClr val="FF0000"/>
+                </a:solidFill>
+                <a:latin typeface="Arial" panose="020B0604020202020204" pitchFamily="34" charset="0"/>
+                <a:cs typeface="Arial" panose="020B0604020202020204" pitchFamily="34" charset="0"/>
+              </a:rPr>
+              <a:t> </a:t>
+            </a:r>
+            <a:endParaRPr lang="es-CO" sz="900" dirty="0">
+              <a:solidFill>
+                <a:srgbClr val="FF0000"/>
+              </a:solidFill>
+              <a:latin typeface="Arial" panose="020B0604020202020204" pitchFamily="34" charset="0"/>
+              <a:cs typeface="Arial" panose="020B0604020202020204" pitchFamily="34" charset="0"/>
+            </a:endParaRPr>
+          </a:p>
+        </p:txBody>
+      </p:sp>
     </p:spTree>
     <p:extLst>
       <p:ext uri="{BB962C8B-B14F-4D97-AF65-F5344CB8AC3E}">
@@ -7478,7 +7085,7 @@
   <a:extraClrSchemeLst/>
   <a:extLst>
     <a:ext uri="{05A4C25C-085E-4340-85A3-A5531E510DB2}">
-      <thm15:themeFamily xmlns:thm15="http://schemas.microsoft.com/office/thememl/2012/main" xmlns="" name="Office Theme" id="{62F939B6-93AF-4DB8-9C6B-D6C7DFDC589F}" vid="{4A3C46E8-61CC-4603-A589-7422A47A8E4A}"/>
+      <thm15:themeFamily xmlns:thm15="http://schemas.microsoft.com/office/thememl/2012/main" name="Office Theme" id="{62F939B6-93AF-4DB8-9C6B-D6C7DFDC589F}" vid="{4A3C46E8-61CC-4603-A589-7422A47A8E4A}"/>
     </a:ext>
   </a:extLst>
 </a:theme>

</xml_diff>